<commit_message>
Modify artoon-spec.pptx slide order and specific details
</commit_message>
<xml_diff>
--- a/artoon-spec.pptx
+++ b/artoon-spec.pptx
@@ -20,13 +20,13 @@
     <p:sldId id="313" r:id="rId8"/>
     <p:sldId id="300" r:id="rId9"/>
     <p:sldId id="319" r:id="rId10"/>
-    <p:sldId id="317" r:id="rId11"/>
-    <p:sldId id="326" r:id="rId12"/>
-    <p:sldId id="293" r:id="rId13"/>
-    <p:sldId id="308" r:id="rId14"/>
-    <p:sldId id="325" r:id="rId15"/>
-    <p:sldId id="323" r:id="rId16"/>
-    <p:sldId id="324" r:id="rId17"/>
+    <p:sldId id="308" r:id="rId11"/>
+    <p:sldId id="317" r:id="rId12"/>
+    <p:sldId id="326" r:id="rId13"/>
+    <p:sldId id="293" r:id="rId14"/>
+    <p:sldId id="323" r:id="rId15"/>
+    <p:sldId id="324" r:id="rId16"/>
+    <p:sldId id="325" r:id="rId17"/>
     <p:sldId id="304" r:id="rId18"/>
     <p:sldId id="278" r:id="rId19"/>
   </p:sldIdLst>
@@ -917,7 +917,7 @@
     </p:spTree>
     <p:extLst>
       <p:ext uri="{BB962C8B-B14F-4D97-AF65-F5344CB8AC3E}">
-        <p14:creationId xmlns:p14="http://schemas.microsoft.com/office/powerpoint/2010/main" val="2321851601"/>
+        <p14:creationId xmlns:p14="http://schemas.microsoft.com/office/powerpoint/2010/main" val="1158920028"/>
       </p:ext>
     </p:extLst>
   </p:cSld>
@@ -971,14 +971,6 @@
           <a:bodyPr/>
           <a:lstStyle/>
           <a:p>
-            <a:r>
-              <a:rPr lang="en-US" altLang="ko-KR" dirty="0"/>
-              <a:t>TODO: Sub-Architecture</a:t>
-            </a:r>
-            <a:r>
-              <a:rPr lang="en-US" altLang="ko-KR" baseline="0" dirty="0"/>
-              <a:t> goes here</a:t>
-            </a:r>
             <a:endParaRPr lang="ko-KR" altLang="en-US" dirty="0"/>
           </a:p>
         </p:txBody>
@@ -1010,7 +1002,7 @@
     </p:spTree>
     <p:extLst>
       <p:ext uri="{BB962C8B-B14F-4D97-AF65-F5344CB8AC3E}">
-        <p14:creationId xmlns:p14="http://schemas.microsoft.com/office/powerpoint/2010/main" val="2040369853"/>
+        <p14:creationId xmlns:p14="http://schemas.microsoft.com/office/powerpoint/2010/main" val="2321851601"/>
       </p:ext>
     </p:extLst>
   </p:cSld>
@@ -1064,6 +1056,14 @@
           <a:bodyPr/>
           <a:lstStyle/>
           <a:p>
+            <a:r>
+              <a:rPr lang="en-US" altLang="ko-KR" dirty="0"/>
+              <a:t>TODO: Sub-Architecture</a:t>
+            </a:r>
+            <a:r>
+              <a:rPr lang="en-US" altLang="ko-KR" baseline="0" dirty="0"/>
+              <a:t> goes here</a:t>
+            </a:r>
             <a:endParaRPr lang="ko-KR" altLang="en-US" dirty="0"/>
           </a:p>
         </p:txBody>
@@ -1095,7 +1095,7 @@
     </p:spTree>
     <p:extLst>
       <p:ext uri="{BB962C8B-B14F-4D97-AF65-F5344CB8AC3E}">
-        <p14:creationId xmlns:p14="http://schemas.microsoft.com/office/powerpoint/2010/main" val="1158920028"/>
+        <p14:creationId xmlns:p14="http://schemas.microsoft.com/office/powerpoint/2010/main" val="2040369853"/>
       </p:ext>
     </p:extLst>
   </p:cSld>
@@ -1234,6 +1234,18 @@
           <a:bodyPr/>
           <a:lstStyle/>
           <a:p>
+            <a:r>
+              <a:rPr lang="en-US" altLang="ko-KR" dirty="0"/>
+              <a:t>Change</a:t>
+            </a:r>
+            <a:r>
+              <a:rPr lang="en-US" altLang="ko-KR" baseline="0" dirty="0"/>
+              <a:t> </a:t>
+            </a:r>
+            <a:r>
+              <a:rPr lang="en-US" altLang="ko-KR" baseline="0"/>
+              <a:t>the icon, and make the icon green</a:t>
+            </a:r>
             <a:endParaRPr lang="ko-KR" altLang="en-US" dirty="0"/>
           </a:p>
         </p:txBody>
@@ -1265,7 +1277,7 @@
     </p:spTree>
     <p:extLst>
       <p:ext uri="{BB962C8B-B14F-4D97-AF65-F5344CB8AC3E}">
-        <p14:creationId xmlns:p14="http://schemas.microsoft.com/office/powerpoint/2010/main" val="493245506"/>
+        <p14:creationId xmlns:p14="http://schemas.microsoft.com/office/powerpoint/2010/main" val="1873821801"/>
       </p:ext>
     </p:extLst>
   </p:cSld>
@@ -1319,18 +1331,6 @@
           <a:bodyPr/>
           <a:lstStyle/>
           <a:p>
-            <a:r>
-              <a:rPr lang="en-US" altLang="ko-KR" dirty="0"/>
-              <a:t>Change</a:t>
-            </a:r>
-            <a:r>
-              <a:rPr lang="en-US" altLang="ko-KR" baseline="0" dirty="0"/>
-              <a:t> </a:t>
-            </a:r>
-            <a:r>
-              <a:rPr lang="en-US" altLang="ko-KR" baseline="0"/>
-              <a:t>the icon, and make the icon green</a:t>
-            </a:r>
             <a:endParaRPr lang="ko-KR" altLang="en-US" dirty="0"/>
           </a:p>
         </p:txBody>
@@ -1362,7 +1362,7 @@
     </p:spTree>
     <p:extLst>
       <p:ext uri="{BB962C8B-B14F-4D97-AF65-F5344CB8AC3E}">
-        <p14:creationId xmlns:p14="http://schemas.microsoft.com/office/powerpoint/2010/main" val="1873821801"/>
+        <p14:creationId xmlns:p14="http://schemas.microsoft.com/office/powerpoint/2010/main" val="167469824"/>
       </p:ext>
     </p:extLst>
   </p:cSld>
@@ -1447,7 +1447,7 @@
     </p:spTree>
     <p:extLst>
       <p:ext uri="{BB962C8B-B14F-4D97-AF65-F5344CB8AC3E}">
-        <p14:creationId xmlns:p14="http://schemas.microsoft.com/office/powerpoint/2010/main" val="167469824"/>
+        <p14:creationId xmlns:p14="http://schemas.microsoft.com/office/powerpoint/2010/main" val="493245506"/>
       </p:ext>
     </p:extLst>
   </p:cSld>
@@ -7850,6 +7850,202 @@
       </p:grpSpPr>
       <p:sp>
         <p:nvSpPr>
+          <p:cNvPr id="4" name="제목 3"/>
+          <p:cNvSpPr>
+            <a:spLocks noGrp="1"/>
+          </p:cNvSpPr>
+          <p:nvPr>
+            <p:ph type="title"/>
+          </p:nvPr>
+        </p:nvSpPr>
+        <p:spPr>
+          <a:xfrm>
+            <a:off x="457200" y="366780"/>
+            <a:ext cx="8229600" cy="648404"/>
+          </a:xfrm>
+        </p:spPr>
+        <p:txBody>
+          <a:bodyPr/>
+          <a:lstStyle/>
+          <a:p>
+            <a:r>
+              <a:rPr lang="en-US" altLang="ko-KR" dirty="0">
+                <a:latin typeface="+mj-lt"/>
+              </a:rPr>
+              <a:t>Basic Spec</a:t>
+            </a:r>
+            <a:endParaRPr lang="ko-KR" altLang="en-US" dirty="0">
+              <a:latin typeface="+mj-lt"/>
+            </a:endParaRPr>
+          </a:p>
+        </p:txBody>
+      </p:sp>
+      <p:pic>
+        <p:nvPicPr>
+          <p:cNvPr id="7" name="그래픽 6" descr="과녁"/>
+          <p:cNvPicPr>
+            <a:picLocks noChangeAspect="1"/>
+          </p:cNvPicPr>
+          <p:nvPr/>
+        </p:nvPicPr>
+        <p:blipFill>
+          <a:blip r:embed="rId3">
+            <a:extLst>
+              <a:ext uri="{28A0092B-C50C-407E-A947-70E740481C1C}">
+                <a14:useLocalDpi xmlns:a14="http://schemas.microsoft.com/office/drawing/2010/main" val="0"/>
+              </a:ext>
+              <a:ext uri="{96DAC541-7B7A-43D3-8B79-37D633B846F1}">
+                <asvg:svgBlip xmlns:asvg="http://schemas.microsoft.com/office/drawing/2016/SVG/main" r:embed="rId4"/>
+              </a:ext>
+            </a:extLst>
+          </a:blip>
+          <a:stretch>
+            <a:fillRect/>
+          </a:stretch>
+        </p:blipFill>
+        <p:spPr>
+          <a:xfrm>
+            <a:off x="1244991" y="1565030"/>
+            <a:ext cx="1909690" cy="1909690"/>
+          </a:xfrm>
+          <a:prstGeom prst="rect">
+            <a:avLst/>
+          </a:prstGeom>
+        </p:spPr>
+      </p:pic>
+      <p:sp>
+        <p:nvSpPr>
+          <p:cNvPr id="8" name="TextBox 7"/>
+          <p:cNvSpPr txBox="1"/>
+          <p:nvPr/>
+        </p:nvSpPr>
+        <p:spPr>
+          <a:xfrm>
+            <a:off x="3446585" y="2335209"/>
+            <a:ext cx="2371162" cy="461665"/>
+          </a:xfrm>
+          <a:prstGeom prst="rect">
+            <a:avLst/>
+          </a:prstGeom>
+          <a:noFill/>
+        </p:spPr>
+        <p:txBody>
+          <a:bodyPr wrap="none" rtlCol="0">
+            <a:spAutoFit/>
+          </a:bodyPr>
+          <a:lstStyle/>
+          <a:p>
+            <a:r>
+              <a:rPr lang="en-US" altLang="ko-KR" sz="2400" b="1" dirty="0"/>
+              <a:t>&gt;90% accuracy</a:t>
+            </a:r>
+            <a:endParaRPr lang="ko-KR" altLang="en-US" sz="2400" b="1" dirty="0"/>
+          </a:p>
+        </p:txBody>
+      </p:sp>
+      <p:sp>
+        <p:nvSpPr>
+          <p:cNvPr id="9" name="TextBox 8"/>
+          <p:cNvSpPr txBox="1"/>
+          <p:nvPr/>
+        </p:nvSpPr>
+        <p:spPr>
+          <a:xfrm>
+            <a:off x="3446585" y="4381863"/>
+            <a:ext cx="3300904" cy="738664"/>
+          </a:xfrm>
+          <a:prstGeom prst="rect">
+            <a:avLst/>
+          </a:prstGeom>
+          <a:noFill/>
+        </p:spPr>
+        <p:txBody>
+          <a:bodyPr wrap="none" rtlCol="0">
+            <a:spAutoFit/>
+          </a:bodyPr>
+          <a:lstStyle/>
+          <a:p>
+            <a:r>
+              <a:rPr lang="en-US" altLang="ko-KR" sz="2400" b="1" dirty="0"/>
+              <a:t>Respond continuously</a:t>
+            </a:r>
+          </a:p>
+          <a:p>
+            <a:r>
+              <a:rPr lang="en-US" altLang="ko-KR" dirty="0"/>
+              <a:t>by multithreading(Glide API)</a:t>
+            </a:r>
+          </a:p>
+        </p:txBody>
+      </p:sp>
+      <p:pic>
+        <p:nvPicPr>
+          <p:cNvPr id="16" name="그래픽 15" descr="반복"/>
+          <p:cNvPicPr>
+            <a:picLocks noChangeAspect="1"/>
+          </p:cNvPicPr>
+          <p:nvPr/>
+        </p:nvPicPr>
+        <p:blipFill>
+          <a:blip r:embed="rId5">
+            <a:extLst>
+              <a:ext uri="{28A0092B-C50C-407E-A947-70E740481C1C}">
+                <a14:useLocalDpi xmlns:a14="http://schemas.microsoft.com/office/drawing/2010/main" val="0"/>
+              </a:ext>
+              <a:ext uri="{96DAC541-7B7A-43D3-8B79-37D633B846F1}">
+                <asvg:svgBlip xmlns:asvg="http://schemas.microsoft.com/office/drawing/2016/SVG/main" r:embed="rId6"/>
+              </a:ext>
+            </a:extLst>
+          </a:blip>
+          <a:stretch>
+            <a:fillRect/>
+          </a:stretch>
+        </p:blipFill>
+        <p:spPr>
+          <a:xfrm>
+            <a:off x="1324124" y="3829318"/>
+            <a:ext cx="1751423" cy="1751423"/>
+          </a:xfrm>
+          <a:prstGeom prst="rect">
+            <a:avLst/>
+          </a:prstGeom>
+        </p:spPr>
+      </p:pic>
+    </p:spTree>
+    <p:extLst>
+      <p:ext uri="{BB962C8B-B14F-4D97-AF65-F5344CB8AC3E}">
+        <p14:creationId xmlns:p14="http://schemas.microsoft.com/office/powerpoint/2010/main" val="2285308020"/>
+      </p:ext>
+    </p:extLst>
+  </p:cSld>
+  <p:clrMapOvr>
+    <a:masterClrMapping/>
+  </p:clrMapOvr>
+  <p:transition>
+    <p:fade/>
+  </p:transition>
+</p:sld>
+</file>
+
+<file path=ppt/slides/slide11.xml><?xml version="1.0" encoding="utf-8"?>
+<p:sld xmlns:a="http://schemas.openxmlformats.org/drawingml/2006/main" xmlns:r="http://schemas.openxmlformats.org/officeDocument/2006/relationships" xmlns:p="http://schemas.openxmlformats.org/presentationml/2006/main">
+  <p:cSld>
+    <p:spTree>
+      <p:nvGrpSpPr>
+        <p:cNvPr id="1" name=""/>
+        <p:cNvGrpSpPr/>
+        <p:nvPr/>
+      </p:nvGrpSpPr>
+      <p:grpSpPr>
+        <a:xfrm>
+          <a:off x="0" y="0"/>
+          <a:ext cx="0" cy="0"/>
+          <a:chOff x="0" y="0"/>
+          <a:chExt cx="0" cy="0"/>
+        </a:xfrm>
+      </p:grpSpPr>
+      <p:sp>
+        <p:nvSpPr>
           <p:cNvPr id="22" name="TextBox 21"/>
           <p:cNvSpPr txBox="1"/>
           <p:nvPr/>
@@ -7915,7 +8111,7 @@
               <a:rPr lang="en-US" altLang="ko-KR" dirty="0">
                 <a:latin typeface="+mj-lt"/>
               </a:rPr>
-              <a:t>Approach - Application</a:t>
+              <a:t>Basic Spec</a:t>
             </a:r>
             <a:endParaRPr lang="ko-KR" altLang="en-US" dirty="0">
               <a:latin typeface="+mj-lt"/>
@@ -8299,7 +8495,7 @@
 </p:sld>
 </file>
 
-<file path=ppt/slides/slide11.xml><?xml version="1.0" encoding="utf-8"?>
+<file path=ppt/slides/slide12.xml><?xml version="1.0" encoding="utf-8"?>
 <p:sld xmlns:a="http://schemas.openxmlformats.org/drawingml/2006/main" xmlns:r="http://schemas.openxmlformats.org/officeDocument/2006/relationships" xmlns:p="http://schemas.openxmlformats.org/presentationml/2006/main">
   <p:cSld>
     <p:spTree>
@@ -9300,7 +9496,7 @@
 </p:sld>
 </file>
 
-<file path=ppt/slides/slide12.xml><?xml version="1.0" encoding="utf-8"?>
+<file path=ppt/slides/slide13.xml><?xml version="1.0" encoding="utf-8"?>
 <p:sld xmlns:a="http://schemas.openxmlformats.org/drawingml/2006/main" xmlns:r="http://schemas.openxmlformats.org/officeDocument/2006/relationships" xmlns:p="http://schemas.openxmlformats.org/presentationml/2006/main">
   <p:cSld>
     <p:spTree>
@@ -10278,202 +10474,6 @@
 </p:sld>
 </file>
 
-<file path=ppt/slides/slide13.xml><?xml version="1.0" encoding="utf-8"?>
-<p:sld xmlns:a="http://schemas.openxmlformats.org/drawingml/2006/main" xmlns:r="http://schemas.openxmlformats.org/officeDocument/2006/relationships" xmlns:p="http://schemas.openxmlformats.org/presentationml/2006/main">
-  <p:cSld>
-    <p:spTree>
-      <p:nvGrpSpPr>
-        <p:cNvPr id="1" name=""/>
-        <p:cNvGrpSpPr/>
-        <p:nvPr/>
-      </p:nvGrpSpPr>
-      <p:grpSpPr>
-        <a:xfrm>
-          <a:off x="0" y="0"/>
-          <a:ext cx="0" cy="0"/>
-          <a:chOff x="0" y="0"/>
-          <a:chExt cx="0" cy="0"/>
-        </a:xfrm>
-      </p:grpSpPr>
-      <p:sp>
-        <p:nvSpPr>
-          <p:cNvPr id="4" name="제목 3"/>
-          <p:cNvSpPr>
-            <a:spLocks noGrp="1"/>
-          </p:cNvSpPr>
-          <p:nvPr>
-            <p:ph type="title"/>
-          </p:nvPr>
-        </p:nvSpPr>
-        <p:spPr>
-          <a:xfrm>
-            <a:off x="457200" y="366780"/>
-            <a:ext cx="8229600" cy="648404"/>
-          </a:xfrm>
-        </p:spPr>
-        <p:txBody>
-          <a:bodyPr/>
-          <a:lstStyle/>
-          <a:p>
-            <a:r>
-              <a:rPr lang="en-US" altLang="ko-KR" dirty="0">
-                <a:latin typeface="+mj-lt"/>
-              </a:rPr>
-              <a:t>Basic Spec</a:t>
-            </a:r>
-            <a:endParaRPr lang="ko-KR" altLang="en-US" dirty="0">
-              <a:latin typeface="+mj-lt"/>
-            </a:endParaRPr>
-          </a:p>
-        </p:txBody>
-      </p:sp>
-      <p:pic>
-        <p:nvPicPr>
-          <p:cNvPr id="7" name="그래픽 6" descr="과녁"/>
-          <p:cNvPicPr>
-            <a:picLocks noChangeAspect="1"/>
-          </p:cNvPicPr>
-          <p:nvPr/>
-        </p:nvPicPr>
-        <p:blipFill>
-          <a:blip r:embed="rId3">
-            <a:extLst>
-              <a:ext uri="{28A0092B-C50C-407E-A947-70E740481C1C}">
-                <a14:useLocalDpi xmlns:a14="http://schemas.microsoft.com/office/drawing/2010/main" val="0"/>
-              </a:ext>
-              <a:ext uri="{96DAC541-7B7A-43D3-8B79-37D633B846F1}">
-                <asvg:svgBlip xmlns:asvg="http://schemas.microsoft.com/office/drawing/2016/SVG/main" r:embed="rId4"/>
-              </a:ext>
-            </a:extLst>
-          </a:blip>
-          <a:stretch>
-            <a:fillRect/>
-          </a:stretch>
-        </p:blipFill>
-        <p:spPr>
-          <a:xfrm>
-            <a:off x="1244991" y="1565030"/>
-            <a:ext cx="1909690" cy="1909690"/>
-          </a:xfrm>
-          <a:prstGeom prst="rect">
-            <a:avLst/>
-          </a:prstGeom>
-        </p:spPr>
-      </p:pic>
-      <p:sp>
-        <p:nvSpPr>
-          <p:cNvPr id="8" name="TextBox 7"/>
-          <p:cNvSpPr txBox="1"/>
-          <p:nvPr/>
-        </p:nvSpPr>
-        <p:spPr>
-          <a:xfrm>
-            <a:off x="3446585" y="2335209"/>
-            <a:ext cx="2371162" cy="461665"/>
-          </a:xfrm>
-          <a:prstGeom prst="rect">
-            <a:avLst/>
-          </a:prstGeom>
-          <a:noFill/>
-        </p:spPr>
-        <p:txBody>
-          <a:bodyPr wrap="none" rtlCol="0">
-            <a:spAutoFit/>
-          </a:bodyPr>
-          <a:lstStyle/>
-          <a:p>
-            <a:r>
-              <a:rPr lang="en-US" altLang="ko-KR" sz="2400" b="1" dirty="0"/>
-              <a:t>&gt;90% accuracy</a:t>
-            </a:r>
-            <a:endParaRPr lang="ko-KR" altLang="en-US" sz="2400" b="1" dirty="0"/>
-          </a:p>
-        </p:txBody>
-      </p:sp>
-      <p:sp>
-        <p:nvSpPr>
-          <p:cNvPr id="9" name="TextBox 8"/>
-          <p:cNvSpPr txBox="1"/>
-          <p:nvPr/>
-        </p:nvSpPr>
-        <p:spPr>
-          <a:xfrm>
-            <a:off x="3446585" y="4381863"/>
-            <a:ext cx="3300904" cy="738664"/>
-          </a:xfrm>
-          <a:prstGeom prst="rect">
-            <a:avLst/>
-          </a:prstGeom>
-          <a:noFill/>
-        </p:spPr>
-        <p:txBody>
-          <a:bodyPr wrap="none" rtlCol="0">
-            <a:spAutoFit/>
-          </a:bodyPr>
-          <a:lstStyle/>
-          <a:p>
-            <a:r>
-              <a:rPr lang="en-US" altLang="ko-KR" sz="2400" b="1" dirty="0"/>
-              <a:t>Respond continuously</a:t>
-            </a:r>
-          </a:p>
-          <a:p>
-            <a:r>
-              <a:rPr lang="en-US" altLang="ko-KR" dirty="0"/>
-              <a:t>by multithreading(Glide API)</a:t>
-            </a:r>
-          </a:p>
-        </p:txBody>
-      </p:sp>
-      <p:pic>
-        <p:nvPicPr>
-          <p:cNvPr id="16" name="그래픽 15" descr="반복"/>
-          <p:cNvPicPr>
-            <a:picLocks noChangeAspect="1"/>
-          </p:cNvPicPr>
-          <p:nvPr/>
-        </p:nvPicPr>
-        <p:blipFill>
-          <a:blip r:embed="rId5">
-            <a:extLst>
-              <a:ext uri="{28A0092B-C50C-407E-A947-70E740481C1C}">
-                <a14:useLocalDpi xmlns:a14="http://schemas.microsoft.com/office/drawing/2010/main" val="0"/>
-              </a:ext>
-              <a:ext uri="{96DAC541-7B7A-43D3-8B79-37D633B846F1}">
-                <asvg:svgBlip xmlns:asvg="http://schemas.microsoft.com/office/drawing/2016/SVG/main" r:embed="rId6"/>
-              </a:ext>
-            </a:extLst>
-          </a:blip>
-          <a:stretch>
-            <a:fillRect/>
-          </a:stretch>
-        </p:blipFill>
-        <p:spPr>
-          <a:xfrm>
-            <a:off x="1324124" y="3829318"/>
-            <a:ext cx="1751423" cy="1751423"/>
-          </a:xfrm>
-          <a:prstGeom prst="rect">
-            <a:avLst/>
-          </a:prstGeom>
-        </p:spPr>
-      </p:pic>
-    </p:spTree>
-    <p:extLst>
-      <p:ext uri="{BB962C8B-B14F-4D97-AF65-F5344CB8AC3E}">
-        <p14:creationId xmlns:p14="http://schemas.microsoft.com/office/powerpoint/2010/main" val="2285308020"/>
-      </p:ext>
-    </p:extLst>
-  </p:cSld>
-  <p:clrMapOvr>
-    <a:masterClrMapping/>
-  </p:clrMapOvr>
-  <p:transition>
-    <p:fade/>
-  </p:transition>
-</p:sld>
-</file>
-
 <file path=ppt/slides/slide14.xml><?xml version="1.0" encoding="utf-8"?>
 <p:sld xmlns:a="http://schemas.openxmlformats.org/drawingml/2006/main" xmlns:r="http://schemas.openxmlformats.org/officeDocument/2006/relationships" xmlns:p="http://schemas.openxmlformats.org/presentationml/2006/main">
   <p:cSld>
@@ -10513,6 +10513,835 @@
           <a:p>
             <a:r>
               <a:rPr lang="en-US" altLang="ko-KR" dirty="0"/>
+              <a:t>Current Status</a:t>
+            </a:r>
+            <a:endParaRPr lang="ko-KR" altLang="en-US" dirty="0"/>
+          </a:p>
+        </p:txBody>
+      </p:sp>
+      <p:pic>
+        <p:nvPicPr>
+          <p:cNvPr id="5" name="Picture 4"/>
+          <p:cNvPicPr>
+            <a:picLocks noChangeAspect="1"/>
+          </p:cNvPicPr>
+          <p:nvPr/>
+        </p:nvPicPr>
+        <p:blipFill rotWithShape="1">
+          <a:blip r:embed="rId3" cstate="print">
+            <a:duotone>
+              <a:schemeClr val="accent2">
+                <a:shade val="45000"/>
+                <a:satMod val="135000"/>
+              </a:schemeClr>
+              <a:prstClr val="white"/>
+            </a:duotone>
+            <a:extLst>
+              <a:ext uri="{28A0092B-C50C-407E-A947-70E740481C1C}">
+                <a14:useLocalDpi xmlns:a14="http://schemas.microsoft.com/office/drawing/2010/main" val="0"/>
+              </a:ext>
+            </a:extLst>
+          </a:blip>
+          <a:srcRect l="4326" r="6312" b="13759"/>
+          <a:stretch/>
+        </p:blipFill>
+        <p:spPr>
+          <a:xfrm>
+            <a:off x="1421400" y="1550243"/>
+            <a:ext cx="1846218" cy="1781747"/>
+          </a:xfrm>
+          <a:prstGeom prst="rect">
+            <a:avLst/>
+          </a:prstGeom>
+        </p:spPr>
+      </p:pic>
+      <p:pic>
+        <p:nvPicPr>
+          <p:cNvPr id="7" name="Picture 6"/>
+          <p:cNvPicPr>
+            <a:picLocks noChangeAspect="1"/>
+          </p:cNvPicPr>
+          <p:nvPr/>
+        </p:nvPicPr>
+        <p:blipFill rotWithShape="1">
+          <a:blip r:embed="rId4" cstate="print">
+            <a:clrChange>
+              <a:clrFrom>
+                <a:srgbClr val="000000">
+                  <a:alpha val="0"/>
+                </a:srgbClr>
+              </a:clrFrom>
+              <a:clrTo>
+                <a:srgbClr val="000000">
+                  <a:alpha val="0"/>
+                </a:srgbClr>
+              </a:clrTo>
+            </a:clrChange>
+            <a:alphaModFix/>
+            <a:duotone>
+              <a:schemeClr val="accent2">
+                <a:shade val="45000"/>
+                <a:satMod val="135000"/>
+              </a:schemeClr>
+              <a:prstClr val="white"/>
+            </a:duotone>
+            <a:extLst>
+              <a:ext uri="{28A0092B-C50C-407E-A947-70E740481C1C}">
+                <a14:useLocalDpi xmlns:a14="http://schemas.microsoft.com/office/drawing/2010/main" val="0"/>
+              </a:ext>
+            </a:extLst>
+          </a:blip>
+          <a:srcRect b="15146"/>
+          <a:stretch/>
+        </p:blipFill>
+        <p:spPr>
+          <a:xfrm>
+            <a:off x="1223207" y="3854996"/>
+            <a:ext cx="1931474" cy="1638936"/>
+          </a:xfrm>
+          <a:prstGeom prst="rect">
+            <a:avLst/>
+          </a:prstGeom>
+        </p:spPr>
+      </p:pic>
+      <p:sp>
+        <p:nvSpPr>
+          <p:cNvPr id="10" name="TextBox 9"/>
+          <p:cNvSpPr txBox="1"/>
+          <p:nvPr/>
+        </p:nvSpPr>
+        <p:spPr>
+          <a:xfrm>
+            <a:off x="3590689" y="3842246"/>
+            <a:ext cx="3538148" cy="1785104"/>
+          </a:xfrm>
+          <a:prstGeom prst="rect">
+            <a:avLst/>
+          </a:prstGeom>
+          <a:noFill/>
+        </p:spPr>
+        <p:txBody>
+          <a:bodyPr wrap="none" rtlCol="0">
+            <a:spAutoFit/>
+          </a:bodyPr>
+          <a:lstStyle/>
+          <a:p>
+            <a:pPr>
+              <a:lnSpc>
+                <a:spcPts val="3300"/>
+              </a:lnSpc>
+            </a:pPr>
+            <a:r>
+              <a:rPr lang="ko-KR" altLang="en-US" sz="2400" b="1" dirty="0"/>
+              <a:t>면담</a:t>
+            </a:r>
+            <a:endParaRPr lang="en-US" altLang="ko-KR" sz="2400" b="1" dirty="0"/>
+          </a:p>
+          <a:p>
+            <a:pPr marL="285750" indent="-285750">
+              <a:lnSpc>
+                <a:spcPts val="3300"/>
+              </a:lnSpc>
+              <a:buFontTx/>
+              <a:buChar char="-"/>
+            </a:pPr>
+            <a:r>
+              <a:rPr lang="en-US" altLang="ko-KR" dirty="0"/>
+              <a:t>AR</a:t>
+            </a:r>
+            <a:r>
+              <a:rPr lang="ko-KR" altLang="en-US" dirty="0"/>
+              <a:t> </a:t>
+            </a:r>
+            <a:r>
+              <a:rPr lang="en-US" altLang="ko-KR" dirty="0"/>
+              <a:t>Player </a:t>
+            </a:r>
+            <a:r>
+              <a:rPr lang="ko-KR" altLang="en-US" dirty="0"/>
+              <a:t>형식</a:t>
+            </a:r>
+            <a:r>
+              <a:rPr lang="en-US" altLang="ko-KR" dirty="0"/>
+              <a:t>,</a:t>
+            </a:r>
+            <a:r>
+              <a:rPr lang="ko-KR" altLang="en-US" dirty="0"/>
+              <a:t> 웹툰 원고</a:t>
+            </a:r>
+            <a:r>
+              <a:rPr lang="en-US" altLang="ko-KR" dirty="0"/>
+              <a:t> </a:t>
+            </a:r>
+            <a:r>
+              <a:rPr lang="ko-KR" altLang="en-US" dirty="0"/>
+              <a:t>선정</a:t>
+            </a:r>
+            <a:endParaRPr lang="en-US" altLang="ko-KR" dirty="0"/>
+          </a:p>
+          <a:p>
+            <a:pPr marL="285750" indent="-285750">
+              <a:lnSpc>
+                <a:spcPts val="3300"/>
+              </a:lnSpc>
+              <a:buFontTx/>
+              <a:buChar char="-"/>
+            </a:pPr>
+            <a:r>
+              <a:rPr lang="en-US" altLang="ko-KR" dirty="0"/>
+              <a:t>Study </a:t>
+            </a:r>
+            <a:r>
+              <a:rPr lang="ko-KR" altLang="en-US" dirty="0"/>
+              <a:t>분야 분담</a:t>
+            </a:r>
+            <a:endParaRPr lang="en-US" altLang="ko-KR" dirty="0"/>
+          </a:p>
+          <a:p>
+            <a:pPr marL="285750" indent="-285750">
+              <a:lnSpc>
+                <a:spcPts val="3300"/>
+              </a:lnSpc>
+              <a:buFontTx/>
+              <a:buChar char="-"/>
+            </a:pPr>
+            <a:r>
+              <a:rPr lang="ko-KR" altLang="en-US" dirty="0"/>
+              <a:t>메신저와 </a:t>
+            </a:r>
+            <a:r>
+              <a:rPr lang="en-US" altLang="ko-KR" dirty="0"/>
+              <a:t>GitHub</a:t>
+            </a:r>
+            <a:r>
+              <a:rPr lang="ko-KR" altLang="en-US" dirty="0"/>
+              <a:t>를 통한 소통</a:t>
+            </a:r>
+            <a:endParaRPr lang="en-US" altLang="ko-KR" dirty="0"/>
+          </a:p>
+        </p:txBody>
+      </p:sp>
+      <p:sp>
+        <p:nvSpPr>
+          <p:cNvPr id="12" name="TextBox 11"/>
+          <p:cNvSpPr txBox="1"/>
+          <p:nvPr/>
+        </p:nvSpPr>
+        <p:spPr>
+          <a:xfrm>
+            <a:off x="3559706" y="1573853"/>
+            <a:ext cx="3609321" cy="1361911"/>
+          </a:xfrm>
+          <a:prstGeom prst="rect">
+            <a:avLst/>
+          </a:prstGeom>
+          <a:noFill/>
+        </p:spPr>
+        <p:txBody>
+          <a:bodyPr wrap="none" rtlCol="0">
+            <a:spAutoFit/>
+          </a:bodyPr>
+          <a:lstStyle/>
+          <a:p>
+            <a:pPr>
+              <a:lnSpc>
+                <a:spcPts val="3300"/>
+              </a:lnSpc>
+            </a:pPr>
+            <a:r>
+              <a:rPr lang="ko-KR" altLang="en-US" sz="2400" b="1" dirty="0"/>
+              <a:t>스터디</a:t>
+            </a:r>
+            <a:endParaRPr lang="en-US" altLang="ko-KR" sz="2400" b="1" dirty="0"/>
+          </a:p>
+          <a:p>
+            <a:pPr marL="285750" indent="-285750">
+              <a:lnSpc>
+                <a:spcPts val="3300"/>
+              </a:lnSpc>
+              <a:buFontTx/>
+              <a:buChar char="-"/>
+            </a:pPr>
+            <a:r>
+              <a:rPr lang="en-US" altLang="ko-KR" dirty="0" err="1"/>
+              <a:t>TensorFlow</a:t>
+            </a:r>
+            <a:r>
+              <a:rPr lang="en-US" altLang="ko-KR" dirty="0"/>
+              <a:t>: Terms, MNIST,</a:t>
+            </a:r>
+            <a:r>
+              <a:rPr lang="ko-KR" altLang="en-US" dirty="0"/>
+              <a:t> </a:t>
+            </a:r>
+            <a:r>
+              <a:rPr lang="mr-IN" altLang="ko-KR" dirty="0"/>
+              <a:t>…</a:t>
+            </a:r>
+            <a:endParaRPr lang="en-US" altLang="ko-KR" dirty="0"/>
+          </a:p>
+          <a:p>
+            <a:pPr marL="285750" indent="-285750">
+              <a:lnSpc>
+                <a:spcPts val="3300"/>
+              </a:lnSpc>
+              <a:buFontTx/>
+              <a:buChar char="-"/>
+            </a:pPr>
+            <a:r>
+              <a:rPr lang="en-US" altLang="ko-KR" dirty="0"/>
+              <a:t>Android: Android API, </a:t>
+            </a:r>
+            <a:r>
+              <a:rPr lang="mr-IN" altLang="ko-KR" dirty="0"/>
+              <a:t>…</a:t>
+            </a:r>
+            <a:endParaRPr lang="en-US" altLang="ko-KR" dirty="0"/>
+          </a:p>
+        </p:txBody>
+      </p:sp>
+    </p:spTree>
+    <p:extLst>
+      <p:ext uri="{BB962C8B-B14F-4D97-AF65-F5344CB8AC3E}">
+        <p14:creationId xmlns:p14="http://schemas.microsoft.com/office/powerpoint/2010/main" val="1496718616"/>
+      </p:ext>
+    </p:extLst>
+  </p:cSld>
+  <p:clrMapOvr>
+    <a:masterClrMapping/>
+  </p:clrMapOvr>
+  <p:transition>
+    <p:fade/>
+  </p:transition>
+</p:sld>
+</file>
+
+<file path=ppt/slides/slide15.xml><?xml version="1.0" encoding="utf-8"?>
+<p:sld xmlns:a="http://schemas.openxmlformats.org/drawingml/2006/main" xmlns:r="http://schemas.openxmlformats.org/officeDocument/2006/relationships" xmlns:p="http://schemas.openxmlformats.org/presentationml/2006/main">
+  <p:cSld>
+    <p:spTree>
+      <p:nvGrpSpPr>
+        <p:cNvPr id="1" name=""/>
+        <p:cNvGrpSpPr/>
+        <p:nvPr/>
+      </p:nvGrpSpPr>
+      <p:grpSpPr>
+        <a:xfrm>
+          <a:off x="0" y="0"/>
+          <a:ext cx="0" cy="0"/>
+          <a:chOff x="0" y="0"/>
+          <a:chExt cx="0" cy="0"/>
+        </a:xfrm>
+      </p:grpSpPr>
+      <p:sp>
+        <p:nvSpPr>
+          <p:cNvPr id="4" name="제목 3"/>
+          <p:cNvSpPr>
+            <a:spLocks noGrp="1"/>
+          </p:cNvSpPr>
+          <p:nvPr>
+            <p:ph type="title"/>
+          </p:nvPr>
+        </p:nvSpPr>
+        <p:spPr>
+          <a:xfrm>
+            <a:off x="457200" y="366780"/>
+            <a:ext cx="8229600" cy="648404"/>
+          </a:xfrm>
+        </p:spPr>
+        <p:txBody>
+          <a:bodyPr/>
+          <a:lstStyle/>
+          <a:p>
+            <a:r>
+              <a:rPr lang="en-US" altLang="ko-KR" dirty="0"/>
+              <a:t>Further Plan</a:t>
+            </a:r>
+            <a:endParaRPr lang="ko-KR" altLang="en-US" dirty="0"/>
+          </a:p>
+        </p:txBody>
+      </p:sp>
+      <p:cxnSp>
+        <p:nvCxnSpPr>
+          <p:cNvPr id="10" name="직선 연결선 9"/>
+          <p:cNvCxnSpPr/>
+          <p:nvPr/>
+        </p:nvCxnSpPr>
+        <p:spPr>
+          <a:xfrm flipH="1">
+            <a:off x="1192945" y="1944909"/>
+            <a:ext cx="2" cy="3931477"/>
+          </a:xfrm>
+          <a:prstGeom prst="line">
+            <a:avLst/>
+          </a:prstGeom>
+          <a:ln w="38100">
+            <a:solidFill>
+              <a:schemeClr val="tx1">
+                <a:lumMod val="50000"/>
+                <a:lumOff val="50000"/>
+              </a:schemeClr>
+            </a:solidFill>
+          </a:ln>
+        </p:spPr>
+        <p:style>
+          <a:lnRef idx="1">
+            <a:schemeClr val="accent1"/>
+          </a:lnRef>
+          <a:fillRef idx="0">
+            <a:schemeClr val="accent1"/>
+          </a:fillRef>
+          <a:effectRef idx="0">
+            <a:schemeClr val="accent1"/>
+          </a:effectRef>
+          <a:fontRef idx="minor">
+            <a:schemeClr val="tx1"/>
+          </a:fontRef>
+        </p:style>
+      </p:cxnSp>
+      <p:sp>
+        <p:nvSpPr>
+          <p:cNvPr id="6" name="타원 5"/>
+          <p:cNvSpPr/>
+          <p:nvPr/>
+        </p:nvSpPr>
+        <p:spPr>
+          <a:xfrm>
+            <a:off x="803538" y="1564143"/>
+            <a:ext cx="761533" cy="761533"/>
+          </a:xfrm>
+          <a:prstGeom prst="ellipse">
+            <a:avLst/>
+          </a:prstGeom>
+          <a:solidFill>
+            <a:schemeClr val="bg1"/>
+          </a:solidFill>
+          <a:ln w="38100">
+            <a:solidFill>
+              <a:srgbClr val="00B050"/>
+            </a:solidFill>
+          </a:ln>
+        </p:spPr>
+        <p:style>
+          <a:lnRef idx="2">
+            <a:schemeClr val="accent1">
+              <a:shade val="50000"/>
+            </a:schemeClr>
+          </a:lnRef>
+          <a:fillRef idx="1">
+            <a:schemeClr val="accent1"/>
+          </a:fillRef>
+          <a:effectRef idx="0">
+            <a:schemeClr val="accent1"/>
+          </a:effectRef>
+          <a:fontRef idx="minor">
+            <a:schemeClr val="lt1"/>
+          </a:fontRef>
+        </p:style>
+        <p:txBody>
+          <a:bodyPr rtlCol="0" anchor="ctr"/>
+          <a:lstStyle/>
+          <a:p>
+            <a:pPr algn="ctr"/>
+            <a:endParaRPr lang="ko-KR" altLang="en-US" spc="80" dirty="0">
+              <a:solidFill>
+                <a:schemeClr val="bg1"/>
+              </a:solidFill>
+              <a:latin typeface="나눔고딕" pitchFamily="50" charset="-127"/>
+              <a:ea typeface="나눔고딕" pitchFamily="50" charset="-127"/>
+            </a:endParaRPr>
+          </a:p>
+        </p:txBody>
+      </p:sp>
+      <p:sp>
+        <p:nvSpPr>
+          <p:cNvPr id="7" name="타원 6"/>
+          <p:cNvSpPr/>
+          <p:nvPr/>
+        </p:nvSpPr>
+        <p:spPr>
+          <a:xfrm>
+            <a:off x="803537" y="2874636"/>
+            <a:ext cx="761533" cy="761533"/>
+          </a:xfrm>
+          <a:prstGeom prst="ellipse">
+            <a:avLst/>
+          </a:prstGeom>
+          <a:solidFill>
+            <a:schemeClr val="bg1"/>
+          </a:solidFill>
+          <a:ln w="38100">
+            <a:solidFill>
+              <a:srgbClr val="00B050"/>
+            </a:solidFill>
+          </a:ln>
+        </p:spPr>
+        <p:style>
+          <a:lnRef idx="2">
+            <a:schemeClr val="accent1">
+              <a:shade val="50000"/>
+            </a:schemeClr>
+          </a:lnRef>
+          <a:fillRef idx="1">
+            <a:schemeClr val="accent1"/>
+          </a:fillRef>
+          <a:effectRef idx="0">
+            <a:schemeClr val="accent1"/>
+          </a:effectRef>
+          <a:fontRef idx="minor">
+            <a:schemeClr val="lt1"/>
+          </a:fontRef>
+        </p:style>
+        <p:txBody>
+          <a:bodyPr rtlCol="0" anchor="ctr"/>
+          <a:lstStyle/>
+          <a:p>
+            <a:pPr algn="ctr"/>
+            <a:endParaRPr lang="ko-KR" altLang="en-US" spc="80" dirty="0">
+              <a:solidFill>
+                <a:schemeClr val="bg1"/>
+              </a:solidFill>
+              <a:latin typeface="나눔고딕" pitchFamily="50" charset="-127"/>
+              <a:ea typeface="나눔고딕" pitchFamily="50" charset="-127"/>
+            </a:endParaRPr>
+          </a:p>
+        </p:txBody>
+      </p:sp>
+      <p:sp>
+        <p:nvSpPr>
+          <p:cNvPr id="8" name="타원 7"/>
+          <p:cNvSpPr/>
+          <p:nvPr/>
+        </p:nvSpPr>
+        <p:spPr>
+          <a:xfrm>
+            <a:off x="803536" y="4185128"/>
+            <a:ext cx="761533" cy="761533"/>
+          </a:xfrm>
+          <a:prstGeom prst="ellipse">
+            <a:avLst/>
+          </a:prstGeom>
+          <a:solidFill>
+            <a:schemeClr val="bg1"/>
+          </a:solidFill>
+          <a:ln w="38100">
+            <a:solidFill>
+              <a:srgbClr val="00B050"/>
+            </a:solidFill>
+          </a:ln>
+        </p:spPr>
+        <p:style>
+          <a:lnRef idx="2">
+            <a:schemeClr val="accent1">
+              <a:shade val="50000"/>
+            </a:schemeClr>
+          </a:lnRef>
+          <a:fillRef idx="1">
+            <a:schemeClr val="accent1"/>
+          </a:fillRef>
+          <a:effectRef idx="0">
+            <a:schemeClr val="accent1"/>
+          </a:effectRef>
+          <a:fontRef idx="minor">
+            <a:schemeClr val="lt1"/>
+          </a:fontRef>
+        </p:style>
+        <p:txBody>
+          <a:bodyPr rtlCol="0" anchor="ctr"/>
+          <a:lstStyle/>
+          <a:p>
+            <a:pPr algn="ctr"/>
+            <a:endParaRPr lang="ko-KR" altLang="en-US" spc="80" dirty="0">
+              <a:solidFill>
+                <a:schemeClr val="bg1"/>
+              </a:solidFill>
+              <a:latin typeface="나눔고딕" pitchFamily="50" charset="-127"/>
+              <a:ea typeface="나눔고딕" pitchFamily="50" charset="-127"/>
+            </a:endParaRPr>
+          </a:p>
+        </p:txBody>
+      </p:sp>
+      <p:sp>
+        <p:nvSpPr>
+          <p:cNvPr id="9" name="타원 7"/>
+          <p:cNvSpPr/>
+          <p:nvPr/>
+        </p:nvSpPr>
+        <p:spPr>
+          <a:xfrm>
+            <a:off x="803536" y="5495620"/>
+            <a:ext cx="761533" cy="761533"/>
+          </a:xfrm>
+          <a:prstGeom prst="ellipse">
+            <a:avLst/>
+          </a:prstGeom>
+          <a:solidFill>
+            <a:schemeClr val="bg1"/>
+          </a:solidFill>
+          <a:ln w="38100">
+            <a:solidFill>
+              <a:srgbClr val="00B050"/>
+            </a:solidFill>
+          </a:ln>
+        </p:spPr>
+        <p:style>
+          <a:lnRef idx="2">
+            <a:schemeClr val="accent1">
+              <a:shade val="50000"/>
+            </a:schemeClr>
+          </a:lnRef>
+          <a:fillRef idx="1">
+            <a:schemeClr val="accent1"/>
+          </a:fillRef>
+          <a:effectRef idx="0">
+            <a:schemeClr val="accent1"/>
+          </a:effectRef>
+          <a:fontRef idx="minor">
+            <a:schemeClr val="lt1"/>
+          </a:fontRef>
+        </p:style>
+        <p:txBody>
+          <a:bodyPr rtlCol="0" anchor="ctr"/>
+          <a:lstStyle/>
+          <a:p>
+            <a:pPr algn="ctr"/>
+            <a:endParaRPr lang="ko-KR" altLang="en-US" spc="80" dirty="0">
+              <a:solidFill>
+                <a:schemeClr val="bg1"/>
+              </a:solidFill>
+              <a:latin typeface="나눔고딕" pitchFamily="50" charset="-127"/>
+              <a:ea typeface="나눔고딕" pitchFamily="50" charset="-127"/>
+            </a:endParaRPr>
+          </a:p>
+        </p:txBody>
+      </p:sp>
+      <p:sp>
+        <p:nvSpPr>
+          <p:cNvPr id="11" name="TextBox 10"/>
+          <p:cNvSpPr txBox="1"/>
+          <p:nvPr/>
+        </p:nvSpPr>
+        <p:spPr>
+          <a:xfrm>
+            <a:off x="1740470" y="1714076"/>
+            <a:ext cx="5886015" cy="461665"/>
+          </a:xfrm>
+          <a:prstGeom prst="rect">
+            <a:avLst/>
+          </a:prstGeom>
+          <a:noFill/>
+        </p:spPr>
+        <p:txBody>
+          <a:bodyPr wrap="square" rtlCol="0">
+            <a:spAutoFit/>
+          </a:bodyPr>
+          <a:lstStyle/>
+          <a:p>
+            <a:r>
+              <a:rPr lang="en-US" altLang="ko-KR" sz="2400" dirty="0" err="1"/>
+              <a:t>TensorFlow</a:t>
+            </a:r>
+            <a:r>
+              <a:rPr lang="ko-KR" altLang="en-US" sz="2400" dirty="0"/>
+              <a:t> </a:t>
+            </a:r>
+            <a:r>
+              <a:rPr lang="en-US" altLang="ko-KR" dirty="0"/>
+              <a:t>CNN, Training Datasets, </a:t>
+            </a:r>
+            <a:r>
+              <a:rPr lang="mr-IN" altLang="ko-KR" dirty="0"/>
+              <a:t>…</a:t>
+            </a:r>
+            <a:endParaRPr lang="ko-KR" altLang="en-US" dirty="0"/>
+          </a:p>
+        </p:txBody>
+      </p:sp>
+      <p:sp>
+        <p:nvSpPr>
+          <p:cNvPr id="13" name="TextBox 12"/>
+          <p:cNvSpPr txBox="1"/>
+          <p:nvPr/>
+        </p:nvSpPr>
+        <p:spPr>
+          <a:xfrm>
+            <a:off x="1740470" y="3024569"/>
+            <a:ext cx="5516364" cy="461665"/>
+          </a:xfrm>
+          <a:prstGeom prst="rect">
+            <a:avLst/>
+          </a:prstGeom>
+          <a:noFill/>
+        </p:spPr>
+        <p:txBody>
+          <a:bodyPr wrap="square" rtlCol="0">
+            <a:spAutoFit/>
+          </a:bodyPr>
+          <a:lstStyle/>
+          <a:p>
+            <a:r>
+              <a:rPr lang="en-US" altLang="ko-KR" sz="2400" dirty="0"/>
+              <a:t>Android</a:t>
+            </a:r>
+            <a:r>
+              <a:rPr lang="ko-KR" altLang="en-US" sz="2400" dirty="0"/>
+              <a:t> </a:t>
+            </a:r>
+            <a:r>
+              <a:rPr lang="en-US" altLang="ko-KR" dirty="0" err="1"/>
+              <a:t>RecyclerView</a:t>
+            </a:r>
+            <a:r>
+              <a:rPr lang="en-US" altLang="ko-KR" dirty="0"/>
+              <a:t>, Activity Life Cycle, </a:t>
+            </a:r>
+            <a:r>
+              <a:rPr lang="mr-IN" altLang="ko-KR" dirty="0"/>
+              <a:t>…</a:t>
+            </a:r>
+            <a:endParaRPr lang="ko-KR" altLang="en-US" dirty="0"/>
+          </a:p>
+        </p:txBody>
+      </p:sp>
+      <p:sp>
+        <p:nvSpPr>
+          <p:cNvPr id="14" name="TextBox 13"/>
+          <p:cNvSpPr txBox="1"/>
+          <p:nvPr/>
+        </p:nvSpPr>
+        <p:spPr>
+          <a:xfrm>
+            <a:off x="1740470" y="4335061"/>
+            <a:ext cx="4824551" cy="461665"/>
+          </a:xfrm>
+          <a:prstGeom prst="rect">
+            <a:avLst/>
+          </a:prstGeom>
+          <a:noFill/>
+        </p:spPr>
+        <p:txBody>
+          <a:bodyPr wrap="square" rtlCol="0">
+            <a:spAutoFit/>
+          </a:bodyPr>
+          <a:lstStyle/>
+          <a:p>
+            <a:r>
+              <a:rPr lang="en-US" altLang="ko-KR" sz="2400" dirty="0"/>
+              <a:t>Graphics</a:t>
+            </a:r>
+            <a:r>
+              <a:rPr lang="ko-KR" altLang="en-US" sz="2400" dirty="0"/>
+              <a:t> </a:t>
+            </a:r>
+            <a:r>
+              <a:rPr lang="en-US" altLang="ko-KR" dirty="0" err="1"/>
+              <a:t>openGL</a:t>
+            </a:r>
+            <a:r>
+              <a:rPr lang="en-US" altLang="ko-KR" dirty="0"/>
+              <a:t>, Glide, </a:t>
+            </a:r>
+            <a:r>
+              <a:rPr lang="mr-IN" altLang="ko-KR" dirty="0"/>
+              <a:t>…</a:t>
+            </a:r>
+            <a:endParaRPr lang="ko-KR" altLang="en-US" dirty="0"/>
+          </a:p>
+        </p:txBody>
+      </p:sp>
+      <p:sp>
+        <p:nvSpPr>
+          <p:cNvPr id="15" name="TextBox 14"/>
+          <p:cNvSpPr txBox="1"/>
+          <p:nvPr/>
+        </p:nvSpPr>
+        <p:spPr>
+          <a:xfrm>
+            <a:off x="1740469" y="5645553"/>
+            <a:ext cx="4824551" cy="461665"/>
+          </a:xfrm>
+          <a:prstGeom prst="rect">
+            <a:avLst/>
+          </a:prstGeom>
+          <a:noFill/>
+        </p:spPr>
+        <p:txBody>
+          <a:bodyPr wrap="square" rtlCol="0">
+            <a:spAutoFit/>
+          </a:bodyPr>
+          <a:lstStyle/>
+          <a:p>
+            <a:r>
+              <a:rPr lang="en-US" altLang="ko-KR" sz="2400" dirty="0"/>
+              <a:t>Database </a:t>
+            </a:r>
+            <a:r>
+              <a:rPr lang="en-US" altLang="ko-KR" dirty="0"/>
+              <a:t>SQLite, realm, </a:t>
+            </a:r>
+            <a:r>
+              <a:rPr lang="mr-IN" altLang="ko-KR" dirty="0"/>
+              <a:t>…</a:t>
+            </a:r>
+            <a:endParaRPr lang="ko-KR" altLang="en-US" dirty="0"/>
+          </a:p>
+        </p:txBody>
+      </p:sp>
+    </p:spTree>
+    <p:extLst>
+      <p:ext uri="{BB962C8B-B14F-4D97-AF65-F5344CB8AC3E}">
+        <p14:creationId xmlns:p14="http://schemas.microsoft.com/office/powerpoint/2010/main" val="475326152"/>
+      </p:ext>
+    </p:extLst>
+  </p:cSld>
+  <p:clrMapOvr>
+    <a:masterClrMapping/>
+  </p:clrMapOvr>
+  <p:transition>
+    <p:fade/>
+  </p:transition>
+</p:sld>
+</file>
+
+<file path=ppt/slides/slide16.xml><?xml version="1.0" encoding="utf-8"?>
+<p:sld xmlns:a="http://schemas.openxmlformats.org/drawingml/2006/main" xmlns:r="http://schemas.openxmlformats.org/officeDocument/2006/relationships" xmlns:p="http://schemas.openxmlformats.org/presentationml/2006/main">
+  <p:cSld>
+    <p:spTree>
+      <p:nvGrpSpPr>
+        <p:cNvPr id="1" name=""/>
+        <p:cNvGrpSpPr/>
+        <p:nvPr/>
+      </p:nvGrpSpPr>
+      <p:grpSpPr>
+        <a:xfrm>
+          <a:off x="0" y="0"/>
+          <a:ext cx="0" cy="0"/>
+          <a:chOff x="0" y="0"/>
+          <a:chExt cx="0" cy="0"/>
+        </a:xfrm>
+      </p:grpSpPr>
+      <p:sp>
+        <p:nvSpPr>
+          <p:cNvPr id="4" name="제목 3"/>
+          <p:cNvSpPr>
+            <a:spLocks noGrp="1"/>
+          </p:cNvSpPr>
+          <p:nvPr>
+            <p:ph type="title"/>
+          </p:nvPr>
+        </p:nvSpPr>
+        <p:spPr>
+          <a:xfrm>
+            <a:off x="457200" y="366780"/>
+            <a:ext cx="8229600" cy="648404"/>
+          </a:xfrm>
+        </p:spPr>
+        <p:txBody>
+          <a:bodyPr/>
+          <a:lstStyle/>
+          <a:p>
+            <a:r>
+              <a:rPr lang="en-US" altLang="ko-KR" dirty="0"/>
               <a:t>Division and Assignment of Work</a:t>
             </a:r>
             <a:endParaRPr lang="ko-KR" altLang="en-US" dirty="0"/>
@@ -10531,8 +11360,8 @@
         </p:nvSpPr>
         <p:spPr bwMode="auto">
           <a:xfrm>
-            <a:off x="894525" y="1340165"/>
-            <a:ext cx="7212231" cy="1471557"/>
+            <a:off x="894525" y="1562982"/>
+            <a:ext cx="7212231" cy="1025922"/>
           </a:xfrm>
           <a:prstGeom prst="rect">
             <a:avLst/>
@@ -10675,48 +11504,6 @@
               </a:solidFill>
               <a:latin typeface="Arial" panose="020B0604020202020204" pitchFamily="34" charset="0"/>
               <a:cs typeface="Arial" panose="020B0604020202020204" pitchFamily="34" charset="0"/>
-            </a:endParaRPr>
-          </a:p>
-          <a:p>
-            <a:pPr marR="0" lvl="0" algn="l" defTabSz="914400" rtl="0" eaLnBrk="0" fontAlgn="base" latinLnBrk="0" hangingPunct="0">
-              <a:lnSpc>
-                <a:spcPts val="4000"/>
-              </a:lnSpc>
-              <a:spcBef>
-                <a:spcPct val="0"/>
-              </a:spcBef>
-              <a:spcAft>
-                <a:spcPct val="0"/>
-              </a:spcAft>
-              <a:buClrTx/>
-              <a:buSzTx/>
-              <a:buFontTx/>
-              <a:buChar char="-"/>
-              <a:tabLst/>
-            </a:pPr>
-            <a:r>
-              <a:rPr kumimoji="0" lang="ko-KR" altLang="en-US" sz="2000" b="0" i="0" u="none" strike="noStrike" cap="none" normalizeH="0" baseline="0" dirty="0">
-                <a:ln>
-                  <a:noFill/>
-                </a:ln>
-                <a:solidFill>
-                  <a:srgbClr val="000000"/>
-                </a:solidFill>
-                <a:effectLst/>
-                <a:latin typeface="Arial" panose="020B0604020202020204" pitchFamily="34" charset="0"/>
-                <a:cs typeface="Arial" panose="020B0604020202020204" pitchFamily="34" charset="0"/>
-              </a:rPr>
-              <a:t>하위 분야는 상황에 따라 분담</a:t>
-            </a:r>
-            <a:endParaRPr kumimoji="0" lang="ko-KR" altLang="ko-KR" sz="4800" b="0" i="0" u="none" strike="noStrike" cap="none" normalizeH="0" baseline="0" dirty="0">
-              <a:ln>
-                <a:noFill/>
-              </a:ln>
-              <a:solidFill>
-                <a:schemeClr val="tx1"/>
-              </a:solidFill>
-              <a:effectLst/>
-              <a:latin typeface="Arial" panose="020B0604020202020204" pitchFamily="34" charset="0"/>
             </a:endParaRPr>
           </a:p>
         </p:txBody>
@@ -10917,8 +11704,8 @@
           </p:nvSpPr>
           <p:spPr>
             <a:xfrm>
-              <a:off x="2015918" y="4038647"/>
-              <a:ext cx="2003898" cy="369332"/>
+              <a:off x="2015917" y="4038647"/>
+              <a:ext cx="2680025" cy="369332"/>
             </a:xfrm>
             <a:prstGeom prst="rect">
               <a:avLst/>
@@ -10935,6 +11722,14 @@
               <a:r>
                 <a:rPr lang="ko-KR" altLang="en-US" dirty="0"/>
                 <a:t>강민지 </a:t>
+              </a:r>
+              <a:r>
+                <a:rPr lang="ko-KR" altLang="en-US" dirty="0" err="1"/>
+                <a:t>핌언</a:t>
+              </a:r>
+              <a:r>
+                <a:rPr lang="ko-KR" altLang="en-US" dirty="0"/>
+                <a:t> </a:t>
               </a:r>
               <a:r>
                 <a:rPr lang="en-US" altLang="ko-KR" sz="1400" dirty="0" err="1"/>
@@ -10969,7 +11764,7 @@
               <a:pPr algn="ctr"/>
               <a:r>
                 <a:rPr lang="ko-KR" altLang="en-US" dirty="0"/>
-                <a:t>원종훈 핌언 </a:t>
+                <a:t>원종훈 </a:t>
               </a:r>
               <a:r>
                 <a:rPr lang="en-US" altLang="ko-KR" sz="1400" dirty="0"/>
@@ -10984,849 +11779,6 @@
     <p:extLst>
       <p:ext uri="{BB962C8B-B14F-4D97-AF65-F5344CB8AC3E}">
         <p14:creationId xmlns:p14="http://schemas.microsoft.com/office/powerpoint/2010/main" val="1461754398"/>
-      </p:ext>
-    </p:extLst>
-  </p:cSld>
-  <p:clrMapOvr>
-    <a:masterClrMapping/>
-  </p:clrMapOvr>
-  <p:transition>
-    <p:fade/>
-  </p:transition>
-</p:sld>
-</file>
-
-<file path=ppt/slides/slide15.xml><?xml version="1.0" encoding="utf-8"?>
-<p:sld xmlns:a="http://schemas.openxmlformats.org/drawingml/2006/main" xmlns:r="http://schemas.openxmlformats.org/officeDocument/2006/relationships" xmlns:p="http://schemas.openxmlformats.org/presentationml/2006/main">
-  <p:cSld>
-    <p:spTree>
-      <p:nvGrpSpPr>
-        <p:cNvPr id="1" name=""/>
-        <p:cNvGrpSpPr/>
-        <p:nvPr/>
-      </p:nvGrpSpPr>
-      <p:grpSpPr>
-        <a:xfrm>
-          <a:off x="0" y="0"/>
-          <a:ext cx="0" cy="0"/>
-          <a:chOff x="0" y="0"/>
-          <a:chExt cx="0" cy="0"/>
-        </a:xfrm>
-      </p:grpSpPr>
-      <p:sp>
-        <p:nvSpPr>
-          <p:cNvPr id="4" name="제목 3"/>
-          <p:cNvSpPr>
-            <a:spLocks noGrp="1"/>
-          </p:cNvSpPr>
-          <p:nvPr>
-            <p:ph type="title"/>
-          </p:nvPr>
-        </p:nvSpPr>
-        <p:spPr>
-          <a:xfrm>
-            <a:off x="457200" y="366780"/>
-            <a:ext cx="8229600" cy="648404"/>
-          </a:xfrm>
-        </p:spPr>
-        <p:txBody>
-          <a:bodyPr/>
-          <a:lstStyle/>
-          <a:p>
-            <a:r>
-              <a:rPr lang="en-US" altLang="ko-KR" dirty="0"/>
-              <a:t>Current Status</a:t>
-            </a:r>
-            <a:endParaRPr lang="ko-KR" altLang="en-US" dirty="0"/>
-          </a:p>
-        </p:txBody>
-      </p:sp>
-      <p:pic>
-        <p:nvPicPr>
-          <p:cNvPr id="5" name="Picture 4"/>
-          <p:cNvPicPr>
-            <a:picLocks noChangeAspect="1"/>
-          </p:cNvPicPr>
-          <p:nvPr/>
-        </p:nvPicPr>
-        <p:blipFill rotWithShape="1">
-          <a:blip r:embed="rId3" cstate="print">
-            <a:duotone>
-              <a:schemeClr val="accent2">
-                <a:shade val="45000"/>
-                <a:satMod val="135000"/>
-              </a:schemeClr>
-              <a:prstClr val="white"/>
-            </a:duotone>
-            <a:extLst>
-              <a:ext uri="{28A0092B-C50C-407E-A947-70E740481C1C}">
-                <a14:useLocalDpi xmlns:a14="http://schemas.microsoft.com/office/drawing/2010/main" val="0"/>
-              </a:ext>
-            </a:extLst>
-          </a:blip>
-          <a:srcRect l="4326" r="6312" b="13759"/>
-          <a:stretch/>
-        </p:blipFill>
-        <p:spPr>
-          <a:xfrm>
-            <a:off x="1421400" y="3970436"/>
-            <a:ext cx="1846218" cy="1781747"/>
-          </a:xfrm>
-          <a:prstGeom prst="rect">
-            <a:avLst/>
-          </a:prstGeom>
-        </p:spPr>
-      </p:pic>
-      <p:pic>
-        <p:nvPicPr>
-          <p:cNvPr id="7" name="Picture 6"/>
-          <p:cNvPicPr>
-            <a:picLocks noChangeAspect="1"/>
-          </p:cNvPicPr>
-          <p:nvPr/>
-        </p:nvPicPr>
-        <p:blipFill rotWithShape="1">
-          <a:blip r:embed="rId4" cstate="print">
-            <a:clrChange>
-              <a:clrFrom>
-                <a:srgbClr val="000000">
-                  <a:alpha val="0"/>
-                </a:srgbClr>
-              </a:clrFrom>
-              <a:clrTo>
-                <a:srgbClr val="000000">
-                  <a:alpha val="0"/>
-                </a:srgbClr>
-              </a:clrTo>
-            </a:clrChange>
-            <a:alphaModFix/>
-            <a:duotone>
-              <a:schemeClr val="accent2">
-                <a:shade val="45000"/>
-                <a:satMod val="135000"/>
-              </a:schemeClr>
-              <a:prstClr val="white"/>
-            </a:duotone>
-            <a:extLst>
-              <a:ext uri="{28A0092B-C50C-407E-A947-70E740481C1C}">
-                <a14:useLocalDpi xmlns:a14="http://schemas.microsoft.com/office/drawing/2010/main" val="0"/>
-              </a:ext>
-            </a:extLst>
-          </a:blip>
-          <a:srcRect b="15146"/>
-          <a:stretch/>
-        </p:blipFill>
-        <p:spPr>
-          <a:xfrm>
-            <a:off x="1223207" y="1673342"/>
-            <a:ext cx="1931474" cy="1638936"/>
-          </a:xfrm>
-          <a:prstGeom prst="rect">
-            <a:avLst/>
-          </a:prstGeom>
-        </p:spPr>
-      </p:pic>
-      <p:sp>
-        <p:nvSpPr>
-          <p:cNvPr id="10" name="TextBox 9"/>
-          <p:cNvSpPr txBox="1"/>
-          <p:nvPr/>
-        </p:nvSpPr>
-        <p:spPr>
-          <a:xfrm>
-            <a:off x="3431663" y="1586078"/>
-            <a:ext cx="3384260" cy="1734706"/>
-          </a:xfrm>
-          <a:prstGeom prst="rect">
-            <a:avLst/>
-          </a:prstGeom>
-          <a:noFill/>
-        </p:spPr>
-        <p:txBody>
-          <a:bodyPr wrap="none" rtlCol="0">
-            <a:spAutoFit/>
-          </a:bodyPr>
-          <a:lstStyle/>
-          <a:p>
-            <a:pPr>
-              <a:lnSpc>
-                <a:spcPts val="3300"/>
-              </a:lnSpc>
-            </a:pPr>
-            <a:r>
-              <a:rPr lang="ko-KR" altLang="en-US" sz="2400" b="1" dirty="0"/>
-              <a:t>면담</a:t>
-            </a:r>
-            <a:endParaRPr lang="en-US" altLang="ko-KR" sz="2400" b="1" dirty="0"/>
-          </a:p>
-          <a:p>
-            <a:pPr marL="285750" indent="-285750">
-              <a:lnSpc>
-                <a:spcPts val="3300"/>
-              </a:lnSpc>
-              <a:buFontTx/>
-              <a:buChar char="-"/>
-            </a:pPr>
-            <a:r>
-              <a:rPr lang="en-US" altLang="ko-KR" dirty="0"/>
-              <a:t>AR</a:t>
-            </a:r>
-            <a:r>
-              <a:rPr lang="ko-KR" altLang="en-US" dirty="0"/>
-              <a:t> </a:t>
-            </a:r>
-            <a:r>
-              <a:rPr lang="en-US" altLang="ko-KR" dirty="0"/>
-              <a:t>Player </a:t>
-            </a:r>
-            <a:r>
-              <a:rPr lang="ko-KR" altLang="en-US" dirty="0"/>
-              <a:t>형식</a:t>
-            </a:r>
-            <a:r>
-              <a:rPr lang="en-US" altLang="ko-KR" dirty="0"/>
-              <a:t>,</a:t>
-            </a:r>
-            <a:r>
-              <a:rPr lang="ko-KR" altLang="en-US" dirty="0"/>
-              <a:t> </a:t>
-            </a:r>
-            <a:r>
-              <a:rPr lang="en-US" altLang="ko-KR" dirty="0"/>
-              <a:t>Source </a:t>
-            </a:r>
-            <a:r>
-              <a:rPr lang="ko-KR" altLang="en-US" dirty="0"/>
-              <a:t>선택</a:t>
-            </a:r>
-            <a:endParaRPr lang="en-US" altLang="ko-KR" dirty="0"/>
-          </a:p>
-          <a:p>
-            <a:pPr marL="285750" indent="-285750">
-              <a:lnSpc>
-                <a:spcPts val="3300"/>
-              </a:lnSpc>
-              <a:buFontTx/>
-              <a:buChar char="-"/>
-            </a:pPr>
-            <a:r>
-              <a:rPr lang="en-US" altLang="ko-KR" dirty="0"/>
-              <a:t>Study </a:t>
-            </a:r>
-            <a:r>
-              <a:rPr lang="ko-KR" altLang="en-US" dirty="0"/>
-              <a:t>분야 분담</a:t>
-            </a:r>
-            <a:endParaRPr lang="en-US" altLang="ko-KR" dirty="0"/>
-          </a:p>
-          <a:p>
-            <a:pPr marL="285750" indent="-285750">
-              <a:lnSpc>
-                <a:spcPts val="3300"/>
-              </a:lnSpc>
-              <a:buFontTx/>
-              <a:buChar char="-"/>
-            </a:pPr>
-            <a:r>
-              <a:rPr lang="ko-KR" altLang="en-US" dirty="0"/>
-              <a:t>메신저와 </a:t>
-            </a:r>
-            <a:r>
-              <a:rPr lang="en-US" altLang="ko-KR" dirty="0"/>
-              <a:t>GitHub</a:t>
-            </a:r>
-            <a:r>
-              <a:rPr lang="ko-KR" altLang="en-US" dirty="0"/>
-              <a:t>를 통한 소통</a:t>
-            </a:r>
-            <a:endParaRPr lang="en-US" altLang="ko-KR" dirty="0"/>
-          </a:p>
-        </p:txBody>
-      </p:sp>
-      <p:sp>
-        <p:nvSpPr>
-          <p:cNvPr id="12" name="TextBox 11"/>
-          <p:cNvSpPr txBox="1"/>
-          <p:nvPr/>
-        </p:nvSpPr>
-        <p:spPr>
-          <a:xfrm>
-            <a:off x="3425526" y="3994046"/>
-            <a:ext cx="3609321" cy="1734706"/>
-          </a:xfrm>
-          <a:prstGeom prst="rect">
-            <a:avLst/>
-          </a:prstGeom>
-          <a:noFill/>
-        </p:spPr>
-        <p:txBody>
-          <a:bodyPr wrap="none" rtlCol="0">
-            <a:spAutoFit/>
-          </a:bodyPr>
-          <a:lstStyle/>
-          <a:p>
-            <a:pPr>
-              <a:lnSpc>
-                <a:spcPts val="3300"/>
-              </a:lnSpc>
-            </a:pPr>
-            <a:r>
-              <a:rPr lang="ko-KR" altLang="en-US" sz="2400" b="1" dirty="0"/>
-              <a:t>스터디</a:t>
-            </a:r>
-            <a:endParaRPr lang="en-US" altLang="ko-KR" sz="2400" b="1" dirty="0"/>
-          </a:p>
-          <a:p>
-            <a:pPr marL="285750" indent="-285750">
-              <a:lnSpc>
-                <a:spcPts val="3300"/>
-              </a:lnSpc>
-              <a:buFontTx/>
-              <a:buChar char="-"/>
-            </a:pPr>
-            <a:r>
-              <a:rPr lang="ko-KR" altLang="en-US" dirty="0"/>
-              <a:t>앞으로 배워야 할 내용 설정</a:t>
-            </a:r>
-            <a:endParaRPr lang="en-US" altLang="ko-KR" dirty="0"/>
-          </a:p>
-          <a:p>
-            <a:pPr marL="285750" indent="-285750">
-              <a:lnSpc>
-                <a:spcPts val="3300"/>
-              </a:lnSpc>
-              <a:buFontTx/>
-              <a:buChar char="-"/>
-            </a:pPr>
-            <a:r>
-              <a:rPr lang="en-US" altLang="ko-KR" dirty="0" err="1"/>
-              <a:t>TensorFlow</a:t>
-            </a:r>
-            <a:r>
-              <a:rPr lang="en-US" altLang="ko-KR" dirty="0"/>
-              <a:t>: Terms, MNIST,</a:t>
-            </a:r>
-            <a:r>
-              <a:rPr lang="ko-KR" altLang="en-US" dirty="0"/>
-              <a:t> </a:t>
-            </a:r>
-            <a:r>
-              <a:rPr lang="mr-IN" altLang="ko-KR" dirty="0"/>
-              <a:t>…</a:t>
-            </a:r>
-            <a:endParaRPr lang="en-US" altLang="ko-KR" dirty="0"/>
-          </a:p>
-          <a:p>
-            <a:pPr marL="285750" indent="-285750">
-              <a:lnSpc>
-                <a:spcPts val="3300"/>
-              </a:lnSpc>
-              <a:buFontTx/>
-              <a:buChar char="-"/>
-            </a:pPr>
-            <a:r>
-              <a:rPr lang="en-US" altLang="ko-KR" dirty="0"/>
-              <a:t>Android: Android Studio, </a:t>
-            </a:r>
-            <a:r>
-              <a:rPr lang="mr-IN" altLang="ko-KR" dirty="0"/>
-              <a:t>…</a:t>
-            </a:r>
-            <a:endParaRPr lang="en-US" altLang="ko-KR" dirty="0"/>
-          </a:p>
-        </p:txBody>
-      </p:sp>
-    </p:spTree>
-    <p:extLst>
-      <p:ext uri="{BB962C8B-B14F-4D97-AF65-F5344CB8AC3E}">
-        <p14:creationId xmlns:p14="http://schemas.microsoft.com/office/powerpoint/2010/main" val="1496718616"/>
-      </p:ext>
-    </p:extLst>
-  </p:cSld>
-  <p:clrMapOvr>
-    <a:masterClrMapping/>
-  </p:clrMapOvr>
-  <p:transition>
-    <p:fade/>
-  </p:transition>
-</p:sld>
-</file>
-
-<file path=ppt/slides/slide16.xml><?xml version="1.0" encoding="utf-8"?>
-<p:sld xmlns:a="http://schemas.openxmlformats.org/drawingml/2006/main" xmlns:r="http://schemas.openxmlformats.org/officeDocument/2006/relationships" xmlns:p="http://schemas.openxmlformats.org/presentationml/2006/main">
-  <p:cSld>
-    <p:spTree>
-      <p:nvGrpSpPr>
-        <p:cNvPr id="1" name=""/>
-        <p:cNvGrpSpPr/>
-        <p:nvPr/>
-      </p:nvGrpSpPr>
-      <p:grpSpPr>
-        <a:xfrm>
-          <a:off x="0" y="0"/>
-          <a:ext cx="0" cy="0"/>
-          <a:chOff x="0" y="0"/>
-          <a:chExt cx="0" cy="0"/>
-        </a:xfrm>
-      </p:grpSpPr>
-      <p:sp>
-        <p:nvSpPr>
-          <p:cNvPr id="4" name="제목 3"/>
-          <p:cNvSpPr>
-            <a:spLocks noGrp="1"/>
-          </p:cNvSpPr>
-          <p:nvPr>
-            <p:ph type="title"/>
-          </p:nvPr>
-        </p:nvSpPr>
-        <p:spPr>
-          <a:xfrm>
-            <a:off x="457200" y="366780"/>
-            <a:ext cx="8229600" cy="648404"/>
-          </a:xfrm>
-        </p:spPr>
-        <p:txBody>
-          <a:bodyPr/>
-          <a:lstStyle/>
-          <a:p>
-            <a:r>
-              <a:rPr lang="en-US" altLang="ko-KR" dirty="0"/>
-              <a:t>Further Plan</a:t>
-            </a:r>
-            <a:endParaRPr lang="ko-KR" altLang="en-US" dirty="0"/>
-          </a:p>
-        </p:txBody>
-      </p:sp>
-      <p:cxnSp>
-        <p:nvCxnSpPr>
-          <p:cNvPr id="10" name="직선 연결선 9"/>
-          <p:cNvCxnSpPr/>
-          <p:nvPr/>
-        </p:nvCxnSpPr>
-        <p:spPr>
-          <a:xfrm flipH="1">
-            <a:off x="1192945" y="1944909"/>
-            <a:ext cx="2" cy="3931477"/>
-          </a:xfrm>
-          <a:prstGeom prst="line">
-            <a:avLst/>
-          </a:prstGeom>
-          <a:ln w="38100">
-            <a:solidFill>
-              <a:schemeClr val="tx1">
-                <a:lumMod val="50000"/>
-                <a:lumOff val="50000"/>
-              </a:schemeClr>
-            </a:solidFill>
-          </a:ln>
-        </p:spPr>
-        <p:style>
-          <a:lnRef idx="1">
-            <a:schemeClr val="accent1"/>
-          </a:lnRef>
-          <a:fillRef idx="0">
-            <a:schemeClr val="accent1"/>
-          </a:fillRef>
-          <a:effectRef idx="0">
-            <a:schemeClr val="accent1"/>
-          </a:effectRef>
-          <a:fontRef idx="minor">
-            <a:schemeClr val="tx1"/>
-          </a:fontRef>
-        </p:style>
-      </p:cxnSp>
-      <p:sp>
-        <p:nvSpPr>
-          <p:cNvPr id="6" name="타원 5"/>
-          <p:cNvSpPr/>
-          <p:nvPr/>
-        </p:nvSpPr>
-        <p:spPr>
-          <a:xfrm>
-            <a:off x="803538" y="1564143"/>
-            <a:ext cx="761533" cy="761533"/>
-          </a:xfrm>
-          <a:prstGeom prst="ellipse">
-            <a:avLst/>
-          </a:prstGeom>
-          <a:solidFill>
-            <a:schemeClr val="bg1"/>
-          </a:solidFill>
-          <a:ln w="38100">
-            <a:solidFill>
-              <a:srgbClr val="00B050"/>
-            </a:solidFill>
-          </a:ln>
-        </p:spPr>
-        <p:style>
-          <a:lnRef idx="2">
-            <a:schemeClr val="accent1">
-              <a:shade val="50000"/>
-            </a:schemeClr>
-          </a:lnRef>
-          <a:fillRef idx="1">
-            <a:schemeClr val="accent1"/>
-          </a:fillRef>
-          <a:effectRef idx="0">
-            <a:schemeClr val="accent1"/>
-          </a:effectRef>
-          <a:fontRef idx="minor">
-            <a:schemeClr val="lt1"/>
-          </a:fontRef>
-        </p:style>
-        <p:txBody>
-          <a:bodyPr rtlCol="0" anchor="ctr"/>
-          <a:lstStyle/>
-          <a:p>
-            <a:pPr algn="ctr"/>
-            <a:endParaRPr lang="ko-KR" altLang="en-US" spc="80" dirty="0">
-              <a:solidFill>
-                <a:schemeClr val="bg1"/>
-              </a:solidFill>
-              <a:latin typeface="나눔고딕" pitchFamily="50" charset="-127"/>
-              <a:ea typeface="나눔고딕" pitchFamily="50" charset="-127"/>
-            </a:endParaRPr>
-          </a:p>
-        </p:txBody>
-      </p:sp>
-      <p:sp>
-        <p:nvSpPr>
-          <p:cNvPr id="7" name="타원 6"/>
-          <p:cNvSpPr/>
-          <p:nvPr/>
-        </p:nvSpPr>
-        <p:spPr>
-          <a:xfrm>
-            <a:off x="803537" y="2874636"/>
-            <a:ext cx="761533" cy="761533"/>
-          </a:xfrm>
-          <a:prstGeom prst="ellipse">
-            <a:avLst/>
-          </a:prstGeom>
-          <a:solidFill>
-            <a:schemeClr val="bg1"/>
-          </a:solidFill>
-          <a:ln w="38100">
-            <a:solidFill>
-              <a:srgbClr val="00B050"/>
-            </a:solidFill>
-          </a:ln>
-        </p:spPr>
-        <p:style>
-          <a:lnRef idx="2">
-            <a:schemeClr val="accent1">
-              <a:shade val="50000"/>
-            </a:schemeClr>
-          </a:lnRef>
-          <a:fillRef idx="1">
-            <a:schemeClr val="accent1"/>
-          </a:fillRef>
-          <a:effectRef idx="0">
-            <a:schemeClr val="accent1"/>
-          </a:effectRef>
-          <a:fontRef idx="minor">
-            <a:schemeClr val="lt1"/>
-          </a:fontRef>
-        </p:style>
-        <p:txBody>
-          <a:bodyPr rtlCol="0" anchor="ctr"/>
-          <a:lstStyle/>
-          <a:p>
-            <a:pPr algn="ctr"/>
-            <a:endParaRPr lang="ko-KR" altLang="en-US" spc="80" dirty="0">
-              <a:solidFill>
-                <a:schemeClr val="bg1"/>
-              </a:solidFill>
-              <a:latin typeface="나눔고딕" pitchFamily="50" charset="-127"/>
-              <a:ea typeface="나눔고딕" pitchFamily="50" charset="-127"/>
-            </a:endParaRPr>
-          </a:p>
-        </p:txBody>
-      </p:sp>
-      <p:sp>
-        <p:nvSpPr>
-          <p:cNvPr id="8" name="타원 7"/>
-          <p:cNvSpPr/>
-          <p:nvPr/>
-        </p:nvSpPr>
-        <p:spPr>
-          <a:xfrm>
-            <a:off x="803536" y="4185128"/>
-            <a:ext cx="761533" cy="761533"/>
-          </a:xfrm>
-          <a:prstGeom prst="ellipse">
-            <a:avLst/>
-          </a:prstGeom>
-          <a:solidFill>
-            <a:schemeClr val="bg1"/>
-          </a:solidFill>
-          <a:ln w="38100">
-            <a:solidFill>
-              <a:srgbClr val="00B050"/>
-            </a:solidFill>
-          </a:ln>
-        </p:spPr>
-        <p:style>
-          <a:lnRef idx="2">
-            <a:schemeClr val="accent1">
-              <a:shade val="50000"/>
-            </a:schemeClr>
-          </a:lnRef>
-          <a:fillRef idx="1">
-            <a:schemeClr val="accent1"/>
-          </a:fillRef>
-          <a:effectRef idx="0">
-            <a:schemeClr val="accent1"/>
-          </a:effectRef>
-          <a:fontRef idx="minor">
-            <a:schemeClr val="lt1"/>
-          </a:fontRef>
-        </p:style>
-        <p:txBody>
-          <a:bodyPr rtlCol="0" anchor="ctr"/>
-          <a:lstStyle/>
-          <a:p>
-            <a:pPr algn="ctr"/>
-            <a:endParaRPr lang="ko-KR" altLang="en-US" spc="80" dirty="0">
-              <a:solidFill>
-                <a:schemeClr val="bg1"/>
-              </a:solidFill>
-              <a:latin typeface="나눔고딕" pitchFamily="50" charset="-127"/>
-              <a:ea typeface="나눔고딕" pitchFamily="50" charset="-127"/>
-            </a:endParaRPr>
-          </a:p>
-        </p:txBody>
-      </p:sp>
-      <p:sp>
-        <p:nvSpPr>
-          <p:cNvPr id="9" name="타원 7"/>
-          <p:cNvSpPr/>
-          <p:nvPr/>
-        </p:nvSpPr>
-        <p:spPr>
-          <a:xfrm>
-            <a:off x="803536" y="5495620"/>
-            <a:ext cx="761533" cy="761533"/>
-          </a:xfrm>
-          <a:prstGeom prst="ellipse">
-            <a:avLst/>
-          </a:prstGeom>
-          <a:solidFill>
-            <a:schemeClr val="bg1"/>
-          </a:solidFill>
-          <a:ln w="38100">
-            <a:solidFill>
-              <a:srgbClr val="00B050"/>
-            </a:solidFill>
-          </a:ln>
-        </p:spPr>
-        <p:style>
-          <a:lnRef idx="2">
-            <a:schemeClr val="accent1">
-              <a:shade val="50000"/>
-            </a:schemeClr>
-          </a:lnRef>
-          <a:fillRef idx="1">
-            <a:schemeClr val="accent1"/>
-          </a:fillRef>
-          <a:effectRef idx="0">
-            <a:schemeClr val="accent1"/>
-          </a:effectRef>
-          <a:fontRef idx="minor">
-            <a:schemeClr val="lt1"/>
-          </a:fontRef>
-        </p:style>
-        <p:txBody>
-          <a:bodyPr rtlCol="0" anchor="ctr"/>
-          <a:lstStyle/>
-          <a:p>
-            <a:pPr algn="ctr"/>
-            <a:endParaRPr lang="ko-KR" altLang="en-US" spc="80" dirty="0">
-              <a:solidFill>
-                <a:schemeClr val="bg1"/>
-              </a:solidFill>
-              <a:latin typeface="나눔고딕" pitchFamily="50" charset="-127"/>
-              <a:ea typeface="나눔고딕" pitchFamily="50" charset="-127"/>
-            </a:endParaRPr>
-          </a:p>
-        </p:txBody>
-      </p:sp>
-      <p:sp>
-        <p:nvSpPr>
-          <p:cNvPr id="11" name="TextBox 10"/>
-          <p:cNvSpPr txBox="1"/>
-          <p:nvPr/>
-        </p:nvSpPr>
-        <p:spPr>
-          <a:xfrm>
-            <a:off x="1740470" y="1714076"/>
-            <a:ext cx="5886015" cy="461665"/>
-          </a:xfrm>
-          <a:prstGeom prst="rect">
-            <a:avLst/>
-          </a:prstGeom>
-          <a:noFill/>
-        </p:spPr>
-        <p:txBody>
-          <a:bodyPr wrap="square" rtlCol="0">
-            <a:spAutoFit/>
-          </a:bodyPr>
-          <a:lstStyle/>
-          <a:p>
-            <a:r>
-              <a:rPr lang="en-US" altLang="ko-KR" sz="2400" dirty="0" err="1"/>
-              <a:t>TensorFlow</a:t>
-            </a:r>
-            <a:r>
-              <a:rPr lang="ko-KR" altLang="en-US" sz="2400" dirty="0"/>
-              <a:t> </a:t>
-            </a:r>
-            <a:r>
-              <a:rPr lang="en-US" altLang="ko-KR" dirty="0"/>
-              <a:t>CNN, Overshooting, Overfitting, </a:t>
-            </a:r>
-            <a:r>
-              <a:rPr lang="mr-IN" altLang="ko-KR" dirty="0"/>
-              <a:t>…</a:t>
-            </a:r>
-            <a:endParaRPr lang="ko-KR" altLang="en-US" dirty="0"/>
-          </a:p>
-        </p:txBody>
-      </p:sp>
-      <p:sp>
-        <p:nvSpPr>
-          <p:cNvPr id="13" name="TextBox 12"/>
-          <p:cNvSpPr txBox="1"/>
-          <p:nvPr/>
-        </p:nvSpPr>
-        <p:spPr>
-          <a:xfrm>
-            <a:off x="1740470" y="3024569"/>
-            <a:ext cx="5516364" cy="461665"/>
-          </a:xfrm>
-          <a:prstGeom prst="rect">
-            <a:avLst/>
-          </a:prstGeom>
-          <a:noFill/>
-        </p:spPr>
-        <p:txBody>
-          <a:bodyPr wrap="square" rtlCol="0">
-            <a:spAutoFit/>
-          </a:bodyPr>
-          <a:lstStyle/>
-          <a:p>
-            <a:r>
-              <a:rPr lang="en-US" altLang="ko-KR" sz="2400" dirty="0"/>
-              <a:t>Android</a:t>
-            </a:r>
-            <a:r>
-              <a:rPr lang="ko-KR" altLang="en-US" sz="2400" dirty="0"/>
-              <a:t> </a:t>
-            </a:r>
-            <a:r>
-              <a:rPr lang="en-US" altLang="ko-KR" dirty="0" err="1"/>
-              <a:t>RecyclerView</a:t>
-            </a:r>
-            <a:r>
-              <a:rPr lang="en-US" altLang="ko-KR" dirty="0"/>
-              <a:t>, Activity Life Cycle, </a:t>
-            </a:r>
-            <a:r>
-              <a:rPr lang="mr-IN" altLang="ko-KR" dirty="0"/>
-              <a:t>…</a:t>
-            </a:r>
-            <a:endParaRPr lang="ko-KR" altLang="en-US" dirty="0"/>
-          </a:p>
-        </p:txBody>
-      </p:sp>
-      <p:sp>
-        <p:nvSpPr>
-          <p:cNvPr id="14" name="TextBox 13"/>
-          <p:cNvSpPr txBox="1"/>
-          <p:nvPr/>
-        </p:nvSpPr>
-        <p:spPr>
-          <a:xfrm>
-            <a:off x="1740470" y="4335061"/>
-            <a:ext cx="4824551" cy="461665"/>
-          </a:xfrm>
-          <a:prstGeom prst="rect">
-            <a:avLst/>
-          </a:prstGeom>
-          <a:noFill/>
-        </p:spPr>
-        <p:txBody>
-          <a:bodyPr wrap="square" rtlCol="0">
-            <a:spAutoFit/>
-          </a:bodyPr>
-          <a:lstStyle/>
-          <a:p>
-            <a:r>
-              <a:rPr lang="en-US" altLang="ko-KR" sz="2400" dirty="0"/>
-              <a:t>Graphics</a:t>
-            </a:r>
-            <a:r>
-              <a:rPr lang="ko-KR" altLang="en-US" sz="2400" dirty="0"/>
-              <a:t> </a:t>
-            </a:r>
-            <a:r>
-              <a:rPr lang="en-US" altLang="ko-KR" dirty="0" err="1"/>
-              <a:t>openGL</a:t>
-            </a:r>
-            <a:r>
-              <a:rPr lang="en-US" altLang="ko-KR" dirty="0"/>
-              <a:t>, Glide, </a:t>
-            </a:r>
-            <a:r>
-              <a:rPr lang="mr-IN" altLang="ko-KR" dirty="0"/>
-              <a:t>…</a:t>
-            </a:r>
-            <a:endParaRPr lang="ko-KR" altLang="en-US" dirty="0"/>
-          </a:p>
-        </p:txBody>
-      </p:sp>
-      <p:sp>
-        <p:nvSpPr>
-          <p:cNvPr id="15" name="TextBox 14"/>
-          <p:cNvSpPr txBox="1"/>
-          <p:nvPr/>
-        </p:nvSpPr>
-        <p:spPr>
-          <a:xfrm>
-            <a:off x="1740469" y="5645553"/>
-            <a:ext cx="4824551" cy="461665"/>
-          </a:xfrm>
-          <a:prstGeom prst="rect">
-            <a:avLst/>
-          </a:prstGeom>
-          <a:noFill/>
-        </p:spPr>
-        <p:txBody>
-          <a:bodyPr wrap="square" rtlCol="0">
-            <a:spAutoFit/>
-          </a:bodyPr>
-          <a:lstStyle/>
-          <a:p>
-            <a:r>
-              <a:rPr lang="en-US" altLang="ko-KR" sz="2400" dirty="0"/>
-              <a:t>Application </a:t>
-            </a:r>
-            <a:r>
-              <a:rPr lang="en-US" altLang="ko-KR" dirty="0"/>
-              <a:t>SQLite, realm, </a:t>
-            </a:r>
-            <a:r>
-              <a:rPr lang="mr-IN" altLang="ko-KR" dirty="0"/>
-              <a:t>…</a:t>
-            </a:r>
-            <a:endParaRPr lang="ko-KR" altLang="en-US" dirty="0"/>
-          </a:p>
-        </p:txBody>
-      </p:sp>
-    </p:spTree>
-    <p:extLst>
-      <p:ext uri="{BB962C8B-B14F-4D97-AF65-F5344CB8AC3E}">
-        <p14:creationId xmlns:p14="http://schemas.microsoft.com/office/powerpoint/2010/main" val="475326152"/>
       </p:ext>
     </p:extLst>
   </p:cSld>
@@ -19593,6 +19545,30 @@
           </a:prstGeom>
         </p:spPr>
       </p:pic>
+      <p:pic>
+        <p:nvPicPr>
+          <p:cNvPr id="2" name="그림 1"/>
+          <p:cNvPicPr>
+            <a:picLocks noChangeAspect="1"/>
+          </p:cNvPicPr>
+          <p:nvPr/>
+        </p:nvPicPr>
+        <p:blipFill>
+          <a:blip r:embed="rId5"/>
+          <a:stretch>
+            <a:fillRect/>
+          </a:stretch>
+        </p:blipFill>
+        <p:spPr>
+          <a:xfrm>
+            <a:off x="0" y="381000"/>
+            <a:ext cx="9144000" cy="6096000"/>
+          </a:xfrm>
+          <a:prstGeom prst="rect">
+            <a:avLst/>
+          </a:prstGeom>
+        </p:spPr>
+      </p:pic>
     </p:spTree>
     <p:extLst>
       <p:ext uri="{BB962C8B-B14F-4D97-AF65-F5344CB8AC3E}">
@@ -19943,7 +19919,7 @@
                 <a:latin typeface="나눔고딕" panose="020D0604000000000000" pitchFamily="50" charset="-127"/>
                 <a:ea typeface="나눔고딕" panose="020D0604000000000000" pitchFamily="50" charset="-127"/>
               </a:rPr>
-              <a:t>Architecture/Basic Spec</a:t>
+              <a:t>Basic Spec/Architecture</a:t>
             </a:r>
           </a:p>
           <a:p>

</xml_diff>

<commit_message>
Merge .pptx from presentation/spec-minji
</commit_message>
<xml_diff>
--- a/artoon-spec.pptx
+++ b/artoon-spec.pptx
@@ -20,14 +20,14 @@
     <p:sldId id="313" r:id="rId8"/>
     <p:sldId id="300" r:id="rId9"/>
     <p:sldId id="319" r:id="rId10"/>
-    <p:sldId id="317" r:id="rId11"/>
-    <p:sldId id="326" r:id="rId12"/>
-    <p:sldId id="293" r:id="rId13"/>
-    <p:sldId id="308" r:id="rId14"/>
-    <p:sldId id="325" r:id="rId15"/>
-    <p:sldId id="323" r:id="rId16"/>
-    <p:sldId id="324" r:id="rId17"/>
-    <p:sldId id="327" r:id="rId18"/>
+    <p:sldId id="308" r:id="rId11"/>
+    <p:sldId id="317" r:id="rId12"/>
+    <p:sldId id="326" r:id="rId13"/>
+    <p:sldId id="293" r:id="rId14"/>
+    <p:sldId id="323" r:id="rId15"/>
+    <p:sldId id="324" r:id="rId16"/>
+    <p:sldId id="325" r:id="rId17"/>
+    <p:sldId id="304" r:id="rId18"/>
     <p:sldId id="278" r:id="rId19"/>
   </p:sldIdLst>
   <p:sldSz cx="9144000" cy="6858000" type="screen4x3"/>
@@ -313,7 +313,7 @@
             <a:fld id="{207F23D9-DF40-4811-9C78-A2E2A32398DD}" type="datetimeFigureOut">
               <a:rPr lang="ko-KR" altLang="en-US" smtClean="0"/>
               <a:pPr/>
-              <a:t>2017. 3. 29.</a:t>
+              <a:t>2017. 3. 30.</a:t>
             </a:fld>
             <a:endParaRPr lang="ko-KR" altLang="en-US"/>
           </a:p>
@@ -481,7 +481,7 @@
             <a:fld id="{F3AF6795-A612-454E-AF7A-9192B1BEBB13}" type="datetimeFigureOut">
               <a:rPr lang="ko-KR" altLang="en-US" smtClean="0"/>
               <a:pPr/>
-              <a:t>2017. 3. 29.</a:t>
+              <a:t>2017. 3. 30.</a:t>
             </a:fld>
             <a:endParaRPr lang="ko-KR" altLang="en-US"/>
           </a:p>
@@ -917,7 +917,7 @@
     </p:spTree>
     <p:extLst>
       <p:ext uri="{BB962C8B-B14F-4D97-AF65-F5344CB8AC3E}">
-        <p14:creationId xmlns:p14="http://schemas.microsoft.com/office/powerpoint/2010/main" val="2321851601"/>
+        <p14:creationId xmlns:p14="http://schemas.microsoft.com/office/powerpoint/2010/main" val="1158920028"/>
       </p:ext>
     </p:extLst>
   </p:cSld>
@@ -971,14 +971,6 @@
           <a:bodyPr/>
           <a:lstStyle/>
           <a:p>
-            <a:r>
-              <a:rPr lang="en-US" altLang="ko-KR" dirty="0"/>
-              <a:t>TODO: Sub-Architecture</a:t>
-            </a:r>
-            <a:r>
-              <a:rPr lang="en-US" altLang="ko-KR" baseline="0" dirty="0"/>
-              <a:t> goes here</a:t>
-            </a:r>
             <a:endParaRPr lang="ko-KR" altLang="en-US" dirty="0"/>
           </a:p>
         </p:txBody>
@@ -1010,7 +1002,7 @@
     </p:spTree>
     <p:extLst>
       <p:ext uri="{BB962C8B-B14F-4D97-AF65-F5344CB8AC3E}">
-        <p14:creationId xmlns:p14="http://schemas.microsoft.com/office/powerpoint/2010/main" val="2040369853"/>
+        <p14:creationId xmlns:p14="http://schemas.microsoft.com/office/powerpoint/2010/main" val="2321851601"/>
       </p:ext>
     </p:extLst>
   </p:cSld>
@@ -1064,6 +1056,14 @@
           <a:bodyPr/>
           <a:lstStyle/>
           <a:p>
+            <a:r>
+              <a:rPr lang="en-US" altLang="ko-KR" dirty="0"/>
+              <a:t>TODO: Sub-Architecture</a:t>
+            </a:r>
+            <a:r>
+              <a:rPr lang="en-US" altLang="ko-KR" baseline="0" dirty="0"/>
+              <a:t> goes here</a:t>
+            </a:r>
             <a:endParaRPr lang="ko-KR" altLang="en-US" dirty="0"/>
           </a:p>
         </p:txBody>
@@ -1095,7 +1095,7 @@
     </p:spTree>
     <p:extLst>
       <p:ext uri="{BB962C8B-B14F-4D97-AF65-F5344CB8AC3E}">
-        <p14:creationId xmlns:p14="http://schemas.microsoft.com/office/powerpoint/2010/main" val="1158920028"/>
+        <p14:creationId xmlns:p14="http://schemas.microsoft.com/office/powerpoint/2010/main" val="2040369853"/>
       </p:ext>
     </p:extLst>
   </p:cSld>
@@ -1234,6 +1234,18 @@
           <a:bodyPr/>
           <a:lstStyle/>
           <a:p>
+            <a:r>
+              <a:rPr lang="en-US" altLang="ko-KR" dirty="0"/>
+              <a:t>Change</a:t>
+            </a:r>
+            <a:r>
+              <a:rPr lang="en-US" altLang="ko-KR" baseline="0" dirty="0"/>
+              <a:t> </a:t>
+            </a:r>
+            <a:r>
+              <a:rPr lang="en-US" altLang="ko-KR" baseline="0"/>
+              <a:t>the icon, and make the icon green</a:t>
+            </a:r>
             <a:endParaRPr lang="ko-KR" altLang="en-US" dirty="0"/>
           </a:p>
         </p:txBody>
@@ -1265,7 +1277,7 @@
     </p:spTree>
     <p:extLst>
       <p:ext uri="{BB962C8B-B14F-4D97-AF65-F5344CB8AC3E}">
-        <p14:creationId xmlns:p14="http://schemas.microsoft.com/office/powerpoint/2010/main" val="493245506"/>
+        <p14:creationId xmlns:p14="http://schemas.microsoft.com/office/powerpoint/2010/main" val="1873821801"/>
       </p:ext>
     </p:extLst>
   </p:cSld>
@@ -1319,18 +1331,6 @@
           <a:bodyPr/>
           <a:lstStyle/>
           <a:p>
-            <a:r>
-              <a:rPr lang="en-US" altLang="ko-KR" dirty="0"/>
-              <a:t>Change</a:t>
-            </a:r>
-            <a:r>
-              <a:rPr lang="en-US" altLang="ko-KR" baseline="0" dirty="0"/>
-              <a:t> </a:t>
-            </a:r>
-            <a:r>
-              <a:rPr lang="en-US" altLang="ko-KR" baseline="0"/>
-              <a:t>the icon, and make the icon green</a:t>
-            </a:r>
             <a:endParaRPr lang="ko-KR" altLang="en-US" dirty="0"/>
           </a:p>
         </p:txBody>
@@ -1362,7 +1362,7 @@
     </p:spTree>
     <p:extLst>
       <p:ext uri="{BB962C8B-B14F-4D97-AF65-F5344CB8AC3E}">
-        <p14:creationId xmlns:p14="http://schemas.microsoft.com/office/powerpoint/2010/main" val="1873821801"/>
+        <p14:creationId xmlns:p14="http://schemas.microsoft.com/office/powerpoint/2010/main" val="167469824"/>
       </p:ext>
     </p:extLst>
   </p:cSld>
@@ -1447,7 +1447,7 @@
     </p:spTree>
     <p:extLst>
       <p:ext uri="{BB962C8B-B14F-4D97-AF65-F5344CB8AC3E}">
-        <p14:creationId xmlns:p14="http://schemas.microsoft.com/office/powerpoint/2010/main" val="167469824"/>
+        <p14:creationId xmlns:p14="http://schemas.microsoft.com/office/powerpoint/2010/main" val="493245506"/>
       </p:ext>
     </p:extLst>
   </p:cSld>
@@ -1502,11 +1502,11 @@
           <a:lstStyle/>
           <a:p>
             <a:r>
-              <a:rPr lang="en-US" altLang="ko-KR" dirty="0" smtClean="0"/>
+              <a:rPr lang="en-US" altLang="ko-KR" dirty="0"/>
               <a:t>TODO: Change</a:t>
             </a:r>
             <a:r>
-              <a:rPr lang="en-US" altLang="ko-KR" baseline="0" dirty="0" smtClean="0"/>
+              <a:rPr lang="en-US" altLang="ko-KR" baseline="0" dirty="0"/>
               <a:t> to line graph</a:t>
             </a:r>
             <a:endParaRPr lang="ko-KR" altLang="en-US" dirty="0"/>
@@ -1540,7 +1540,7 @@
     </p:spTree>
     <p:extLst>
       <p:ext uri="{BB962C8B-B14F-4D97-AF65-F5344CB8AC3E}">
-        <p14:creationId xmlns:p14="http://schemas.microsoft.com/office/powerpoint/2010/main" val="290627362"/>
+        <p14:creationId xmlns:p14="http://schemas.microsoft.com/office/powerpoint/2010/main" val="1158920028"/>
       </p:ext>
     </p:extLst>
   </p:cSld>
@@ -7835,6 +7835,13 @@
   <p:transition>
     <p:fade/>
   </p:transition>
+  <p:timing>
+    <p:tnLst>
+      <p:par>
+        <p:cTn id="1" dur="indefinite" restart="never" nodeType="tmRoot"/>
+      </p:par>
+    </p:tnLst>
+  </p:timing>
 </p:sld>
 </file>
 
@@ -7857,6 +7864,202 @@
       </p:grpSpPr>
       <p:sp>
         <p:nvSpPr>
+          <p:cNvPr id="4" name="제목 3"/>
+          <p:cNvSpPr>
+            <a:spLocks noGrp="1"/>
+          </p:cNvSpPr>
+          <p:nvPr>
+            <p:ph type="title"/>
+          </p:nvPr>
+        </p:nvSpPr>
+        <p:spPr>
+          <a:xfrm>
+            <a:off x="457200" y="366780"/>
+            <a:ext cx="8229600" cy="648404"/>
+          </a:xfrm>
+        </p:spPr>
+        <p:txBody>
+          <a:bodyPr/>
+          <a:lstStyle/>
+          <a:p>
+            <a:r>
+              <a:rPr lang="en-US" altLang="ko-KR" dirty="0">
+                <a:latin typeface="+mj-lt"/>
+              </a:rPr>
+              <a:t>Basic Spec</a:t>
+            </a:r>
+            <a:endParaRPr lang="ko-KR" altLang="en-US" dirty="0">
+              <a:latin typeface="+mj-lt"/>
+            </a:endParaRPr>
+          </a:p>
+        </p:txBody>
+      </p:sp>
+      <p:pic>
+        <p:nvPicPr>
+          <p:cNvPr id="7" name="그래픽 6" descr="과녁"/>
+          <p:cNvPicPr>
+            <a:picLocks noChangeAspect="1"/>
+          </p:cNvPicPr>
+          <p:nvPr/>
+        </p:nvPicPr>
+        <p:blipFill>
+          <a:blip r:embed="rId3">
+            <a:extLst>
+              <a:ext uri="{28A0092B-C50C-407E-A947-70E740481C1C}">
+                <a14:useLocalDpi xmlns:a14="http://schemas.microsoft.com/office/drawing/2010/main" val="0"/>
+              </a:ext>
+              <a:ext uri="{96DAC541-7B7A-43D3-8B79-37D633B846F1}">
+                <asvg:svgBlip xmlns="" xmlns:asvg="http://schemas.microsoft.com/office/drawing/2016/SVG/main" r:embed="rId4"/>
+              </a:ext>
+            </a:extLst>
+          </a:blip>
+          <a:stretch>
+            <a:fillRect/>
+          </a:stretch>
+        </p:blipFill>
+        <p:spPr>
+          <a:xfrm>
+            <a:off x="1244991" y="1565030"/>
+            <a:ext cx="1909690" cy="1909690"/>
+          </a:xfrm>
+          <a:prstGeom prst="rect">
+            <a:avLst/>
+          </a:prstGeom>
+        </p:spPr>
+      </p:pic>
+      <p:sp>
+        <p:nvSpPr>
+          <p:cNvPr id="8" name="TextBox 7"/>
+          <p:cNvSpPr txBox="1"/>
+          <p:nvPr/>
+        </p:nvSpPr>
+        <p:spPr>
+          <a:xfrm>
+            <a:off x="3446585" y="2335209"/>
+            <a:ext cx="2371162" cy="461665"/>
+          </a:xfrm>
+          <a:prstGeom prst="rect">
+            <a:avLst/>
+          </a:prstGeom>
+          <a:noFill/>
+        </p:spPr>
+        <p:txBody>
+          <a:bodyPr wrap="none" rtlCol="0">
+            <a:spAutoFit/>
+          </a:bodyPr>
+          <a:lstStyle/>
+          <a:p>
+            <a:r>
+              <a:rPr lang="en-US" altLang="ko-KR" sz="2400" b="1" dirty="0"/>
+              <a:t>&gt;90% accuracy</a:t>
+            </a:r>
+            <a:endParaRPr lang="ko-KR" altLang="en-US" sz="2400" b="1" dirty="0"/>
+          </a:p>
+        </p:txBody>
+      </p:sp>
+      <p:sp>
+        <p:nvSpPr>
+          <p:cNvPr id="9" name="TextBox 8"/>
+          <p:cNvSpPr txBox="1"/>
+          <p:nvPr/>
+        </p:nvSpPr>
+        <p:spPr>
+          <a:xfrm>
+            <a:off x="3446585" y="4381863"/>
+            <a:ext cx="3300904" cy="738664"/>
+          </a:xfrm>
+          <a:prstGeom prst="rect">
+            <a:avLst/>
+          </a:prstGeom>
+          <a:noFill/>
+        </p:spPr>
+        <p:txBody>
+          <a:bodyPr wrap="none" rtlCol="0">
+            <a:spAutoFit/>
+          </a:bodyPr>
+          <a:lstStyle/>
+          <a:p>
+            <a:r>
+              <a:rPr lang="en-US" altLang="ko-KR" sz="2400" b="1" dirty="0"/>
+              <a:t>Respond continuously</a:t>
+            </a:r>
+          </a:p>
+          <a:p>
+            <a:r>
+              <a:rPr lang="en-US" altLang="ko-KR" dirty="0"/>
+              <a:t>by multithreading(Glide API)</a:t>
+            </a:r>
+          </a:p>
+        </p:txBody>
+      </p:sp>
+      <p:pic>
+        <p:nvPicPr>
+          <p:cNvPr id="16" name="그래픽 15" descr="반복"/>
+          <p:cNvPicPr>
+            <a:picLocks noChangeAspect="1"/>
+          </p:cNvPicPr>
+          <p:nvPr/>
+        </p:nvPicPr>
+        <p:blipFill>
+          <a:blip r:embed="rId5">
+            <a:extLst>
+              <a:ext uri="{28A0092B-C50C-407E-A947-70E740481C1C}">
+                <a14:useLocalDpi xmlns:a14="http://schemas.microsoft.com/office/drawing/2010/main" val="0"/>
+              </a:ext>
+              <a:ext uri="{96DAC541-7B7A-43D3-8B79-37D633B846F1}">
+                <asvg:svgBlip xmlns="" xmlns:asvg="http://schemas.microsoft.com/office/drawing/2016/SVG/main" r:embed="rId6"/>
+              </a:ext>
+            </a:extLst>
+          </a:blip>
+          <a:stretch>
+            <a:fillRect/>
+          </a:stretch>
+        </p:blipFill>
+        <p:spPr>
+          <a:xfrm>
+            <a:off x="1324124" y="3829318"/>
+            <a:ext cx="1751423" cy="1751423"/>
+          </a:xfrm>
+          <a:prstGeom prst="rect">
+            <a:avLst/>
+          </a:prstGeom>
+        </p:spPr>
+      </p:pic>
+    </p:spTree>
+    <p:extLst>
+      <p:ext uri="{BB962C8B-B14F-4D97-AF65-F5344CB8AC3E}">
+        <p14:creationId xmlns:p14="http://schemas.microsoft.com/office/powerpoint/2010/main" val="2285308020"/>
+      </p:ext>
+    </p:extLst>
+  </p:cSld>
+  <p:clrMapOvr>
+    <a:masterClrMapping/>
+  </p:clrMapOvr>
+  <p:transition>
+    <p:fade/>
+  </p:transition>
+</p:sld>
+</file>
+
+<file path=ppt/slides/slide11.xml><?xml version="1.0" encoding="utf-8"?>
+<p:sld xmlns:a="http://schemas.openxmlformats.org/drawingml/2006/main" xmlns:r="http://schemas.openxmlformats.org/officeDocument/2006/relationships" xmlns:p="http://schemas.openxmlformats.org/presentationml/2006/main">
+  <p:cSld>
+    <p:spTree>
+      <p:nvGrpSpPr>
+        <p:cNvPr id="1" name=""/>
+        <p:cNvGrpSpPr/>
+        <p:nvPr/>
+      </p:nvGrpSpPr>
+      <p:grpSpPr>
+        <a:xfrm>
+          <a:off x="0" y="0"/>
+          <a:ext cx="0" cy="0"/>
+          <a:chOff x="0" y="0"/>
+          <a:chExt cx="0" cy="0"/>
+        </a:xfrm>
+      </p:grpSpPr>
+      <p:sp>
+        <p:nvSpPr>
           <p:cNvPr id="22" name="TextBox 21"/>
           <p:cNvSpPr txBox="1"/>
           <p:nvPr/>
@@ -7922,7 +8125,7 @@
               <a:rPr lang="en-US" altLang="ko-KR" dirty="0">
                 <a:latin typeface="+mj-lt"/>
               </a:rPr>
-              <a:t>Approach - Application</a:t>
+              <a:t>Basic Spec</a:t>
             </a:r>
             <a:endParaRPr lang="ko-KR" altLang="en-US" dirty="0">
               <a:latin typeface="+mj-lt"/>
@@ -8306,7 +8509,7 @@
 </p:sld>
 </file>
 
-<file path=ppt/slides/slide11.xml><?xml version="1.0" encoding="utf-8"?>
+<file path=ppt/slides/slide12.xml><?xml version="1.0" encoding="utf-8"?>
 <p:sld xmlns:a="http://schemas.openxmlformats.org/drawingml/2006/main" xmlns:r="http://schemas.openxmlformats.org/officeDocument/2006/relationships" xmlns:p="http://schemas.openxmlformats.org/presentationml/2006/main">
   <p:cSld>
     <p:spTree>
@@ -9307,7 +9510,7 @@
 </p:sld>
 </file>
 
-<file path=ppt/slides/slide12.xml><?xml version="1.0" encoding="utf-8"?>
+<file path=ppt/slides/slide13.xml><?xml version="1.0" encoding="utf-8"?>
 <p:sld xmlns:a="http://schemas.openxmlformats.org/drawingml/2006/main" xmlns:r="http://schemas.openxmlformats.org/officeDocument/2006/relationships" xmlns:p="http://schemas.openxmlformats.org/presentationml/2006/main">
   <p:cSld>
     <p:spTree>
@@ -10285,202 +10488,6 @@
 </p:sld>
 </file>
 
-<file path=ppt/slides/slide13.xml><?xml version="1.0" encoding="utf-8"?>
-<p:sld xmlns:a="http://schemas.openxmlformats.org/drawingml/2006/main" xmlns:r="http://schemas.openxmlformats.org/officeDocument/2006/relationships" xmlns:p="http://schemas.openxmlformats.org/presentationml/2006/main">
-  <p:cSld>
-    <p:spTree>
-      <p:nvGrpSpPr>
-        <p:cNvPr id="1" name=""/>
-        <p:cNvGrpSpPr/>
-        <p:nvPr/>
-      </p:nvGrpSpPr>
-      <p:grpSpPr>
-        <a:xfrm>
-          <a:off x="0" y="0"/>
-          <a:ext cx="0" cy="0"/>
-          <a:chOff x="0" y="0"/>
-          <a:chExt cx="0" cy="0"/>
-        </a:xfrm>
-      </p:grpSpPr>
-      <p:sp>
-        <p:nvSpPr>
-          <p:cNvPr id="4" name="제목 3"/>
-          <p:cNvSpPr>
-            <a:spLocks noGrp="1"/>
-          </p:cNvSpPr>
-          <p:nvPr>
-            <p:ph type="title"/>
-          </p:nvPr>
-        </p:nvSpPr>
-        <p:spPr>
-          <a:xfrm>
-            <a:off x="457200" y="366780"/>
-            <a:ext cx="8229600" cy="648404"/>
-          </a:xfrm>
-        </p:spPr>
-        <p:txBody>
-          <a:bodyPr/>
-          <a:lstStyle/>
-          <a:p>
-            <a:r>
-              <a:rPr lang="en-US" altLang="ko-KR" dirty="0">
-                <a:latin typeface="+mj-lt"/>
-              </a:rPr>
-              <a:t>Basic Spec</a:t>
-            </a:r>
-            <a:endParaRPr lang="ko-KR" altLang="en-US" dirty="0">
-              <a:latin typeface="+mj-lt"/>
-            </a:endParaRPr>
-          </a:p>
-        </p:txBody>
-      </p:sp>
-      <p:pic>
-        <p:nvPicPr>
-          <p:cNvPr id="7" name="그래픽 6" descr="과녁"/>
-          <p:cNvPicPr>
-            <a:picLocks noChangeAspect="1"/>
-          </p:cNvPicPr>
-          <p:nvPr/>
-        </p:nvPicPr>
-        <p:blipFill>
-          <a:blip r:embed="rId3">
-            <a:extLst>
-              <a:ext uri="{28A0092B-C50C-407E-A947-70E740481C1C}">
-                <a14:useLocalDpi xmlns:a14="http://schemas.microsoft.com/office/drawing/2010/main" val="0"/>
-              </a:ext>
-              <a:ext uri="{96DAC541-7B7A-43D3-8B79-37D633B846F1}">
-                <asvg:svgBlip xmlns="" xmlns:asvg="http://schemas.microsoft.com/office/drawing/2016/SVG/main" r:embed="rId4"/>
-              </a:ext>
-            </a:extLst>
-          </a:blip>
-          <a:stretch>
-            <a:fillRect/>
-          </a:stretch>
-        </p:blipFill>
-        <p:spPr>
-          <a:xfrm>
-            <a:off x="1244991" y="1565030"/>
-            <a:ext cx="1909690" cy="1909690"/>
-          </a:xfrm>
-          <a:prstGeom prst="rect">
-            <a:avLst/>
-          </a:prstGeom>
-        </p:spPr>
-      </p:pic>
-      <p:sp>
-        <p:nvSpPr>
-          <p:cNvPr id="8" name="TextBox 7"/>
-          <p:cNvSpPr txBox="1"/>
-          <p:nvPr/>
-        </p:nvSpPr>
-        <p:spPr>
-          <a:xfrm>
-            <a:off x="3446585" y="2335209"/>
-            <a:ext cx="2371162" cy="461665"/>
-          </a:xfrm>
-          <a:prstGeom prst="rect">
-            <a:avLst/>
-          </a:prstGeom>
-          <a:noFill/>
-        </p:spPr>
-        <p:txBody>
-          <a:bodyPr wrap="none" rtlCol="0">
-            <a:spAutoFit/>
-          </a:bodyPr>
-          <a:lstStyle/>
-          <a:p>
-            <a:r>
-              <a:rPr lang="en-US" altLang="ko-KR" sz="2400" b="1" dirty="0"/>
-              <a:t>&gt;90% accuracy</a:t>
-            </a:r>
-            <a:endParaRPr lang="ko-KR" altLang="en-US" sz="2400" b="1" dirty="0"/>
-          </a:p>
-        </p:txBody>
-      </p:sp>
-      <p:sp>
-        <p:nvSpPr>
-          <p:cNvPr id="9" name="TextBox 8"/>
-          <p:cNvSpPr txBox="1"/>
-          <p:nvPr/>
-        </p:nvSpPr>
-        <p:spPr>
-          <a:xfrm>
-            <a:off x="3446585" y="4381863"/>
-            <a:ext cx="3300904" cy="738664"/>
-          </a:xfrm>
-          <a:prstGeom prst="rect">
-            <a:avLst/>
-          </a:prstGeom>
-          <a:noFill/>
-        </p:spPr>
-        <p:txBody>
-          <a:bodyPr wrap="none" rtlCol="0">
-            <a:spAutoFit/>
-          </a:bodyPr>
-          <a:lstStyle/>
-          <a:p>
-            <a:r>
-              <a:rPr lang="en-US" altLang="ko-KR" sz="2400" b="1" dirty="0"/>
-              <a:t>Respond continuously</a:t>
-            </a:r>
-          </a:p>
-          <a:p>
-            <a:r>
-              <a:rPr lang="en-US" altLang="ko-KR" dirty="0"/>
-              <a:t>by multithreading(Glide API)</a:t>
-            </a:r>
-          </a:p>
-        </p:txBody>
-      </p:sp>
-      <p:pic>
-        <p:nvPicPr>
-          <p:cNvPr id="16" name="그래픽 15" descr="반복"/>
-          <p:cNvPicPr>
-            <a:picLocks noChangeAspect="1"/>
-          </p:cNvPicPr>
-          <p:nvPr/>
-        </p:nvPicPr>
-        <p:blipFill>
-          <a:blip r:embed="rId5">
-            <a:extLst>
-              <a:ext uri="{28A0092B-C50C-407E-A947-70E740481C1C}">
-                <a14:useLocalDpi xmlns:a14="http://schemas.microsoft.com/office/drawing/2010/main" val="0"/>
-              </a:ext>
-              <a:ext uri="{96DAC541-7B7A-43D3-8B79-37D633B846F1}">
-                <asvg:svgBlip xmlns="" xmlns:asvg="http://schemas.microsoft.com/office/drawing/2016/SVG/main" r:embed="rId6"/>
-              </a:ext>
-            </a:extLst>
-          </a:blip>
-          <a:stretch>
-            <a:fillRect/>
-          </a:stretch>
-        </p:blipFill>
-        <p:spPr>
-          <a:xfrm>
-            <a:off x="1324124" y="3829318"/>
-            <a:ext cx="1751423" cy="1751423"/>
-          </a:xfrm>
-          <a:prstGeom prst="rect">
-            <a:avLst/>
-          </a:prstGeom>
-        </p:spPr>
-      </p:pic>
-    </p:spTree>
-    <p:extLst>
-      <p:ext uri="{BB962C8B-B14F-4D97-AF65-F5344CB8AC3E}">
-        <p14:creationId xmlns:p14="http://schemas.microsoft.com/office/powerpoint/2010/main" val="2285308020"/>
-      </p:ext>
-    </p:extLst>
-  </p:cSld>
-  <p:clrMapOvr>
-    <a:masterClrMapping/>
-  </p:clrMapOvr>
-  <p:transition>
-    <p:fade/>
-  </p:transition>
-</p:sld>
-</file>
-
 <file path=ppt/slides/slide14.xml><?xml version="1.0" encoding="utf-8"?>
 <p:sld xmlns:a="http://schemas.openxmlformats.org/drawingml/2006/main" xmlns:r="http://schemas.openxmlformats.org/officeDocument/2006/relationships" xmlns:p="http://schemas.openxmlformats.org/presentationml/2006/main">
   <p:cSld>
@@ -10520,6 +10527,835 @@
           <a:p>
             <a:r>
               <a:rPr lang="en-US" altLang="ko-KR" dirty="0"/>
+              <a:t>Current Status</a:t>
+            </a:r>
+            <a:endParaRPr lang="ko-KR" altLang="en-US" dirty="0"/>
+          </a:p>
+        </p:txBody>
+      </p:sp>
+      <p:pic>
+        <p:nvPicPr>
+          <p:cNvPr id="5" name="Picture 4"/>
+          <p:cNvPicPr>
+            <a:picLocks noChangeAspect="1"/>
+          </p:cNvPicPr>
+          <p:nvPr/>
+        </p:nvPicPr>
+        <p:blipFill rotWithShape="1">
+          <a:blip r:embed="rId3" cstate="print">
+            <a:duotone>
+              <a:schemeClr val="accent2">
+                <a:shade val="45000"/>
+                <a:satMod val="135000"/>
+              </a:schemeClr>
+              <a:prstClr val="white"/>
+            </a:duotone>
+            <a:extLst>
+              <a:ext uri="{28A0092B-C50C-407E-A947-70E740481C1C}">
+                <a14:useLocalDpi xmlns:a14="http://schemas.microsoft.com/office/drawing/2010/main" val="0"/>
+              </a:ext>
+            </a:extLst>
+          </a:blip>
+          <a:srcRect l="4326" r="6312" b="13759"/>
+          <a:stretch/>
+        </p:blipFill>
+        <p:spPr>
+          <a:xfrm>
+            <a:off x="1421400" y="1550243"/>
+            <a:ext cx="1846218" cy="1781747"/>
+          </a:xfrm>
+          <a:prstGeom prst="rect">
+            <a:avLst/>
+          </a:prstGeom>
+        </p:spPr>
+      </p:pic>
+      <p:pic>
+        <p:nvPicPr>
+          <p:cNvPr id="7" name="Picture 6"/>
+          <p:cNvPicPr>
+            <a:picLocks noChangeAspect="1"/>
+          </p:cNvPicPr>
+          <p:nvPr/>
+        </p:nvPicPr>
+        <p:blipFill rotWithShape="1">
+          <a:blip r:embed="rId4" cstate="print">
+            <a:clrChange>
+              <a:clrFrom>
+                <a:srgbClr val="000000">
+                  <a:alpha val="0"/>
+                </a:srgbClr>
+              </a:clrFrom>
+              <a:clrTo>
+                <a:srgbClr val="000000">
+                  <a:alpha val="0"/>
+                </a:srgbClr>
+              </a:clrTo>
+            </a:clrChange>
+            <a:alphaModFix/>
+            <a:duotone>
+              <a:schemeClr val="accent2">
+                <a:shade val="45000"/>
+                <a:satMod val="135000"/>
+              </a:schemeClr>
+              <a:prstClr val="white"/>
+            </a:duotone>
+            <a:extLst>
+              <a:ext uri="{28A0092B-C50C-407E-A947-70E740481C1C}">
+                <a14:useLocalDpi xmlns:a14="http://schemas.microsoft.com/office/drawing/2010/main" val="0"/>
+              </a:ext>
+            </a:extLst>
+          </a:blip>
+          <a:srcRect b="15146"/>
+          <a:stretch/>
+        </p:blipFill>
+        <p:spPr>
+          <a:xfrm>
+            <a:off x="1223207" y="3854996"/>
+            <a:ext cx="1931474" cy="1638936"/>
+          </a:xfrm>
+          <a:prstGeom prst="rect">
+            <a:avLst/>
+          </a:prstGeom>
+        </p:spPr>
+      </p:pic>
+      <p:sp>
+        <p:nvSpPr>
+          <p:cNvPr id="10" name="TextBox 9"/>
+          <p:cNvSpPr txBox="1"/>
+          <p:nvPr/>
+        </p:nvSpPr>
+        <p:spPr>
+          <a:xfrm>
+            <a:off x="3590689" y="3842246"/>
+            <a:ext cx="3538148" cy="1785104"/>
+          </a:xfrm>
+          <a:prstGeom prst="rect">
+            <a:avLst/>
+          </a:prstGeom>
+          <a:noFill/>
+        </p:spPr>
+        <p:txBody>
+          <a:bodyPr wrap="none" rtlCol="0">
+            <a:spAutoFit/>
+          </a:bodyPr>
+          <a:lstStyle/>
+          <a:p>
+            <a:pPr>
+              <a:lnSpc>
+                <a:spcPts val="3300"/>
+              </a:lnSpc>
+            </a:pPr>
+            <a:r>
+              <a:rPr lang="ko-KR" altLang="en-US" sz="2400" b="1" dirty="0"/>
+              <a:t>면담</a:t>
+            </a:r>
+            <a:endParaRPr lang="en-US" altLang="ko-KR" sz="2400" b="1" dirty="0"/>
+          </a:p>
+          <a:p>
+            <a:pPr marL="285750" indent="-285750">
+              <a:lnSpc>
+                <a:spcPts val="3300"/>
+              </a:lnSpc>
+              <a:buFontTx/>
+              <a:buChar char="-"/>
+            </a:pPr>
+            <a:r>
+              <a:rPr lang="en-US" altLang="ko-KR" dirty="0"/>
+              <a:t>AR</a:t>
+            </a:r>
+            <a:r>
+              <a:rPr lang="ko-KR" altLang="en-US" dirty="0"/>
+              <a:t> </a:t>
+            </a:r>
+            <a:r>
+              <a:rPr lang="en-US" altLang="ko-KR" dirty="0"/>
+              <a:t>Player </a:t>
+            </a:r>
+            <a:r>
+              <a:rPr lang="ko-KR" altLang="en-US" dirty="0"/>
+              <a:t>형식</a:t>
+            </a:r>
+            <a:r>
+              <a:rPr lang="en-US" altLang="ko-KR" dirty="0"/>
+              <a:t>,</a:t>
+            </a:r>
+            <a:r>
+              <a:rPr lang="ko-KR" altLang="en-US" dirty="0"/>
+              <a:t> 웹툰 원고</a:t>
+            </a:r>
+            <a:r>
+              <a:rPr lang="en-US" altLang="ko-KR" dirty="0"/>
+              <a:t> </a:t>
+            </a:r>
+            <a:r>
+              <a:rPr lang="ko-KR" altLang="en-US" dirty="0"/>
+              <a:t>선정</a:t>
+            </a:r>
+            <a:endParaRPr lang="en-US" altLang="ko-KR" dirty="0"/>
+          </a:p>
+          <a:p>
+            <a:pPr marL="285750" indent="-285750">
+              <a:lnSpc>
+                <a:spcPts val="3300"/>
+              </a:lnSpc>
+              <a:buFontTx/>
+              <a:buChar char="-"/>
+            </a:pPr>
+            <a:r>
+              <a:rPr lang="en-US" altLang="ko-KR" dirty="0"/>
+              <a:t>Study </a:t>
+            </a:r>
+            <a:r>
+              <a:rPr lang="ko-KR" altLang="en-US" dirty="0"/>
+              <a:t>분야 분담</a:t>
+            </a:r>
+            <a:endParaRPr lang="en-US" altLang="ko-KR" dirty="0"/>
+          </a:p>
+          <a:p>
+            <a:pPr marL="285750" indent="-285750">
+              <a:lnSpc>
+                <a:spcPts val="3300"/>
+              </a:lnSpc>
+              <a:buFontTx/>
+              <a:buChar char="-"/>
+            </a:pPr>
+            <a:r>
+              <a:rPr lang="ko-KR" altLang="en-US" dirty="0"/>
+              <a:t>메신저와 </a:t>
+            </a:r>
+            <a:r>
+              <a:rPr lang="en-US" altLang="ko-KR" dirty="0"/>
+              <a:t>GitHub</a:t>
+            </a:r>
+            <a:r>
+              <a:rPr lang="ko-KR" altLang="en-US" dirty="0"/>
+              <a:t>를 통한 소통</a:t>
+            </a:r>
+            <a:endParaRPr lang="en-US" altLang="ko-KR" dirty="0"/>
+          </a:p>
+        </p:txBody>
+      </p:sp>
+      <p:sp>
+        <p:nvSpPr>
+          <p:cNvPr id="12" name="TextBox 11"/>
+          <p:cNvSpPr txBox="1"/>
+          <p:nvPr/>
+        </p:nvSpPr>
+        <p:spPr>
+          <a:xfrm>
+            <a:off x="3559706" y="1573853"/>
+            <a:ext cx="3609321" cy="1361911"/>
+          </a:xfrm>
+          <a:prstGeom prst="rect">
+            <a:avLst/>
+          </a:prstGeom>
+          <a:noFill/>
+        </p:spPr>
+        <p:txBody>
+          <a:bodyPr wrap="none" rtlCol="0">
+            <a:spAutoFit/>
+          </a:bodyPr>
+          <a:lstStyle/>
+          <a:p>
+            <a:pPr>
+              <a:lnSpc>
+                <a:spcPts val="3300"/>
+              </a:lnSpc>
+            </a:pPr>
+            <a:r>
+              <a:rPr lang="ko-KR" altLang="en-US" sz="2400" b="1" dirty="0"/>
+              <a:t>스터디</a:t>
+            </a:r>
+            <a:endParaRPr lang="en-US" altLang="ko-KR" sz="2400" b="1" dirty="0"/>
+          </a:p>
+          <a:p>
+            <a:pPr marL="285750" indent="-285750">
+              <a:lnSpc>
+                <a:spcPts val="3300"/>
+              </a:lnSpc>
+              <a:buFontTx/>
+              <a:buChar char="-"/>
+            </a:pPr>
+            <a:r>
+              <a:rPr lang="en-US" altLang="ko-KR" dirty="0" err="1"/>
+              <a:t>TensorFlow</a:t>
+            </a:r>
+            <a:r>
+              <a:rPr lang="en-US" altLang="ko-KR" dirty="0"/>
+              <a:t>: Terms, MNIST,</a:t>
+            </a:r>
+            <a:r>
+              <a:rPr lang="ko-KR" altLang="en-US" dirty="0"/>
+              <a:t> </a:t>
+            </a:r>
+            <a:r>
+              <a:rPr lang="mr-IN" altLang="ko-KR" dirty="0"/>
+              <a:t>…</a:t>
+            </a:r>
+            <a:endParaRPr lang="en-US" altLang="ko-KR" dirty="0"/>
+          </a:p>
+          <a:p>
+            <a:pPr marL="285750" indent="-285750">
+              <a:lnSpc>
+                <a:spcPts val="3300"/>
+              </a:lnSpc>
+              <a:buFontTx/>
+              <a:buChar char="-"/>
+            </a:pPr>
+            <a:r>
+              <a:rPr lang="en-US" altLang="ko-KR" dirty="0"/>
+              <a:t>Android: Android API, </a:t>
+            </a:r>
+            <a:r>
+              <a:rPr lang="mr-IN" altLang="ko-KR" dirty="0"/>
+              <a:t>…</a:t>
+            </a:r>
+            <a:endParaRPr lang="en-US" altLang="ko-KR" dirty="0"/>
+          </a:p>
+        </p:txBody>
+      </p:sp>
+    </p:spTree>
+    <p:extLst>
+      <p:ext uri="{BB962C8B-B14F-4D97-AF65-F5344CB8AC3E}">
+        <p14:creationId xmlns:p14="http://schemas.microsoft.com/office/powerpoint/2010/main" val="1496718616"/>
+      </p:ext>
+    </p:extLst>
+  </p:cSld>
+  <p:clrMapOvr>
+    <a:masterClrMapping/>
+  </p:clrMapOvr>
+  <p:transition>
+    <p:fade/>
+  </p:transition>
+</p:sld>
+</file>
+
+<file path=ppt/slides/slide15.xml><?xml version="1.0" encoding="utf-8"?>
+<p:sld xmlns:a="http://schemas.openxmlformats.org/drawingml/2006/main" xmlns:r="http://schemas.openxmlformats.org/officeDocument/2006/relationships" xmlns:p="http://schemas.openxmlformats.org/presentationml/2006/main">
+  <p:cSld>
+    <p:spTree>
+      <p:nvGrpSpPr>
+        <p:cNvPr id="1" name=""/>
+        <p:cNvGrpSpPr/>
+        <p:nvPr/>
+      </p:nvGrpSpPr>
+      <p:grpSpPr>
+        <a:xfrm>
+          <a:off x="0" y="0"/>
+          <a:ext cx="0" cy="0"/>
+          <a:chOff x="0" y="0"/>
+          <a:chExt cx="0" cy="0"/>
+        </a:xfrm>
+      </p:grpSpPr>
+      <p:sp>
+        <p:nvSpPr>
+          <p:cNvPr id="4" name="제목 3"/>
+          <p:cNvSpPr>
+            <a:spLocks noGrp="1"/>
+          </p:cNvSpPr>
+          <p:nvPr>
+            <p:ph type="title"/>
+          </p:nvPr>
+        </p:nvSpPr>
+        <p:spPr>
+          <a:xfrm>
+            <a:off x="457200" y="366780"/>
+            <a:ext cx="8229600" cy="648404"/>
+          </a:xfrm>
+        </p:spPr>
+        <p:txBody>
+          <a:bodyPr/>
+          <a:lstStyle/>
+          <a:p>
+            <a:r>
+              <a:rPr lang="en-US" altLang="ko-KR" dirty="0"/>
+              <a:t>Further Plan</a:t>
+            </a:r>
+            <a:endParaRPr lang="ko-KR" altLang="en-US" dirty="0"/>
+          </a:p>
+        </p:txBody>
+      </p:sp>
+      <p:cxnSp>
+        <p:nvCxnSpPr>
+          <p:cNvPr id="10" name="직선 연결선 9"/>
+          <p:cNvCxnSpPr/>
+          <p:nvPr/>
+        </p:nvCxnSpPr>
+        <p:spPr>
+          <a:xfrm flipH="1">
+            <a:off x="1192945" y="1944909"/>
+            <a:ext cx="2" cy="3931477"/>
+          </a:xfrm>
+          <a:prstGeom prst="line">
+            <a:avLst/>
+          </a:prstGeom>
+          <a:ln w="38100">
+            <a:solidFill>
+              <a:schemeClr val="tx1">
+                <a:lumMod val="50000"/>
+                <a:lumOff val="50000"/>
+              </a:schemeClr>
+            </a:solidFill>
+          </a:ln>
+        </p:spPr>
+        <p:style>
+          <a:lnRef idx="1">
+            <a:schemeClr val="accent1"/>
+          </a:lnRef>
+          <a:fillRef idx="0">
+            <a:schemeClr val="accent1"/>
+          </a:fillRef>
+          <a:effectRef idx="0">
+            <a:schemeClr val="accent1"/>
+          </a:effectRef>
+          <a:fontRef idx="minor">
+            <a:schemeClr val="tx1"/>
+          </a:fontRef>
+        </p:style>
+      </p:cxnSp>
+      <p:sp>
+        <p:nvSpPr>
+          <p:cNvPr id="6" name="타원 5"/>
+          <p:cNvSpPr/>
+          <p:nvPr/>
+        </p:nvSpPr>
+        <p:spPr>
+          <a:xfrm>
+            <a:off x="803538" y="1564143"/>
+            <a:ext cx="761533" cy="761533"/>
+          </a:xfrm>
+          <a:prstGeom prst="ellipse">
+            <a:avLst/>
+          </a:prstGeom>
+          <a:solidFill>
+            <a:schemeClr val="bg1"/>
+          </a:solidFill>
+          <a:ln w="38100">
+            <a:solidFill>
+              <a:srgbClr val="00B050"/>
+            </a:solidFill>
+          </a:ln>
+        </p:spPr>
+        <p:style>
+          <a:lnRef idx="2">
+            <a:schemeClr val="accent1">
+              <a:shade val="50000"/>
+            </a:schemeClr>
+          </a:lnRef>
+          <a:fillRef idx="1">
+            <a:schemeClr val="accent1"/>
+          </a:fillRef>
+          <a:effectRef idx="0">
+            <a:schemeClr val="accent1"/>
+          </a:effectRef>
+          <a:fontRef idx="minor">
+            <a:schemeClr val="lt1"/>
+          </a:fontRef>
+        </p:style>
+        <p:txBody>
+          <a:bodyPr rtlCol="0" anchor="ctr"/>
+          <a:lstStyle/>
+          <a:p>
+            <a:pPr algn="ctr"/>
+            <a:endParaRPr lang="ko-KR" altLang="en-US" spc="80" dirty="0">
+              <a:solidFill>
+                <a:schemeClr val="bg1"/>
+              </a:solidFill>
+              <a:latin typeface="나눔고딕" pitchFamily="50" charset="-127"/>
+              <a:ea typeface="나눔고딕" pitchFamily="50" charset="-127"/>
+            </a:endParaRPr>
+          </a:p>
+        </p:txBody>
+      </p:sp>
+      <p:sp>
+        <p:nvSpPr>
+          <p:cNvPr id="7" name="타원 6"/>
+          <p:cNvSpPr/>
+          <p:nvPr/>
+        </p:nvSpPr>
+        <p:spPr>
+          <a:xfrm>
+            <a:off x="803537" y="2874636"/>
+            <a:ext cx="761533" cy="761533"/>
+          </a:xfrm>
+          <a:prstGeom prst="ellipse">
+            <a:avLst/>
+          </a:prstGeom>
+          <a:solidFill>
+            <a:schemeClr val="bg1"/>
+          </a:solidFill>
+          <a:ln w="38100">
+            <a:solidFill>
+              <a:srgbClr val="00B050"/>
+            </a:solidFill>
+          </a:ln>
+        </p:spPr>
+        <p:style>
+          <a:lnRef idx="2">
+            <a:schemeClr val="accent1">
+              <a:shade val="50000"/>
+            </a:schemeClr>
+          </a:lnRef>
+          <a:fillRef idx="1">
+            <a:schemeClr val="accent1"/>
+          </a:fillRef>
+          <a:effectRef idx="0">
+            <a:schemeClr val="accent1"/>
+          </a:effectRef>
+          <a:fontRef idx="minor">
+            <a:schemeClr val="lt1"/>
+          </a:fontRef>
+        </p:style>
+        <p:txBody>
+          <a:bodyPr rtlCol="0" anchor="ctr"/>
+          <a:lstStyle/>
+          <a:p>
+            <a:pPr algn="ctr"/>
+            <a:endParaRPr lang="ko-KR" altLang="en-US" spc="80" dirty="0">
+              <a:solidFill>
+                <a:schemeClr val="bg1"/>
+              </a:solidFill>
+              <a:latin typeface="나눔고딕" pitchFamily="50" charset="-127"/>
+              <a:ea typeface="나눔고딕" pitchFamily="50" charset="-127"/>
+            </a:endParaRPr>
+          </a:p>
+        </p:txBody>
+      </p:sp>
+      <p:sp>
+        <p:nvSpPr>
+          <p:cNvPr id="8" name="타원 7"/>
+          <p:cNvSpPr/>
+          <p:nvPr/>
+        </p:nvSpPr>
+        <p:spPr>
+          <a:xfrm>
+            <a:off x="803536" y="4185128"/>
+            <a:ext cx="761533" cy="761533"/>
+          </a:xfrm>
+          <a:prstGeom prst="ellipse">
+            <a:avLst/>
+          </a:prstGeom>
+          <a:solidFill>
+            <a:schemeClr val="bg1"/>
+          </a:solidFill>
+          <a:ln w="38100">
+            <a:solidFill>
+              <a:srgbClr val="00B050"/>
+            </a:solidFill>
+          </a:ln>
+        </p:spPr>
+        <p:style>
+          <a:lnRef idx="2">
+            <a:schemeClr val="accent1">
+              <a:shade val="50000"/>
+            </a:schemeClr>
+          </a:lnRef>
+          <a:fillRef idx="1">
+            <a:schemeClr val="accent1"/>
+          </a:fillRef>
+          <a:effectRef idx="0">
+            <a:schemeClr val="accent1"/>
+          </a:effectRef>
+          <a:fontRef idx="minor">
+            <a:schemeClr val="lt1"/>
+          </a:fontRef>
+        </p:style>
+        <p:txBody>
+          <a:bodyPr rtlCol="0" anchor="ctr"/>
+          <a:lstStyle/>
+          <a:p>
+            <a:pPr algn="ctr"/>
+            <a:endParaRPr lang="ko-KR" altLang="en-US" spc="80" dirty="0">
+              <a:solidFill>
+                <a:schemeClr val="bg1"/>
+              </a:solidFill>
+              <a:latin typeface="나눔고딕" pitchFamily="50" charset="-127"/>
+              <a:ea typeface="나눔고딕" pitchFamily="50" charset="-127"/>
+            </a:endParaRPr>
+          </a:p>
+        </p:txBody>
+      </p:sp>
+      <p:sp>
+        <p:nvSpPr>
+          <p:cNvPr id="9" name="타원 7"/>
+          <p:cNvSpPr/>
+          <p:nvPr/>
+        </p:nvSpPr>
+        <p:spPr>
+          <a:xfrm>
+            <a:off x="803536" y="5495620"/>
+            <a:ext cx="761533" cy="761533"/>
+          </a:xfrm>
+          <a:prstGeom prst="ellipse">
+            <a:avLst/>
+          </a:prstGeom>
+          <a:solidFill>
+            <a:schemeClr val="bg1"/>
+          </a:solidFill>
+          <a:ln w="38100">
+            <a:solidFill>
+              <a:srgbClr val="00B050"/>
+            </a:solidFill>
+          </a:ln>
+        </p:spPr>
+        <p:style>
+          <a:lnRef idx="2">
+            <a:schemeClr val="accent1">
+              <a:shade val="50000"/>
+            </a:schemeClr>
+          </a:lnRef>
+          <a:fillRef idx="1">
+            <a:schemeClr val="accent1"/>
+          </a:fillRef>
+          <a:effectRef idx="0">
+            <a:schemeClr val="accent1"/>
+          </a:effectRef>
+          <a:fontRef idx="minor">
+            <a:schemeClr val="lt1"/>
+          </a:fontRef>
+        </p:style>
+        <p:txBody>
+          <a:bodyPr rtlCol="0" anchor="ctr"/>
+          <a:lstStyle/>
+          <a:p>
+            <a:pPr algn="ctr"/>
+            <a:endParaRPr lang="ko-KR" altLang="en-US" spc="80" dirty="0">
+              <a:solidFill>
+                <a:schemeClr val="bg1"/>
+              </a:solidFill>
+              <a:latin typeface="나눔고딕" pitchFamily="50" charset="-127"/>
+              <a:ea typeface="나눔고딕" pitchFamily="50" charset="-127"/>
+            </a:endParaRPr>
+          </a:p>
+        </p:txBody>
+      </p:sp>
+      <p:sp>
+        <p:nvSpPr>
+          <p:cNvPr id="11" name="TextBox 10"/>
+          <p:cNvSpPr txBox="1"/>
+          <p:nvPr/>
+        </p:nvSpPr>
+        <p:spPr>
+          <a:xfrm>
+            <a:off x="1740470" y="1714076"/>
+            <a:ext cx="5886015" cy="461665"/>
+          </a:xfrm>
+          <a:prstGeom prst="rect">
+            <a:avLst/>
+          </a:prstGeom>
+          <a:noFill/>
+        </p:spPr>
+        <p:txBody>
+          <a:bodyPr wrap="square" rtlCol="0">
+            <a:spAutoFit/>
+          </a:bodyPr>
+          <a:lstStyle/>
+          <a:p>
+            <a:r>
+              <a:rPr lang="en-US" altLang="ko-KR" sz="2400" dirty="0" err="1"/>
+              <a:t>TensorFlow</a:t>
+            </a:r>
+            <a:r>
+              <a:rPr lang="ko-KR" altLang="en-US" sz="2400" dirty="0"/>
+              <a:t> </a:t>
+            </a:r>
+            <a:r>
+              <a:rPr lang="en-US" altLang="ko-KR" dirty="0"/>
+              <a:t>CNN, Training Datasets, </a:t>
+            </a:r>
+            <a:r>
+              <a:rPr lang="mr-IN" altLang="ko-KR" dirty="0"/>
+              <a:t>…</a:t>
+            </a:r>
+            <a:endParaRPr lang="ko-KR" altLang="en-US" dirty="0"/>
+          </a:p>
+        </p:txBody>
+      </p:sp>
+      <p:sp>
+        <p:nvSpPr>
+          <p:cNvPr id="13" name="TextBox 12"/>
+          <p:cNvSpPr txBox="1"/>
+          <p:nvPr/>
+        </p:nvSpPr>
+        <p:spPr>
+          <a:xfrm>
+            <a:off x="1740470" y="3024569"/>
+            <a:ext cx="5516364" cy="461665"/>
+          </a:xfrm>
+          <a:prstGeom prst="rect">
+            <a:avLst/>
+          </a:prstGeom>
+          <a:noFill/>
+        </p:spPr>
+        <p:txBody>
+          <a:bodyPr wrap="square" rtlCol="0">
+            <a:spAutoFit/>
+          </a:bodyPr>
+          <a:lstStyle/>
+          <a:p>
+            <a:r>
+              <a:rPr lang="en-US" altLang="ko-KR" sz="2400" dirty="0"/>
+              <a:t>Android</a:t>
+            </a:r>
+            <a:r>
+              <a:rPr lang="ko-KR" altLang="en-US" sz="2400" dirty="0"/>
+              <a:t> </a:t>
+            </a:r>
+            <a:r>
+              <a:rPr lang="en-US" altLang="ko-KR" dirty="0" err="1"/>
+              <a:t>RecyclerView</a:t>
+            </a:r>
+            <a:r>
+              <a:rPr lang="en-US" altLang="ko-KR" dirty="0"/>
+              <a:t>, Activity Life Cycle, </a:t>
+            </a:r>
+            <a:r>
+              <a:rPr lang="mr-IN" altLang="ko-KR" dirty="0"/>
+              <a:t>…</a:t>
+            </a:r>
+            <a:endParaRPr lang="ko-KR" altLang="en-US" dirty="0"/>
+          </a:p>
+        </p:txBody>
+      </p:sp>
+      <p:sp>
+        <p:nvSpPr>
+          <p:cNvPr id="14" name="TextBox 13"/>
+          <p:cNvSpPr txBox="1"/>
+          <p:nvPr/>
+        </p:nvSpPr>
+        <p:spPr>
+          <a:xfrm>
+            <a:off x="1740470" y="4335061"/>
+            <a:ext cx="4824551" cy="461665"/>
+          </a:xfrm>
+          <a:prstGeom prst="rect">
+            <a:avLst/>
+          </a:prstGeom>
+          <a:noFill/>
+        </p:spPr>
+        <p:txBody>
+          <a:bodyPr wrap="square" rtlCol="0">
+            <a:spAutoFit/>
+          </a:bodyPr>
+          <a:lstStyle/>
+          <a:p>
+            <a:r>
+              <a:rPr lang="en-US" altLang="ko-KR" sz="2400" dirty="0"/>
+              <a:t>Graphics</a:t>
+            </a:r>
+            <a:r>
+              <a:rPr lang="ko-KR" altLang="en-US" sz="2400" dirty="0"/>
+              <a:t> </a:t>
+            </a:r>
+            <a:r>
+              <a:rPr lang="en-US" altLang="ko-KR" dirty="0" err="1"/>
+              <a:t>openGL</a:t>
+            </a:r>
+            <a:r>
+              <a:rPr lang="en-US" altLang="ko-KR" dirty="0"/>
+              <a:t>, Glide, </a:t>
+            </a:r>
+            <a:r>
+              <a:rPr lang="mr-IN" altLang="ko-KR" dirty="0"/>
+              <a:t>…</a:t>
+            </a:r>
+            <a:endParaRPr lang="ko-KR" altLang="en-US" dirty="0"/>
+          </a:p>
+        </p:txBody>
+      </p:sp>
+      <p:sp>
+        <p:nvSpPr>
+          <p:cNvPr id="15" name="TextBox 14"/>
+          <p:cNvSpPr txBox="1"/>
+          <p:nvPr/>
+        </p:nvSpPr>
+        <p:spPr>
+          <a:xfrm>
+            <a:off x="1740469" y="5645553"/>
+            <a:ext cx="4824551" cy="461665"/>
+          </a:xfrm>
+          <a:prstGeom prst="rect">
+            <a:avLst/>
+          </a:prstGeom>
+          <a:noFill/>
+        </p:spPr>
+        <p:txBody>
+          <a:bodyPr wrap="square" rtlCol="0">
+            <a:spAutoFit/>
+          </a:bodyPr>
+          <a:lstStyle/>
+          <a:p>
+            <a:r>
+              <a:rPr lang="en-US" altLang="ko-KR" sz="2400" dirty="0"/>
+              <a:t>Database </a:t>
+            </a:r>
+            <a:r>
+              <a:rPr lang="en-US" altLang="ko-KR" dirty="0"/>
+              <a:t>SQLite, realm, </a:t>
+            </a:r>
+            <a:r>
+              <a:rPr lang="mr-IN" altLang="ko-KR" dirty="0"/>
+              <a:t>…</a:t>
+            </a:r>
+            <a:endParaRPr lang="ko-KR" altLang="en-US" dirty="0"/>
+          </a:p>
+        </p:txBody>
+      </p:sp>
+    </p:spTree>
+    <p:extLst>
+      <p:ext uri="{BB962C8B-B14F-4D97-AF65-F5344CB8AC3E}">
+        <p14:creationId xmlns:p14="http://schemas.microsoft.com/office/powerpoint/2010/main" val="475326152"/>
+      </p:ext>
+    </p:extLst>
+  </p:cSld>
+  <p:clrMapOvr>
+    <a:masterClrMapping/>
+  </p:clrMapOvr>
+  <p:transition>
+    <p:fade/>
+  </p:transition>
+</p:sld>
+</file>
+
+<file path=ppt/slides/slide16.xml><?xml version="1.0" encoding="utf-8"?>
+<p:sld xmlns:a="http://schemas.openxmlformats.org/drawingml/2006/main" xmlns:r="http://schemas.openxmlformats.org/officeDocument/2006/relationships" xmlns:p="http://schemas.openxmlformats.org/presentationml/2006/main">
+  <p:cSld>
+    <p:spTree>
+      <p:nvGrpSpPr>
+        <p:cNvPr id="1" name=""/>
+        <p:cNvGrpSpPr/>
+        <p:nvPr/>
+      </p:nvGrpSpPr>
+      <p:grpSpPr>
+        <a:xfrm>
+          <a:off x="0" y="0"/>
+          <a:ext cx="0" cy="0"/>
+          <a:chOff x="0" y="0"/>
+          <a:chExt cx="0" cy="0"/>
+        </a:xfrm>
+      </p:grpSpPr>
+      <p:sp>
+        <p:nvSpPr>
+          <p:cNvPr id="4" name="제목 3"/>
+          <p:cNvSpPr>
+            <a:spLocks noGrp="1"/>
+          </p:cNvSpPr>
+          <p:nvPr>
+            <p:ph type="title"/>
+          </p:nvPr>
+        </p:nvSpPr>
+        <p:spPr>
+          <a:xfrm>
+            <a:off x="457200" y="366780"/>
+            <a:ext cx="8229600" cy="648404"/>
+          </a:xfrm>
+        </p:spPr>
+        <p:txBody>
+          <a:bodyPr/>
+          <a:lstStyle/>
+          <a:p>
+            <a:r>
+              <a:rPr lang="en-US" altLang="ko-KR" dirty="0"/>
               <a:t>Division and Assignment of Work</a:t>
             </a:r>
             <a:endParaRPr lang="ko-KR" altLang="en-US" dirty="0"/>
@@ -10538,8 +11374,8 @@
         </p:nvSpPr>
         <p:spPr bwMode="auto">
           <a:xfrm>
-            <a:off x="894525" y="1340165"/>
-            <a:ext cx="7212231" cy="1471557"/>
+            <a:off x="894525" y="1562982"/>
+            <a:ext cx="7212231" cy="1025922"/>
           </a:xfrm>
           <a:prstGeom prst="rect">
             <a:avLst/>
@@ -10682,48 +11518,6 @@
               </a:solidFill>
               <a:latin typeface="Arial" panose="020B0604020202020204" pitchFamily="34" charset="0"/>
               <a:cs typeface="Arial" panose="020B0604020202020204" pitchFamily="34" charset="0"/>
-            </a:endParaRPr>
-          </a:p>
-          <a:p>
-            <a:pPr marR="0" lvl="0" algn="l" defTabSz="914400" rtl="0" eaLnBrk="0" fontAlgn="base" latinLnBrk="0" hangingPunct="0">
-              <a:lnSpc>
-                <a:spcPts val="4000"/>
-              </a:lnSpc>
-              <a:spcBef>
-                <a:spcPct val="0"/>
-              </a:spcBef>
-              <a:spcAft>
-                <a:spcPct val="0"/>
-              </a:spcAft>
-              <a:buClrTx/>
-              <a:buSzTx/>
-              <a:buFontTx/>
-              <a:buChar char="-"/>
-              <a:tabLst/>
-            </a:pPr>
-            <a:r>
-              <a:rPr kumimoji="0" lang="ko-KR" altLang="en-US" sz="2000" b="0" i="0" u="none" strike="noStrike" cap="none" normalizeH="0" baseline="0" dirty="0">
-                <a:ln>
-                  <a:noFill/>
-                </a:ln>
-                <a:solidFill>
-                  <a:srgbClr val="000000"/>
-                </a:solidFill>
-                <a:effectLst/>
-                <a:latin typeface="Arial" panose="020B0604020202020204" pitchFamily="34" charset="0"/>
-                <a:cs typeface="Arial" panose="020B0604020202020204" pitchFamily="34" charset="0"/>
-              </a:rPr>
-              <a:t>하위 분야는 상황에 따라 분담</a:t>
-            </a:r>
-            <a:endParaRPr kumimoji="0" lang="ko-KR" altLang="ko-KR" sz="4800" b="0" i="0" u="none" strike="noStrike" cap="none" normalizeH="0" baseline="0" dirty="0">
-              <a:ln>
-                <a:noFill/>
-              </a:ln>
-              <a:solidFill>
-                <a:schemeClr val="tx1"/>
-              </a:solidFill>
-              <a:effectLst/>
-              <a:latin typeface="Arial" panose="020B0604020202020204" pitchFamily="34" charset="0"/>
             </a:endParaRPr>
           </a:p>
         </p:txBody>
@@ -10924,8 +11718,8 @@
           </p:nvSpPr>
           <p:spPr>
             <a:xfrm>
-              <a:off x="2015918" y="4038647"/>
-              <a:ext cx="2003898" cy="369332"/>
+              <a:off x="2015917" y="4038647"/>
+              <a:ext cx="2680025" cy="369332"/>
             </a:xfrm>
             <a:prstGeom prst="rect">
               <a:avLst/>
@@ -10942,6 +11736,14 @@
               <a:r>
                 <a:rPr lang="ko-KR" altLang="en-US" dirty="0"/>
                 <a:t>강민지 </a:t>
+              </a:r>
+              <a:r>
+                <a:rPr lang="ko-KR" altLang="en-US" dirty="0" err="1"/>
+                <a:t>핌언</a:t>
+              </a:r>
+              <a:r>
+                <a:rPr lang="ko-KR" altLang="en-US" dirty="0"/>
+                <a:t> </a:t>
               </a:r>
               <a:r>
                 <a:rPr lang="en-US" altLang="ko-KR" sz="1400" dirty="0" err="1"/>
@@ -10976,7 +11778,7 @@
               <a:pPr algn="ctr"/>
               <a:r>
                 <a:rPr lang="ko-KR" altLang="en-US" dirty="0"/>
-                <a:t>원종훈 핌언 </a:t>
+                <a:t>원종훈 </a:t>
               </a:r>
               <a:r>
                 <a:rPr lang="en-US" altLang="ko-KR" sz="1400" dirty="0"/>
@@ -10991,849 +11793,6 @@
     <p:extLst>
       <p:ext uri="{BB962C8B-B14F-4D97-AF65-F5344CB8AC3E}">
         <p14:creationId xmlns:p14="http://schemas.microsoft.com/office/powerpoint/2010/main" val="1461754398"/>
-      </p:ext>
-    </p:extLst>
-  </p:cSld>
-  <p:clrMapOvr>
-    <a:masterClrMapping/>
-  </p:clrMapOvr>
-  <p:transition>
-    <p:fade/>
-  </p:transition>
-</p:sld>
-</file>
-
-<file path=ppt/slides/slide15.xml><?xml version="1.0" encoding="utf-8"?>
-<p:sld xmlns:a="http://schemas.openxmlformats.org/drawingml/2006/main" xmlns:r="http://schemas.openxmlformats.org/officeDocument/2006/relationships" xmlns:p="http://schemas.openxmlformats.org/presentationml/2006/main">
-  <p:cSld>
-    <p:spTree>
-      <p:nvGrpSpPr>
-        <p:cNvPr id="1" name=""/>
-        <p:cNvGrpSpPr/>
-        <p:nvPr/>
-      </p:nvGrpSpPr>
-      <p:grpSpPr>
-        <a:xfrm>
-          <a:off x="0" y="0"/>
-          <a:ext cx="0" cy="0"/>
-          <a:chOff x="0" y="0"/>
-          <a:chExt cx="0" cy="0"/>
-        </a:xfrm>
-      </p:grpSpPr>
-      <p:sp>
-        <p:nvSpPr>
-          <p:cNvPr id="4" name="제목 3"/>
-          <p:cNvSpPr>
-            <a:spLocks noGrp="1"/>
-          </p:cNvSpPr>
-          <p:nvPr>
-            <p:ph type="title"/>
-          </p:nvPr>
-        </p:nvSpPr>
-        <p:spPr>
-          <a:xfrm>
-            <a:off x="457200" y="366780"/>
-            <a:ext cx="8229600" cy="648404"/>
-          </a:xfrm>
-        </p:spPr>
-        <p:txBody>
-          <a:bodyPr/>
-          <a:lstStyle/>
-          <a:p>
-            <a:r>
-              <a:rPr lang="en-US" altLang="ko-KR" dirty="0"/>
-              <a:t>Current Status</a:t>
-            </a:r>
-            <a:endParaRPr lang="ko-KR" altLang="en-US" dirty="0"/>
-          </a:p>
-        </p:txBody>
-      </p:sp>
-      <p:pic>
-        <p:nvPicPr>
-          <p:cNvPr id="5" name="Picture 4"/>
-          <p:cNvPicPr>
-            <a:picLocks noChangeAspect="1"/>
-          </p:cNvPicPr>
-          <p:nvPr/>
-        </p:nvPicPr>
-        <p:blipFill rotWithShape="1">
-          <a:blip r:embed="rId3" cstate="print">
-            <a:duotone>
-              <a:schemeClr val="accent2">
-                <a:shade val="45000"/>
-                <a:satMod val="135000"/>
-              </a:schemeClr>
-              <a:prstClr val="white"/>
-            </a:duotone>
-            <a:extLst>
-              <a:ext uri="{28A0092B-C50C-407E-A947-70E740481C1C}">
-                <a14:useLocalDpi xmlns:a14="http://schemas.microsoft.com/office/drawing/2010/main" val="0"/>
-              </a:ext>
-            </a:extLst>
-          </a:blip>
-          <a:srcRect l="4326" r="6312" b="13759"/>
-          <a:stretch/>
-        </p:blipFill>
-        <p:spPr>
-          <a:xfrm>
-            <a:off x="1421400" y="3970436"/>
-            <a:ext cx="1846218" cy="1781747"/>
-          </a:xfrm>
-          <a:prstGeom prst="rect">
-            <a:avLst/>
-          </a:prstGeom>
-        </p:spPr>
-      </p:pic>
-      <p:pic>
-        <p:nvPicPr>
-          <p:cNvPr id="7" name="Picture 6"/>
-          <p:cNvPicPr>
-            <a:picLocks noChangeAspect="1"/>
-          </p:cNvPicPr>
-          <p:nvPr/>
-        </p:nvPicPr>
-        <p:blipFill rotWithShape="1">
-          <a:blip r:embed="rId4" cstate="print">
-            <a:clrChange>
-              <a:clrFrom>
-                <a:srgbClr val="000000">
-                  <a:alpha val="0"/>
-                </a:srgbClr>
-              </a:clrFrom>
-              <a:clrTo>
-                <a:srgbClr val="000000">
-                  <a:alpha val="0"/>
-                </a:srgbClr>
-              </a:clrTo>
-            </a:clrChange>
-            <a:alphaModFix/>
-            <a:duotone>
-              <a:schemeClr val="accent2">
-                <a:shade val="45000"/>
-                <a:satMod val="135000"/>
-              </a:schemeClr>
-              <a:prstClr val="white"/>
-            </a:duotone>
-            <a:extLst>
-              <a:ext uri="{28A0092B-C50C-407E-A947-70E740481C1C}">
-                <a14:useLocalDpi xmlns:a14="http://schemas.microsoft.com/office/drawing/2010/main" val="0"/>
-              </a:ext>
-            </a:extLst>
-          </a:blip>
-          <a:srcRect b="15146"/>
-          <a:stretch/>
-        </p:blipFill>
-        <p:spPr>
-          <a:xfrm>
-            <a:off x="1223207" y="1673342"/>
-            <a:ext cx="1931474" cy="1638936"/>
-          </a:xfrm>
-          <a:prstGeom prst="rect">
-            <a:avLst/>
-          </a:prstGeom>
-        </p:spPr>
-      </p:pic>
-      <p:sp>
-        <p:nvSpPr>
-          <p:cNvPr id="10" name="TextBox 9"/>
-          <p:cNvSpPr txBox="1"/>
-          <p:nvPr/>
-        </p:nvSpPr>
-        <p:spPr>
-          <a:xfrm>
-            <a:off x="3431663" y="1586078"/>
-            <a:ext cx="3384260" cy="1734706"/>
-          </a:xfrm>
-          <a:prstGeom prst="rect">
-            <a:avLst/>
-          </a:prstGeom>
-          <a:noFill/>
-        </p:spPr>
-        <p:txBody>
-          <a:bodyPr wrap="none" rtlCol="0">
-            <a:spAutoFit/>
-          </a:bodyPr>
-          <a:lstStyle/>
-          <a:p>
-            <a:pPr>
-              <a:lnSpc>
-                <a:spcPts val="3300"/>
-              </a:lnSpc>
-            </a:pPr>
-            <a:r>
-              <a:rPr lang="ko-KR" altLang="en-US" sz="2400" b="1" dirty="0"/>
-              <a:t>면담</a:t>
-            </a:r>
-            <a:endParaRPr lang="en-US" altLang="ko-KR" sz="2400" b="1" dirty="0"/>
-          </a:p>
-          <a:p>
-            <a:pPr marL="285750" indent="-285750">
-              <a:lnSpc>
-                <a:spcPts val="3300"/>
-              </a:lnSpc>
-              <a:buFontTx/>
-              <a:buChar char="-"/>
-            </a:pPr>
-            <a:r>
-              <a:rPr lang="en-US" altLang="ko-KR" dirty="0"/>
-              <a:t>AR</a:t>
-            </a:r>
-            <a:r>
-              <a:rPr lang="ko-KR" altLang="en-US" dirty="0"/>
-              <a:t> </a:t>
-            </a:r>
-            <a:r>
-              <a:rPr lang="en-US" altLang="ko-KR" dirty="0"/>
-              <a:t>Player </a:t>
-            </a:r>
-            <a:r>
-              <a:rPr lang="ko-KR" altLang="en-US" dirty="0"/>
-              <a:t>형식</a:t>
-            </a:r>
-            <a:r>
-              <a:rPr lang="en-US" altLang="ko-KR" dirty="0"/>
-              <a:t>,</a:t>
-            </a:r>
-            <a:r>
-              <a:rPr lang="ko-KR" altLang="en-US" dirty="0"/>
-              <a:t> </a:t>
-            </a:r>
-            <a:r>
-              <a:rPr lang="en-US" altLang="ko-KR" dirty="0"/>
-              <a:t>Source </a:t>
-            </a:r>
-            <a:r>
-              <a:rPr lang="ko-KR" altLang="en-US" dirty="0"/>
-              <a:t>선택</a:t>
-            </a:r>
-            <a:endParaRPr lang="en-US" altLang="ko-KR" dirty="0"/>
-          </a:p>
-          <a:p>
-            <a:pPr marL="285750" indent="-285750">
-              <a:lnSpc>
-                <a:spcPts val="3300"/>
-              </a:lnSpc>
-              <a:buFontTx/>
-              <a:buChar char="-"/>
-            </a:pPr>
-            <a:r>
-              <a:rPr lang="en-US" altLang="ko-KR" dirty="0"/>
-              <a:t>Study </a:t>
-            </a:r>
-            <a:r>
-              <a:rPr lang="ko-KR" altLang="en-US" dirty="0"/>
-              <a:t>분야 분담</a:t>
-            </a:r>
-            <a:endParaRPr lang="en-US" altLang="ko-KR" dirty="0"/>
-          </a:p>
-          <a:p>
-            <a:pPr marL="285750" indent="-285750">
-              <a:lnSpc>
-                <a:spcPts val="3300"/>
-              </a:lnSpc>
-              <a:buFontTx/>
-              <a:buChar char="-"/>
-            </a:pPr>
-            <a:r>
-              <a:rPr lang="ko-KR" altLang="en-US" dirty="0"/>
-              <a:t>메신저와 </a:t>
-            </a:r>
-            <a:r>
-              <a:rPr lang="en-US" altLang="ko-KR" dirty="0"/>
-              <a:t>GitHub</a:t>
-            </a:r>
-            <a:r>
-              <a:rPr lang="ko-KR" altLang="en-US" dirty="0"/>
-              <a:t>를 통한 소통</a:t>
-            </a:r>
-            <a:endParaRPr lang="en-US" altLang="ko-KR" dirty="0"/>
-          </a:p>
-        </p:txBody>
-      </p:sp>
-      <p:sp>
-        <p:nvSpPr>
-          <p:cNvPr id="12" name="TextBox 11"/>
-          <p:cNvSpPr txBox="1"/>
-          <p:nvPr/>
-        </p:nvSpPr>
-        <p:spPr>
-          <a:xfrm>
-            <a:off x="3425526" y="3994046"/>
-            <a:ext cx="3609321" cy="1734706"/>
-          </a:xfrm>
-          <a:prstGeom prst="rect">
-            <a:avLst/>
-          </a:prstGeom>
-          <a:noFill/>
-        </p:spPr>
-        <p:txBody>
-          <a:bodyPr wrap="none" rtlCol="0">
-            <a:spAutoFit/>
-          </a:bodyPr>
-          <a:lstStyle/>
-          <a:p>
-            <a:pPr>
-              <a:lnSpc>
-                <a:spcPts val="3300"/>
-              </a:lnSpc>
-            </a:pPr>
-            <a:r>
-              <a:rPr lang="ko-KR" altLang="en-US" sz="2400" b="1" dirty="0"/>
-              <a:t>스터디</a:t>
-            </a:r>
-            <a:endParaRPr lang="en-US" altLang="ko-KR" sz="2400" b="1" dirty="0"/>
-          </a:p>
-          <a:p>
-            <a:pPr marL="285750" indent="-285750">
-              <a:lnSpc>
-                <a:spcPts val="3300"/>
-              </a:lnSpc>
-              <a:buFontTx/>
-              <a:buChar char="-"/>
-            </a:pPr>
-            <a:r>
-              <a:rPr lang="ko-KR" altLang="en-US" dirty="0"/>
-              <a:t>앞으로 배워야 할 내용 설정</a:t>
-            </a:r>
-            <a:endParaRPr lang="en-US" altLang="ko-KR" dirty="0"/>
-          </a:p>
-          <a:p>
-            <a:pPr marL="285750" indent="-285750">
-              <a:lnSpc>
-                <a:spcPts val="3300"/>
-              </a:lnSpc>
-              <a:buFontTx/>
-              <a:buChar char="-"/>
-            </a:pPr>
-            <a:r>
-              <a:rPr lang="en-US" altLang="ko-KR" dirty="0" err="1"/>
-              <a:t>TensorFlow</a:t>
-            </a:r>
-            <a:r>
-              <a:rPr lang="en-US" altLang="ko-KR" dirty="0"/>
-              <a:t>: Terms, MNIST,</a:t>
-            </a:r>
-            <a:r>
-              <a:rPr lang="ko-KR" altLang="en-US" dirty="0"/>
-              <a:t> </a:t>
-            </a:r>
-            <a:r>
-              <a:rPr lang="mr-IN" altLang="ko-KR" dirty="0"/>
-              <a:t>…</a:t>
-            </a:r>
-            <a:endParaRPr lang="en-US" altLang="ko-KR" dirty="0"/>
-          </a:p>
-          <a:p>
-            <a:pPr marL="285750" indent="-285750">
-              <a:lnSpc>
-                <a:spcPts val="3300"/>
-              </a:lnSpc>
-              <a:buFontTx/>
-              <a:buChar char="-"/>
-            </a:pPr>
-            <a:r>
-              <a:rPr lang="en-US" altLang="ko-KR" dirty="0"/>
-              <a:t>Android: Android Studio, </a:t>
-            </a:r>
-            <a:r>
-              <a:rPr lang="mr-IN" altLang="ko-KR" dirty="0"/>
-              <a:t>…</a:t>
-            </a:r>
-            <a:endParaRPr lang="en-US" altLang="ko-KR" dirty="0"/>
-          </a:p>
-        </p:txBody>
-      </p:sp>
-    </p:spTree>
-    <p:extLst>
-      <p:ext uri="{BB962C8B-B14F-4D97-AF65-F5344CB8AC3E}">
-        <p14:creationId xmlns:p14="http://schemas.microsoft.com/office/powerpoint/2010/main" val="1496718616"/>
-      </p:ext>
-    </p:extLst>
-  </p:cSld>
-  <p:clrMapOvr>
-    <a:masterClrMapping/>
-  </p:clrMapOvr>
-  <p:transition>
-    <p:fade/>
-  </p:transition>
-</p:sld>
-</file>
-
-<file path=ppt/slides/slide16.xml><?xml version="1.0" encoding="utf-8"?>
-<p:sld xmlns:a="http://schemas.openxmlformats.org/drawingml/2006/main" xmlns:r="http://schemas.openxmlformats.org/officeDocument/2006/relationships" xmlns:p="http://schemas.openxmlformats.org/presentationml/2006/main">
-  <p:cSld>
-    <p:spTree>
-      <p:nvGrpSpPr>
-        <p:cNvPr id="1" name=""/>
-        <p:cNvGrpSpPr/>
-        <p:nvPr/>
-      </p:nvGrpSpPr>
-      <p:grpSpPr>
-        <a:xfrm>
-          <a:off x="0" y="0"/>
-          <a:ext cx="0" cy="0"/>
-          <a:chOff x="0" y="0"/>
-          <a:chExt cx="0" cy="0"/>
-        </a:xfrm>
-      </p:grpSpPr>
-      <p:sp>
-        <p:nvSpPr>
-          <p:cNvPr id="4" name="제목 3"/>
-          <p:cNvSpPr>
-            <a:spLocks noGrp="1"/>
-          </p:cNvSpPr>
-          <p:nvPr>
-            <p:ph type="title"/>
-          </p:nvPr>
-        </p:nvSpPr>
-        <p:spPr>
-          <a:xfrm>
-            <a:off x="457200" y="366780"/>
-            <a:ext cx="8229600" cy="648404"/>
-          </a:xfrm>
-        </p:spPr>
-        <p:txBody>
-          <a:bodyPr/>
-          <a:lstStyle/>
-          <a:p>
-            <a:r>
-              <a:rPr lang="en-US" altLang="ko-KR" dirty="0"/>
-              <a:t>Further Plan</a:t>
-            </a:r>
-            <a:endParaRPr lang="ko-KR" altLang="en-US" dirty="0"/>
-          </a:p>
-        </p:txBody>
-      </p:sp>
-      <p:cxnSp>
-        <p:nvCxnSpPr>
-          <p:cNvPr id="10" name="직선 연결선 9"/>
-          <p:cNvCxnSpPr/>
-          <p:nvPr/>
-        </p:nvCxnSpPr>
-        <p:spPr>
-          <a:xfrm flipH="1">
-            <a:off x="1192945" y="1944909"/>
-            <a:ext cx="2" cy="3931477"/>
-          </a:xfrm>
-          <a:prstGeom prst="line">
-            <a:avLst/>
-          </a:prstGeom>
-          <a:ln w="38100">
-            <a:solidFill>
-              <a:schemeClr val="tx1">
-                <a:lumMod val="50000"/>
-                <a:lumOff val="50000"/>
-              </a:schemeClr>
-            </a:solidFill>
-          </a:ln>
-        </p:spPr>
-        <p:style>
-          <a:lnRef idx="1">
-            <a:schemeClr val="accent1"/>
-          </a:lnRef>
-          <a:fillRef idx="0">
-            <a:schemeClr val="accent1"/>
-          </a:fillRef>
-          <a:effectRef idx="0">
-            <a:schemeClr val="accent1"/>
-          </a:effectRef>
-          <a:fontRef idx="minor">
-            <a:schemeClr val="tx1"/>
-          </a:fontRef>
-        </p:style>
-      </p:cxnSp>
-      <p:sp>
-        <p:nvSpPr>
-          <p:cNvPr id="6" name="타원 5"/>
-          <p:cNvSpPr/>
-          <p:nvPr/>
-        </p:nvSpPr>
-        <p:spPr>
-          <a:xfrm>
-            <a:off x="803538" y="1564143"/>
-            <a:ext cx="761533" cy="761533"/>
-          </a:xfrm>
-          <a:prstGeom prst="ellipse">
-            <a:avLst/>
-          </a:prstGeom>
-          <a:solidFill>
-            <a:schemeClr val="bg1"/>
-          </a:solidFill>
-          <a:ln w="38100">
-            <a:solidFill>
-              <a:srgbClr val="00B050"/>
-            </a:solidFill>
-          </a:ln>
-        </p:spPr>
-        <p:style>
-          <a:lnRef idx="2">
-            <a:schemeClr val="accent1">
-              <a:shade val="50000"/>
-            </a:schemeClr>
-          </a:lnRef>
-          <a:fillRef idx="1">
-            <a:schemeClr val="accent1"/>
-          </a:fillRef>
-          <a:effectRef idx="0">
-            <a:schemeClr val="accent1"/>
-          </a:effectRef>
-          <a:fontRef idx="minor">
-            <a:schemeClr val="lt1"/>
-          </a:fontRef>
-        </p:style>
-        <p:txBody>
-          <a:bodyPr rtlCol="0" anchor="ctr"/>
-          <a:lstStyle/>
-          <a:p>
-            <a:pPr algn="ctr"/>
-            <a:endParaRPr lang="ko-KR" altLang="en-US" spc="80" dirty="0">
-              <a:solidFill>
-                <a:schemeClr val="bg1"/>
-              </a:solidFill>
-              <a:latin typeface="나눔고딕" pitchFamily="50" charset="-127"/>
-              <a:ea typeface="나눔고딕" pitchFamily="50" charset="-127"/>
-            </a:endParaRPr>
-          </a:p>
-        </p:txBody>
-      </p:sp>
-      <p:sp>
-        <p:nvSpPr>
-          <p:cNvPr id="7" name="타원 6"/>
-          <p:cNvSpPr/>
-          <p:nvPr/>
-        </p:nvSpPr>
-        <p:spPr>
-          <a:xfrm>
-            <a:off x="803537" y="2874636"/>
-            <a:ext cx="761533" cy="761533"/>
-          </a:xfrm>
-          <a:prstGeom prst="ellipse">
-            <a:avLst/>
-          </a:prstGeom>
-          <a:solidFill>
-            <a:schemeClr val="bg1"/>
-          </a:solidFill>
-          <a:ln w="38100">
-            <a:solidFill>
-              <a:srgbClr val="00B050"/>
-            </a:solidFill>
-          </a:ln>
-        </p:spPr>
-        <p:style>
-          <a:lnRef idx="2">
-            <a:schemeClr val="accent1">
-              <a:shade val="50000"/>
-            </a:schemeClr>
-          </a:lnRef>
-          <a:fillRef idx="1">
-            <a:schemeClr val="accent1"/>
-          </a:fillRef>
-          <a:effectRef idx="0">
-            <a:schemeClr val="accent1"/>
-          </a:effectRef>
-          <a:fontRef idx="minor">
-            <a:schemeClr val="lt1"/>
-          </a:fontRef>
-        </p:style>
-        <p:txBody>
-          <a:bodyPr rtlCol="0" anchor="ctr"/>
-          <a:lstStyle/>
-          <a:p>
-            <a:pPr algn="ctr"/>
-            <a:endParaRPr lang="ko-KR" altLang="en-US" spc="80" dirty="0">
-              <a:solidFill>
-                <a:schemeClr val="bg1"/>
-              </a:solidFill>
-              <a:latin typeface="나눔고딕" pitchFamily="50" charset="-127"/>
-              <a:ea typeface="나눔고딕" pitchFamily="50" charset="-127"/>
-            </a:endParaRPr>
-          </a:p>
-        </p:txBody>
-      </p:sp>
-      <p:sp>
-        <p:nvSpPr>
-          <p:cNvPr id="8" name="타원 7"/>
-          <p:cNvSpPr/>
-          <p:nvPr/>
-        </p:nvSpPr>
-        <p:spPr>
-          <a:xfrm>
-            <a:off x="803536" y="4185128"/>
-            <a:ext cx="761533" cy="761533"/>
-          </a:xfrm>
-          <a:prstGeom prst="ellipse">
-            <a:avLst/>
-          </a:prstGeom>
-          <a:solidFill>
-            <a:schemeClr val="bg1"/>
-          </a:solidFill>
-          <a:ln w="38100">
-            <a:solidFill>
-              <a:srgbClr val="00B050"/>
-            </a:solidFill>
-          </a:ln>
-        </p:spPr>
-        <p:style>
-          <a:lnRef idx="2">
-            <a:schemeClr val="accent1">
-              <a:shade val="50000"/>
-            </a:schemeClr>
-          </a:lnRef>
-          <a:fillRef idx="1">
-            <a:schemeClr val="accent1"/>
-          </a:fillRef>
-          <a:effectRef idx="0">
-            <a:schemeClr val="accent1"/>
-          </a:effectRef>
-          <a:fontRef idx="minor">
-            <a:schemeClr val="lt1"/>
-          </a:fontRef>
-        </p:style>
-        <p:txBody>
-          <a:bodyPr rtlCol="0" anchor="ctr"/>
-          <a:lstStyle/>
-          <a:p>
-            <a:pPr algn="ctr"/>
-            <a:endParaRPr lang="ko-KR" altLang="en-US" spc="80" dirty="0">
-              <a:solidFill>
-                <a:schemeClr val="bg1"/>
-              </a:solidFill>
-              <a:latin typeface="나눔고딕" pitchFamily="50" charset="-127"/>
-              <a:ea typeface="나눔고딕" pitchFamily="50" charset="-127"/>
-            </a:endParaRPr>
-          </a:p>
-        </p:txBody>
-      </p:sp>
-      <p:sp>
-        <p:nvSpPr>
-          <p:cNvPr id="9" name="타원 7"/>
-          <p:cNvSpPr/>
-          <p:nvPr/>
-        </p:nvSpPr>
-        <p:spPr>
-          <a:xfrm>
-            <a:off x="803536" y="5495620"/>
-            <a:ext cx="761533" cy="761533"/>
-          </a:xfrm>
-          <a:prstGeom prst="ellipse">
-            <a:avLst/>
-          </a:prstGeom>
-          <a:solidFill>
-            <a:schemeClr val="bg1"/>
-          </a:solidFill>
-          <a:ln w="38100">
-            <a:solidFill>
-              <a:srgbClr val="00B050"/>
-            </a:solidFill>
-          </a:ln>
-        </p:spPr>
-        <p:style>
-          <a:lnRef idx="2">
-            <a:schemeClr val="accent1">
-              <a:shade val="50000"/>
-            </a:schemeClr>
-          </a:lnRef>
-          <a:fillRef idx="1">
-            <a:schemeClr val="accent1"/>
-          </a:fillRef>
-          <a:effectRef idx="0">
-            <a:schemeClr val="accent1"/>
-          </a:effectRef>
-          <a:fontRef idx="minor">
-            <a:schemeClr val="lt1"/>
-          </a:fontRef>
-        </p:style>
-        <p:txBody>
-          <a:bodyPr rtlCol="0" anchor="ctr"/>
-          <a:lstStyle/>
-          <a:p>
-            <a:pPr algn="ctr"/>
-            <a:endParaRPr lang="ko-KR" altLang="en-US" spc="80" dirty="0">
-              <a:solidFill>
-                <a:schemeClr val="bg1"/>
-              </a:solidFill>
-              <a:latin typeface="나눔고딕" pitchFamily="50" charset="-127"/>
-              <a:ea typeface="나눔고딕" pitchFamily="50" charset="-127"/>
-            </a:endParaRPr>
-          </a:p>
-        </p:txBody>
-      </p:sp>
-      <p:sp>
-        <p:nvSpPr>
-          <p:cNvPr id="11" name="TextBox 10"/>
-          <p:cNvSpPr txBox="1"/>
-          <p:nvPr/>
-        </p:nvSpPr>
-        <p:spPr>
-          <a:xfrm>
-            <a:off x="1740470" y="1714076"/>
-            <a:ext cx="5886015" cy="461665"/>
-          </a:xfrm>
-          <a:prstGeom prst="rect">
-            <a:avLst/>
-          </a:prstGeom>
-          <a:noFill/>
-        </p:spPr>
-        <p:txBody>
-          <a:bodyPr wrap="square" rtlCol="0">
-            <a:spAutoFit/>
-          </a:bodyPr>
-          <a:lstStyle/>
-          <a:p>
-            <a:r>
-              <a:rPr lang="en-US" altLang="ko-KR" sz="2400" dirty="0" err="1"/>
-              <a:t>TensorFlow</a:t>
-            </a:r>
-            <a:r>
-              <a:rPr lang="ko-KR" altLang="en-US" sz="2400" dirty="0"/>
-              <a:t> </a:t>
-            </a:r>
-            <a:r>
-              <a:rPr lang="en-US" altLang="ko-KR" dirty="0"/>
-              <a:t>CNN, Overshooting, Overfitting, </a:t>
-            </a:r>
-            <a:r>
-              <a:rPr lang="mr-IN" altLang="ko-KR" dirty="0"/>
-              <a:t>…</a:t>
-            </a:r>
-            <a:endParaRPr lang="ko-KR" altLang="en-US" dirty="0"/>
-          </a:p>
-        </p:txBody>
-      </p:sp>
-      <p:sp>
-        <p:nvSpPr>
-          <p:cNvPr id="13" name="TextBox 12"/>
-          <p:cNvSpPr txBox="1"/>
-          <p:nvPr/>
-        </p:nvSpPr>
-        <p:spPr>
-          <a:xfrm>
-            <a:off x="1740470" y="3024569"/>
-            <a:ext cx="5516364" cy="461665"/>
-          </a:xfrm>
-          <a:prstGeom prst="rect">
-            <a:avLst/>
-          </a:prstGeom>
-          <a:noFill/>
-        </p:spPr>
-        <p:txBody>
-          <a:bodyPr wrap="square" rtlCol="0">
-            <a:spAutoFit/>
-          </a:bodyPr>
-          <a:lstStyle/>
-          <a:p>
-            <a:r>
-              <a:rPr lang="en-US" altLang="ko-KR" sz="2400" dirty="0"/>
-              <a:t>Android</a:t>
-            </a:r>
-            <a:r>
-              <a:rPr lang="ko-KR" altLang="en-US" sz="2400" dirty="0"/>
-              <a:t> </a:t>
-            </a:r>
-            <a:r>
-              <a:rPr lang="en-US" altLang="ko-KR" dirty="0" err="1"/>
-              <a:t>RecyclerView</a:t>
-            </a:r>
-            <a:r>
-              <a:rPr lang="en-US" altLang="ko-KR" dirty="0"/>
-              <a:t>, Activity Life Cycle, </a:t>
-            </a:r>
-            <a:r>
-              <a:rPr lang="mr-IN" altLang="ko-KR" dirty="0"/>
-              <a:t>…</a:t>
-            </a:r>
-            <a:endParaRPr lang="ko-KR" altLang="en-US" dirty="0"/>
-          </a:p>
-        </p:txBody>
-      </p:sp>
-      <p:sp>
-        <p:nvSpPr>
-          <p:cNvPr id="14" name="TextBox 13"/>
-          <p:cNvSpPr txBox="1"/>
-          <p:nvPr/>
-        </p:nvSpPr>
-        <p:spPr>
-          <a:xfrm>
-            <a:off x="1740470" y="4335061"/>
-            <a:ext cx="4824551" cy="461665"/>
-          </a:xfrm>
-          <a:prstGeom prst="rect">
-            <a:avLst/>
-          </a:prstGeom>
-          <a:noFill/>
-        </p:spPr>
-        <p:txBody>
-          <a:bodyPr wrap="square" rtlCol="0">
-            <a:spAutoFit/>
-          </a:bodyPr>
-          <a:lstStyle/>
-          <a:p>
-            <a:r>
-              <a:rPr lang="en-US" altLang="ko-KR" sz="2400" dirty="0"/>
-              <a:t>Graphics</a:t>
-            </a:r>
-            <a:r>
-              <a:rPr lang="ko-KR" altLang="en-US" sz="2400" dirty="0"/>
-              <a:t> </a:t>
-            </a:r>
-            <a:r>
-              <a:rPr lang="en-US" altLang="ko-KR" dirty="0" err="1"/>
-              <a:t>openGL</a:t>
-            </a:r>
-            <a:r>
-              <a:rPr lang="en-US" altLang="ko-KR" dirty="0"/>
-              <a:t>, Glide, </a:t>
-            </a:r>
-            <a:r>
-              <a:rPr lang="mr-IN" altLang="ko-KR" dirty="0"/>
-              <a:t>…</a:t>
-            </a:r>
-            <a:endParaRPr lang="ko-KR" altLang="en-US" dirty="0"/>
-          </a:p>
-        </p:txBody>
-      </p:sp>
-      <p:sp>
-        <p:nvSpPr>
-          <p:cNvPr id="15" name="TextBox 14"/>
-          <p:cNvSpPr txBox="1"/>
-          <p:nvPr/>
-        </p:nvSpPr>
-        <p:spPr>
-          <a:xfrm>
-            <a:off x="1740469" y="5645553"/>
-            <a:ext cx="4824551" cy="461665"/>
-          </a:xfrm>
-          <a:prstGeom prst="rect">
-            <a:avLst/>
-          </a:prstGeom>
-          <a:noFill/>
-        </p:spPr>
-        <p:txBody>
-          <a:bodyPr wrap="square" rtlCol="0">
-            <a:spAutoFit/>
-          </a:bodyPr>
-          <a:lstStyle/>
-          <a:p>
-            <a:r>
-              <a:rPr lang="en-US" altLang="ko-KR" sz="2400" dirty="0"/>
-              <a:t>Application </a:t>
-            </a:r>
-            <a:r>
-              <a:rPr lang="en-US" altLang="ko-KR" dirty="0"/>
-              <a:t>SQLite, realm, </a:t>
-            </a:r>
-            <a:r>
-              <a:rPr lang="mr-IN" altLang="ko-KR" dirty="0"/>
-              <a:t>…</a:t>
-            </a:r>
-            <a:endParaRPr lang="ko-KR" altLang="en-US" dirty="0"/>
-          </a:p>
-        </p:txBody>
-      </p:sp>
-    </p:spTree>
-    <p:extLst>
-      <p:ext uri="{BB962C8B-B14F-4D97-AF65-F5344CB8AC3E}">
-        <p14:creationId xmlns:p14="http://schemas.microsoft.com/office/powerpoint/2010/main" val="475326152"/>
       </p:ext>
     </p:extLst>
   </p:cSld>
@@ -11863,36 +11822,6 @@
           <a:chExt cx="0" cy="0"/>
         </a:xfrm>
       </p:grpSpPr>
-      <p:sp>
-        <p:nvSpPr>
-          <p:cNvPr id="3" name="제목 2"/>
-          <p:cNvSpPr>
-            <a:spLocks noGrp="1"/>
-          </p:cNvSpPr>
-          <p:nvPr>
-            <p:ph type="title"/>
-          </p:nvPr>
-        </p:nvSpPr>
-        <p:spPr>
-          <a:xfrm>
-            <a:off x="457200" y="366780"/>
-            <a:ext cx="8229600" cy="648404"/>
-          </a:xfrm>
-        </p:spPr>
-        <p:txBody>
-          <a:bodyPr>
-            <a:normAutofit/>
-          </a:bodyPr>
-          <a:lstStyle/>
-          <a:p>
-            <a:r>
-              <a:rPr lang="en-US" altLang="ko-KR" dirty="0"/>
-              <a:t>Schedule </a:t>
-            </a:r>
-            <a:endParaRPr lang="ko-KR" altLang="en-US" dirty="0"/>
-          </a:p>
-        </p:txBody>
-      </p:sp>
       <p:graphicFrame>
         <p:nvGraphicFramePr>
           <p:cNvPr id="7" name="내용 개체 틀 6"/>
@@ -11901,12 +11830,16 @@
           </p:cNvGraphicFramePr>
           <p:nvPr>
             <p:ph sz="quarter" idx="4294967295"/>
-            <p:extLst/>
+            <p:extLst>
+              <p:ext uri="{D42A27DB-BD31-4B8C-83A1-F6EECF244321}">
+                <p14:modId xmlns:p14="http://schemas.microsoft.com/office/powerpoint/2010/main" val="3198818465"/>
+              </p:ext>
+            </p:extLst>
           </p:nvPr>
         </p:nvGraphicFramePr>
         <p:xfrm>
           <a:off x="501957" y="1182659"/>
-          <a:ext cx="8642042" cy="4798318"/>
+          <a:ext cx="8642042" cy="4425119"/>
         </p:xfrm>
         <a:graphic>
           <a:graphicData uri="http://schemas.openxmlformats.org/drawingml/2006/table">
@@ -11918,110 +11851,110 @@
                 <a:gridCol w="1662328">
                   <a:extLst>
                     <a:ext uri="{9D8B030D-6E8A-4147-A177-3AD203B41FA5}">
-                      <a16:colId xmlns:a16="http://schemas.microsoft.com/office/drawing/2014/main" xmlns="" val="20000"/>
+                      <a16:colId xmlns="" xmlns:a16="http://schemas.microsoft.com/office/drawing/2014/main" val="20000"/>
                     </a:ext>
                   </a:extLst>
                 </a:gridCol>
                 <a:gridCol w="498551">
                   <a:extLst>
                     <a:ext uri="{9D8B030D-6E8A-4147-A177-3AD203B41FA5}">
-                      <a16:colId xmlns:a16="http://schemas.microsoft.com/office/drawing/2014/main" xmlns="" val="20001"/>
+                      <a16:colId xmlns="" xmlns:a16="http://schemas.microsoft.com/office/drawing/2014/main" val="20001"/>
                     </a:ext>
                   </a:extLst>
                 </a:gridCol>
                 <a:gridCol w="498551">
                   <a:extLst>
                     <a:ext uri="{9D8B030D-6E8A-4147-A177-3AD203B41FA5}">
-                      <a16:colId xmlns:a16="http://schemas.microsoft.com/office/drawing/2014/main" xmlns="" val="20002"/>
+                      <a16:colId xmlns="" xmlns:a16="http://schemas.microsoft.com/office/drawing/2014/main" val="20002"/>
                     </a:ext>
                   </a:extLst>
                 </a:gridCol>
                 <a:gridCol w="498551">
                   <a:extLst>
                     <a:ext uri="{9D8B030D-6E8A-4147-A177-3AD203B41FA5}">
-                      <a16:colId xmlns:a16="http://schemas.microsoft.com/office/drawing/2014/main" xmlns="" val="20003"/>
+                      <a16:colId xmlns="" xmlns:a16="http://schemas.microsoft.com/office/drawing/2014/main" val="20003"/>
                     </a:ext>
                   </a:extLst>
                 </a:gridCol>
                 <a:gridCol w="498551">
                   <a:extLst>
                     <a:ext uri="{9D8B030D-6E8A-4147-A177-3AD203B41FA5}">
-                      <a16:colId xmlns:a16="http://schemas.microsoft.com/office/drawing/2014/main" xmlns="" val="20004"/>
+                      <a16:colId xmlns="" xmlns:a16="http://schemas.microsoft.com/office/drawing/2014/main" val="20004"/>
                     </a:ext>
                   </a:extLst>
                 </a:gridCol>
                 <a:gridCol w="498551">
                   <a:extLst>
                     <a:ext uri="{9D8B030D-6E8A-4147-A177-3AD203B41FA5}">
-                      <a16:colId xmlns:a16="http://schemas.microsoft.com/office/drawing/2014/main" xmlns="" val="20005"/>
+                      <a16:colId xmlns="" xmlns:a16="http://schemas.microsoft.com/office/drawing/2014/main" val="20005"/>
                     </a:ext>
                   </a:extLst>
                 </a:gridCol>
                 <a:gridCol w="498551">
                   <a:extLst>
                     <a:ext uri="{9D8B030D-6E8A-4147-A177-3AD203B41FA5}">
-                      <a16:colId xmlns:a16="http://schemas.microsoft.com/office/drawing/2014/main" xmlns="" val="20006"/>
+                      <a16:colId xmlns="" xmlns:a16="http://schemas.microsoft.com/office/drawing/2014/main" val="20006"/>
                     </a:ext>
                   </a:extLst>
                 </a:gridCol>
                 <a:gridCol w="498551">
                   <a:extLst>
                     <a:ext uri="{9D8B030D-6E8A-4147-A177-3AD203B41FA5}">
-                      <a16:colId xmlns:a16="http://schemas.microsoft.com/office/drawing/2014/main" xmlns="" val="20007"/>
+                      <a16:colId xmlns="" xmlns:a16="http://schemas.microsoft.com/office/drawing/2014/main" val="20007"/>
                     </a:ext>
                   </a:extLst>
                 </a:gridCol>
                 <a:gridCol w="498551">
                   <a:extLst>
                     <a:ext uri="{9D8B030D-6E8A-4147-A177-3AD203B41FA5}">
-                      <a16:colId xmlns:a16="http://schemas.microsoft.com/office/drawing/2014/main" xmlns="" val="20008"/>
+                      <a16:colId xmlns="" xmlns:a16="http://schemas.microsoft.com/office/drawing/2014/main" val="20008"/>
                     </a:ext>
                   </a:extLst>
                 </a:gridCol>
                 <a:gridCol w="498551">
                   <a:extLst>
                     <a:ext uri="{9D8B030D-6E8A-4147-A177-3AD203B41FA5}">
-                      <a16:colId xmlns:a16="http://schemas.microsoft.com/office/drawing/2014/main" xmlns="" val="20009"/>
+                      <a16:colId xmlns="" xmlns:a16="http://schemas.microsoft.com/office/drawing/2014/main" val="20009"/>
                     </a:ext>
                   </a:extLst>
                 </a:gridCol>
                 <a:gridCol w="498551">
                   <a:extLst>
                     <a:ext uri="{9D8B030D-6E8A-4147-A177-3AD203B41FA5}">
-                      <a16:colId xmlns:a16="http://schemas.microsoft.com/office/drawing/2014/main" xmlns="" val="20010"/>
+                      <a16:colId xmlns="" xmlns:a16="http://schemas.microsoft.com/office/drawing/2014/main" val="20010"/>
                     </a:ext>
                   </a:extLst>
                 </a:gridCol>
                 <a:gridCol w="498551">
                   <a:extLst>
                     <a:ext uri="{9D8B030D-6E8A-4147-A177-3AD203B41FA5}">
-                      <a16:colId xmlns:a16="http://schemas.microsoft.com/office/drawing/2014/main" xmlns="" val="20011"/>
+                      <a16:colId xmlns="" xmlns:a16="http://schemas.microsoft.com/office/drawing/2014/main" val="20011"/>
                     </a:ext>
                   </a:extLst>
                 </a:gridCol>
                 <a:gridCol w="498551">
                   <a:extLst>
                     <a:ext uri="{9D8B030D-6E8A-4147-A177-3AD203B41FA5}">
-                      <a16:colId xmlns:a16="http://schemas.microsoft.com/office/drawing/2014/main" xmlns="" val="20012"/>
+                      <a16:colId xmlns="" xmlns:a16="http://schemas.microsoft.com/office/drawing/2014/main" val="20012"/>
                     </a:ext>
                   </a:extLst>
                 </a:gridCol>
                 <a:gridCol w="498551">
                   <a:extLst>
                     <a:ext uri="{9D8B030D-6E8A-4147-A177-3AD203B41FA5}">
-                      <a16:colId xmlns:a16="http://schemas.microsoft.com/office/drawing/2014/main" xmlns="" val="20013"/>
+                      <a16:colId xmlns="" xmlns:a16="http://schemas.microsoft.com/office/drawing/2014/main" val="20013"/>
                     </a:ext>
                   </a:extLst>
                 </a:gridCol>
                 <a:gridCol w="498551">
                   <a:extLst>
                     <a:ext uri="{9D8B030D-6E8A-4147-A177-3AD203B41FA5}">
-                      <a16:colId xmlns:a16="http://schemas.microsoft.com/office/drawing/2014/main" xmlns="" val="3843917279"/>
+                      <a16:colId xmlns="" xmlns:a16="http://schemas.microsoft.com/office/drawing/2014/main" val="3843917279"/>
                     </a:ext>
                   </a:extLst>
                 </a:gridCol>
               </a:tblGrid>
-              <a:tr h="345925">
+              <a:tr h="319020">
                 <a:tc rowSpan="2">
                   <a:txBody>
                     <a:bodyPr/>
@@ -12398,11 +12331,11 @@
                 </a:tc>
                 <a:extLst>
                   <a:ext uri="{0D108BD9-81ED-4DB2-BD59-A6C34878D82A}">
-                    <a16:rowId xmlns:a16="http://schemas.microsoft.com/office/drawing/2014/main" xmlns="" val="10000"/>
+                    <a16:rowId xmlns="" xmlns:a16="http://schemas.microsoft.com/office/drawing/2014/main" val="10000"/>
                   </a:ext>
                 </a:extLst>
               </a:tr>
-              <a:tr h="294036">
+              <a:tr h="271167">
                 <a:tc vMerge="1">
                   <a:txBody>
                     <a:bodyPr/>
@@ -13180,11 +13113,11 @@
                 </a:tc>
                 <a:extLst>
                   <a:ext uri="{0D108BD9-81ED-4DB2-BD59-A6C34878D82A}">
-                    <a16:rowId xmlns:a16="http://schemas.microsoft.com/office/drawing/2014/main" xmlns="" val="10001"/>
+                    <a16:rowId xmlns="" xmlns:a16="http://schemas.microsoft.com/office/drawing/2014/main" val="10001"/>
                   </a:ext>
                 </a:extLst>
               </a:tr>
-              <a:tr h="415109">
+              <a:tr h="382823">
                 <a:tc>
                   <a:txBody>
                     <a:bodyPr/>
@@ -13781,11 +13714,11 @@
                 </a:tc>
                 <a:extLst>
                   <a:ext uri="{0D108BD9-81ED-4DB2-BD59-A6C34878D82A}">
-                    <a16:rowId xmlns:a16="http://schemas.microsoft.com/office/drawing/2014/main" xmlns="" val="10002"/>
+                    <a16:rowId xmlns="" xmlns:a16="http://schemas.microsoft.com/office/drawing/2014/main" val="10002"/>
                   </a:ext>
                 </a:extLst>
               </a:tr>
-              <a:tr h="415109">
+              <a:tr h="382823">
                 <a:tc>
                   <a:txBody>
                     <a:bodyPr/>
@@ -14462,11 +14395,11 @@
                 </a:tc>
                 <a:extLst>
                   <a:ext uri="{0D108BD9-81ED-4DB2-BD59-A6C34878D82A}">
-                    <a16:rowId xmlns:a16="http://schemas.microsoft.com/office/drawing/2014/main" xmlns="" val="10003"/>
+                    <a16:rowId xmlns="" xmlns:a16="http://schemas.microsoft.com/office/drawing/2014/main" val="10003"/>
                   </a:ext>
                 </a:extLst>
               </a:tr>
-              <a:tr h="415109">
+              <a:tr h="382823">
                 <a:tc>
                   <a:txBody>
                     <a:bodyPr/>
@@ -15133,11 +15066,11 @@
                 </a:tc>
                 <a:extLst>
                   <a:ext uri="{0D108BD9-81ED-4DB2-BD59-A6C34878D82A}">
-                    <a16:rowId xmlns:a16="http://schemas.microsoft.com/office/drawing/2014/main" xmlns="" val="10004"/>
+                    <a16:rowId xmlns="" xmlns:a16="http://schemas.microsoft.com/office/drawing/2014/main" val="10004"/>
                   </a:ext>
                 </a:extLst>
               </a:tr>
-              <a:tr h="415109">
+              <a:tr h="382823">
                 <a:tc gridSpan="2">
                   <a:txBody>
                     <a:bodyPr/>
@@ -15814,11 +15747,11 @@
                 </a:tc>
                 <a:extLst>
                   <a:ext uri="{0D108BD9-81ED-4DB2-BD59-A6C34878D82A}">
-                    <a16:rowId xmlns:a16="http://schemas.microsoft.com/office/drawing/2014/main" xmlns="" val="10005"/>
+                    <a16:rowId xmlns="" xmlns:a16="http://schemas.microsoft.com/office/drawing/2014/main" val="10005"/>
                   </a:ext>
                 </a:extLst>
               </a:tr>
-              <a:tr h="422376">
+              <a:tr h="389525">
                 <a:tc>
                   <a:txBody>
                     <a:bodyPr/>
@@ -16487,11 +16420,11 @@
                 </a:tc>
                 <a:extLst>
                   <a:ext uri="{0D108BD9-81ED-4DB2-BD59-A6C34878D82A}">
-                    <a16:rowId xmlns:a16="http://schemas.microsoft.com/office/drawing/2014/main" xmlns="" val="10006"/>
+                    <a16:rowId xmlns="" xmlns:a16="http://schemas.microsoft.com/office/drawing/2014/main" val="10006"/>
                   </a:ext>
                 </a:extLst>
               </a:tr>
-              <a:tr h="415109">
+              <a:tr h="382823">
                 <a:tc>
                   <a:txBody>
                     <a:bodyPr/>
@@ -17094,11 +17027,11 @@
                 </a:tc>
                 <a:extLst>
                   <a:ext uri="{0D108BD9-81ED-4DB2-BD59-A6C34878D82A}">
-                    <a16:rowId xmlns:a16="http://schemas.microsoft.com/office/drawing/2014/main" xmlns="" val="10007"/>
+                    <a16:rowId xmlns="" xmlns:a16="http://schemas.microsoft.com/office/drawing/2014/main" val="10007"/>
                   </a:ext>
                 </a:extLst>
               </a:tr>
-              <a:tr h="415109">
+              <a:tr h="382823">
                 <a:tc gridSpan="4">
                   <a:txBody>
                     <a:bodyPr/>
@@ -17705,11 +17638,11 @@
                 </a:tc>
                 <a:extLst>
                   <a:ext uri="{0D108BD9-81ED-4DB2-BD59-A6C34878D82A}">
-                    <a16:rowId xmlns:a16="http://schemas.microsoft.com/office/drawing/2014/main" xmlns="" val="10008"/>
+                    <a16:rowId xmlns="" xmlns:a16="http://schemas.microsoft.com/office/drawing/2014/main" val="10008"/>
                   </a:ext>
                 </a:extLst>
               </a:tr>
-              <a:tr h="415109">
+              <a:tr h="382823">
                 <a:tc>
                   <a:txBody>
                     <a:bodyPr/>
@@ -18318,11 +18251,11 @@
                 </a:tc>
                 <a:extLst>
                   <a:ext uri="{0D108BD9-81ED-4DB2-BD59-A6C34878D82A}">
-                    <a16:rowId xmlns:a16="http://schemas.microsoft.com/office/drawing/2014/main" xmlns="" val="10009"/>
+                    <a16:rowId xmlns="" xmlns:a16="http://schemas.microsoft.com/office/drawing/2014/main" val="10009"/>
                   </a:ext>
                 </a:extLst>
               </a:tr>
-              <a:tr h="415109">
+              <a:tr h="382823">
                 <a:tc gridSpan="2">
                   <a:txBody>
                     <a:bodyPr/>
@@ -18916,11 +18849,11 @@
                 </a:tc>
                 <a:extLst>
                   <a:ext uri="{0D108BD9-81ED-4DB2-BD59-A6C34878D82A}">
-                    <a16:rowId xmlns:a16="http://schemas.microsoft.com/office/drawing/2014/main" xmlns="" val="10010"/>
+                    <a16:rowId xmlns="" xmlns:a16="http://schemas.microsoft.com/office/drawing/2014/main" val="10010"/>
                   </a:ext>
                 </a:extLst>
               </a:tr>
-              <a:tr h="415109">
+              <a:tr h="382823">
                 <a:tc>
                   <a:txBody>
                     <a:bodyPr/>
@@ -19529,7 +19462,7 @@
                 </a:tc>
                 <a:extLst>
                   <a:ext uri="{0D108BD9-81ED-4DB2-BD59-A6C34878D82A}">
-                    <a16:rowId xmlns:a16="http://schemas.microsoft.com/office/drawing/2014/main" xmlns="" val="10011"/>
+                    <a16:rowId xmlns="" xmlns:a16="http://schemas.microsoft.com/office/drawing/2014/main" val="10011"/>
                   </a:ext>
                 </a:extLst>
               </a:tr>
@@ -19539,6 +19472,65 @@
       </p:graphicFrame>
       <p:pic>
         <p:nvPicPr>
+          <p:cNvPr id="5" name="그림 4"/>
+          <p:cNvPicPr>
+            <a:picLocks noChangeAspect="1"/>
+          </p:cNvPicPr>
+          <p:nvPr/>
+        </p:nvPicPr>
+        <p:blipFill rotWithShape="1">
+          <a:blip r:embed="rId3">
+            <a:extLst>
+              <a:ext uri="{28A0092B-C50C-407E-A947-70E740481C1C}">
+                <a14:useLocalDpi xmlns:a14="http://schemas.microsoft.com/office/drawing/2010/main" val="0"/>
+              </a:ext>
+            </a:extLst>
+          </a:blip>
+          <a:srcRect t="-1" b="-7692"/>
+          <a:stretch/>
+        </p:blipFill>
+        <p:spPr>
+          <a:xfrm>
+            <a:off x="501957" y="1122923"/>
+            <a:ext cx="8686800" cy="5237418"/>
+          </a:xfrm>
+          <a:prstGeom prst="rect">
+            <a:avLst/>
+          </a:prstGeom>
+        </p:spPr>
+      </p:pic>
+      <p:sp>
+        <p:nvSpPr>
+          <p:cNvPr id="3" name="제목 2"/>
+          <p:cNvSpPr>
+            <a:spLocks noGrp="1"/>
+          </p:cNvSpPr>
+          <p:nvPr>
+            <p:ph type="title"/>
+          </p:nvPr>
+        </p:nvSpPr>
+        <p:spPr>
+          <a:xfrm>
+            <a:off x="457200" y="366780"/>
+            <a:ext cx="8229600" cy="648404"/>
+          </a:xfrm>
+        </p:spPr>
+        <p:txBody>
+          <a:bodyPr>
+            <a:normAutofit/>
+          </a:bodyPr>
+          <a:lstStyle/>
+          <a:p>
+            <a:r>
+              <a:rPr lang="en-US" altLang="ko-KR" dirty="0"/>
+              <a:t>Schedule </a:t>
+            </a:r>
+            <a:endParaRPr lang="ko-KR" altLang="en-US" dirty="0"/>
+          </a:p>
+        </p:txBody>
+      </p:sp>
+      <p:pic>
+        <p:nvPicPr>
           <p:cNvPr id="4" name="그림 3"/>
           <p:cNvPicPr>
             <a:picLocks noChangeAspect="1"/>
@@ -19546,7 +19538,7 @@
           <p:nvPr/>
         </p:nvPicPr>
         <p:blipFill>
-          <a:blip r:embed="rId3">
+          <a:blip r:embed="rId4">
             <a:extLst>
               <a:ext uri="{28A0092B-C50C-407E-A947-70E740481C1C}">
                 <a14:useLocalDpi xmlns:a14="http://schemas.microsoft.com/office/drawing/2010/main" val="0"/>
@@ -19569,27 +19561,22 @@
       </p:pic>
       <p:pic>
         <p:nvPicPr>
-          <p:cNvPr id="5" name="그림 4"/>
+          <p:cNvPr id="2" name="그림 1"/>
           <p:cNvPicPr>
             <a:picLocks noChangeAspect="1"/>
           </p:cNvPicPr>
           <p:nvPr/>
         </p:nvPicPr>
-        <p:blipFill rotWithShape="1">
-          <a:blip r:embed="rId4">
-            <a:extLst>
-              <a:ext uri="{28A0092B-C50C-407E-A947-70E740481C1C}">
-                <a14:useLocalDpi xmlns:a14="http://schemas.microsoft.com/office/drawing/2010/main" val="0"/>
-              </a:ext>
-            </a:extLst>
-          </a:blip>
-          <a:srcRect t="-1" b="-7692"/>
-          <a:stretch/>
+        <p:blipFill>
+          <a:blip r:embed="rId5"/>
+          <a:stretch>
+            <a:fillRect/>
+          </a:stretch>
         </p:blipFill>
         <p:spPr>
           <a:xfrm>
-            <a:off x="228600" y="1182659"/>
-            <a:ext cx="8686800" cy="5237418"/>
+            <a:off x="0" y="381000"/>
+            <a:ext cx="9144000" cy="6096000"/>
           </a:xfrm>
           <a:prstGeom prst="rect">
             <a:avLst/>
@@ -19599,7 +19586,7 @@
     </p:spTree>
     <p:extLst>
       <p:ext uri="{BB962C8B-B14F-4D97-AF65-F5344CB8AC3E}">
-        <p14:creationId xmlns:p14="http://schemas.microsoft.com/office/powerpoint/2010/main" val="1394789202"/>
+        <p14:creationId xmlns:p14="http://schemas.microsoft.com/office/powerpoint/2010/main" val="940369786"/>
       </p:ext>
     </p:extLst>
   </p:cSld>
@@ -19609,6 +19596,13 @@
   <p:transition>
     <p:fade/>
   </p:transition>
+  <p:timing>
+    <p:tnLst>
+      <p:par>
+        <p:cTn id="1" dur="indefinite" restart="never" nodeType="tmRoot"/>
+      </p:par>
+    </p:tnLst>
+  </p:timing>
 </p:sld>
 </file>
 
@@ -19705,15 +19699,17 @@
           <a:p>
             <a:r>
               <a:rPr lang="ko-KR" altLang="en-US" sz="1600" dirty="0">
-                <a:latin typeface="나눔바른고딕" panose="020B0603020101020101" pitchFamily="50" charset="-127"/>
-                <a:ea typeface="나눔바른고딕" panose="020B0603020101020101" pitchFamily="50" charset="-127"/>
+                <a:latin typeface="Nanum Gothic" charset="-127"/>
+                <a:ea typeface="Nanum Gothic" charset="-127"/>
+                <a:cs typeface="Nanum Gothic" charset="-127"/>
               </a:rPr>
               <a:t>강민지</a:t>
             </a:r>
             <a:r>
               <a:rPr lang="en-US" altLang="ko-KR" sz="1600" dirty="0">
-                <a:latin typeface="나눔바른고딕" panose="020B0603020101020101" pitchFamily="50" charset="-127"/>
-                <a:ea typeface="나눔바른고딕" panose="020B0603020101020101" pitchFamily="50" charset="-127"/>
+                <a:latin typeface="Nanum Gothic" charset="-127"/>
+                <a:ea typeface="Nanum Gothic" charset="-127"/>
+                <a:cs typeface="Nanum Gothic" charset="-127"/>
               </a:rPr>
               <a:t> 	kyang@snu.ac.kr</a:t>
             </a:r>
@@ -19721,15 +19717,17 @@
           <a:p>
             <a:r>
               <a:rPr lang="ko-KR" altLang="en-US" sz="1600" dirty="0">
-                <a:latin typeface="나눔바른고딕" panose="020B0603020101020101" pitchFamily="50" charset="-127"/>
-                <a:ea typeface="나눔바른고딕" panose="020B0603020101020101" pitchFamily="50" charset="-127"/>
+                <a:latin typeface="Nanum Gothic" charset="-127"/>
+                <a:ea typeface="Nanum Gothic" charset="-127"/>
+                <a:cs typeface="Nanum Gothic" charset="-127"/>
               </a:rPr>
               <a:t>원종훈 </a:t>
             </a:r>
             <a:r>
               <a:rPr lang="en-US" altLang="ko-KR" sz="1600" dirty="0">
-                <a:latin typeface="나눔바른고딕" panose="020B0603020101020101" pitchFamily="50" charset="-127"/>
-                <a:ea typeface="나눔바른고딕" panose="020B0603020101020101" pitchFamily="50" charset="-127"/>
+                <a:latin typeface="Nanum Gothic" charset="-127"/>
+                <a:ea typeface="Nanum Gothic" charset="-127"/>
+                <a:cs typeface="Nanum Gothic" charset="-127"/>
               </a:rPr>
               <a:t>	barber@snu.ac.kr</a:t>
             </a:r>
@@ -19737,28 +19735,61 @@
           <a:p>
             <a:r>
               <a:rPr lang="ko-KR" altLang="en-US" sz="1600" dirty="0" err="1">
-                <a:latin typeface="나눔바른고딕" panose="020B0603020101020101" pitchFamily="50" charset="-127"/>
-                <a:ea typeface="나눔바른고딕" panose="020B0603020101020101" pitchFamily="50" charset="-127"/>
+                <a:latin typeface="Nanum Gothic" charset="-127"/>
+                <a:ea typeface="Nanum Gothic" charset="-127"/>
+                <a:cs typeface="Nanum Gothic" charset="-127"/>
               </a:rPr>
               <a:t>핌언</a:t>
             </a:r>
             <a:r>
               <a:rPr lang="ko-KR" altLang="en-US" sz="1600" dirty="0">
-                <a:latin typeface="나눔바른고딕" panose="020B0603020101020101" pitchFamily="50" charset="-127"/>
-                <a:ea typeface="나눔바른고딕" panose="020B0603020101020101" pitchFamily="50" charset="-127"/>
+                <a:latin typeface="Nanum Gothic" charset="-127"/>
+                <a:ea typeface="Nanum Gothic" charset="-127"/>
+                <a:cs typeface="Nanum Gothic" charset="-127"/>
               </a:rPr>
               <a:t> </a:t>
             </a:r>
             <a:r>
               <a:rPr lang="en-US" altLang="ko-KR" sz="1600" dirty="0">
-                <a:latin typeface="나눔바른고딕" panose="020B0603020101020101" pitchFamily="50" charset="-127"/>
-                <a:ea typeface="나눔바른고딕" panose="020B0603020101020101" pitchFamily="50" charset="-127"/>
+                <a:latin typeface="Nanum Gothic" charset="-127"/>
+                <a:ea typeface="Nanum Gothic" charset="-127"/>
+                <a:cs typeface="Nanum Gothic" charset="-127"/>
               </a:rPr>
               <a:t>	pimonink_ja@hotmail.com</a:t>
             </a:r>
           </a:p>
         </p:txBody>
       </p:sp>
+      <p:pic>
+        <p:nvPicPr>
+          <p:cNvPr id="5" name="그림 12"/>
+          <p:cNvPicPr>
+            <a:picLocks noChangeAspect="1"/>
+          </p:cNvPicPr>
+          <p:nvPr/>
+        </p:nvPicPr>
+        <p:blipFill>
+          <a:blip r:embed="rId3" cstate="print">
+            <a:extLst>
+              <a:ext uri="{28A0092B-C50C-407E-A947-70E740481C1C}">
+                <a14:useLocalDpi xmlns:a14="http://schemas.microsoft.com/office/drawing/2010/main" val="0"/>
+              </a:ext>
+            </a:extLst>
+          </a:blip>
+          <a:stretch>
+            <a:fillRect/>
+          </a:stretch>
+        </p:blipFill>
+        <p:spPr>
+          <a:xfrm>
+            <a:off x="7622302" y="5511148"/>
+            <a:ext cx="899130" cy="899130"/>
+          </a:xfrm>
+          <a:prstGeom prst="rect">
+            <a:avLst/>
+          </a:prstGeom>
+        </p:spPr>
+      </p:pic>
     </p:spTree>
   </p:cSld>
   <p:clrMapOvr>
@@ -19767,6 +19798,13 @@
   <p:transition>
     <p:fade/>
   </p:transition>
+  <p:timing>
+    <p:tnLst>
+      <p:par>
+        <p:cTn id="1" dur="indefinite" restart="never" nodeType="tmRoot"/>
+      </p:par>
+    </p:tnLst>
+  </p:timing>
 </p:sld>
 </file>
 
@@ -19946,7 +19984,7 @@
                 <a:latin typeface="나눔고딕" panose="020D0604000000000000" pitchFamily="50" charset="-127"/>
                 <a:ea typeface="나눔고딕" panose="020D0604000000000000" pitchFamily="50" charset="-127"/>
               </a:rPr>
-              <a:t>Architecture/Basic Spec</a:t>
+              <a:t>Basic Spec/Architecture</a:t>
             </a:r>
           </a:p>
           <a:p>
@@ -20012,6 +20050,13 @@
   <p:transition>
     <p:fade/>
   </p:transition>
+  <p:timing>
+    <p:tnLst>
+      <p:par>
+        <p:cTn id="1" dur="indefinite" restart="never" nodeType="tmRoot"/>
+      </p:par>
+    </p:tnLst>
+  </p:timing>
 </p:sld>
 </file>
 
@@ -20128,10 +20173,6 @@
             <a:r>
               <a:rPr lang="en-US" altLang="ko-KR" sz="2400" b="1" dirty="0"/>
               <a:t>Where	</a:t>
-            </a:r>
-            <a:r>
-              <a:rPr lang="ko-KR" altLang="en-US" sz="2400" dirty="0"/>
-              <a:t>㈜ 네이버</a:t>
             </a:r>
             <a:endParaRPr lang="en-US" altLang="ko-KR" sz="2400" dirty="0"/>
           </a:p>

</xml_diff>

<commit_message>
Modify pptx 'schedule' slide
</commit_message>
<xml_diff>
--- a/artoon-spec.pptx
+++ b/artoon-spec.pptx
@@ -7909,7 +7909,7 @@
                 <a14:useLocalDpi xmlns:a14="http://schemas.microsoft.com/office/drawing/2010/main" val="0"/>
               </a:ext>
               <a:ext uri="{96DAC541-7B7A-43D3-8B79-37D633B846F1}">
-                <asvg:svgBlip xmlns="" xmlns:asvg="http://schemas.microsoft.com/office/drawing/2016/SVG/main" r:embed="rId4"/>
+                <asvg:svgBlip xmlns:asvg="http://schemas.microsoft.com/office/drawing/2016/SVG/main" xmlns="" r:embed="rId4"/>
               </a:ext>
             </a:extLst>
           </a:blip>
@@ -8007,7 +8007,7 @@
                 <a14:useLocalDpi xmlns:a14="http://schemas.microsoft.com/office/drawing/2010/main" val="0"/>
               </a:ext>
               <a:ext uri="{96DAC541-7B7A-43D3-8B79-37D633B846F1}">
-                <asvg:svgBlip xmlns="" xmlns:asvg="http://schemas.microsoft.com/office/drawing/2016/SVG/main" r:embed="rId6"/>
+                <asvg:svgBlip xmlns:asvg="http://schemas.microsoft.com/office/drawing/2016/SVG/main" xmlns="" r:embed="rId6"/>
               </a:ext>
             </a:extLst>
           </a:blip>
@@ -9443,7 +9443,7 @@
                 <a14:useLocalDpi xmlns:a14="http://schemas.microsoft.com/office/drawing/2010/main" val="0"/>
               </a:ext>
               <a:ext uri="{96DAC541-7B7A-43D3-8B79-37D633B846F1}">
-                <asvg:svgBlip xmlns="" xmlns:asvg="http://schemas.microsoft.com/office/drawing/2016/SVG/main" r:embed="rId4"/>
+                <asvg:svgBlip xmlns:asvg="http://schemas.microsoft.com/office/drawing/2016/SVG/main" xmlns="" r:embed="rId4"/>
               </a:ext>
             </a:extLst>
           </a:blip>
@@ -9476,7 +9476,7 @@
                 <a14:useLocalDpi xmlns:a14="http://schemas.microsoft.com/office/drawing/2010/main" val="0"/>
               </a:ext>
               <a:ext uri="{96DAC541-7B7A-43D3-8B79-37D633B846F1}">
-                <asvg:svgBlip xmlns="" xmlns:asvg="http://schemas.microsoft.com/office/drawing/2016/SVG/main" r:embed="rId6"/>
+                <asvg:svgBlip xmlns:asvg="http://schemas.microsoft.com/office/drawing/2016/SVG/main" xmlns="" r:embed="rId6"/>
               </a:ext>
             </a:extLst>
           </a:blip>
@@ -11802,6 +11802,13 @@
   <p:transition>
     <p:fade/>
   </p:transition>
+  <p:timing>
+    <p:tnLst>
+      <p:par>
+        <p:cTn id="1" dur="indefinite" restart="never" nodeType="tmRoot"/>
+      </p:par>
+    </p:tnLst>
+  </p:timing>
 </p:sld>
 </file>
 
@@ -11832,14 +11839,14 @@
             <p:ph sz="quarter" idx="4294967295"/>
             <p:extLst>
               <p:ext uri="{D42A27DB-BD31-4B8C-83A1-F6EECF244321}">
-                <p14:modId xmlns:p14="http://schemas.microsoft.com/office/powerpoint/2010/main" val="3198818465"/>
+                <p14:modId xmlns:p14="http://schemas.microsoft.com/office/powerpoint/2010/main" val="980996500"/>
               </p:ext>
             </p:extLst>
           </p:nvPr>
         </p:nvGraphicFramePr>
         <p:xfrm>
-          <a:off x="501957" y="1182659"/>
-          <a:ext cx="8642042" cy="4425119"/>
+          <a:off x="3481118" y="-6078377"/>
+          <a:ext cx="8642042" cy="4413032"/>
         </p:xfrm>
         <a:graphic>
           <a:graphicData uri="http://schemas.openxmlformats.org/drawingml/2006/table">
@@ -11851,105 +11858,105 @@
                 <a:gridCol w="1662328">
                   <a:extLst>
                     <a:ext uri="{9D8B030D-6E8A-4147-A177-3AD203B41FA5}">
-                      <a16:colId xmlns="" xmlns:a16="http://schemas.microsoft.com/office/drawing/2014/main" val="20000"/>
+                      <a16:colId xmlns:a16="http://schemas.microsoft.com/office/drawing/2014/main" xmlns="" val="20000"/>
                     </a:ext>
                   </a:extLst>
                 </a:gridCol>
                 <a:gridCol w="498551">
                   <a:extLst>
                     <a:ext uri="{9D8B030D-6E8A-4147-A177-3AD203B41FA5}">
-                      <a16:colId xmlns="" xmlns:a16="http://schemas.microsoft.com/office/drawing/2014/main" val="20001"/>
+                      <a16:colId xmlns:a16="http://schemas.microsoft.com/office/drawing/2014/main" xmlns="" val="20001"/>
                     </a:ext>
                   </a:extLst>
                 </a:gridCol>
                 <a:gridCol w="498551">
                   <a:extLst>
                     <a:ext uri="{9D8B030D-6E8A-4147-A177-3AD203B41FA5}">
-                      <a16:colId xmlns="" xmlns:a16="http://schemas.microsoft.com/office/drawing/2014/main" val="20002"/>
+                      <a16:colId xmlns:a16="http://schemas.microsoft.com/office/drawing/2014/main" xmlns="" val="20002"/>
                     </a:ext>
                   </a:extLst>
                 </a:gridCol>
                 <a:gridCol w="498551">
                   <a:extLst>
                     <a:ext uri="{9D8B030D-6E8A-4147-A177-3AD203B41FA5}">
-                      <a16:colId xmlns="" xmlns:a16="http://schemas.microsoft.com/office/drawing/2014/main" val="20003"/>
+                      <a16:colId xmlns:a16="http://schemas.microsoft.com/office/drawing/2014/main" xmlns="" val="20003"/>
                     </a:ext>
                   </a:extLst>
                 </a:gridCol>
                 <a:gridCol w="498551">
                   <a:extLst>
                     <a:ext uri="{9D8B030D-6E8A-4147-A177-3AD203B41FA5}">
-                      <a16:colId xmlns="" xmlns:a16="http://schemas.microsoft.com/office/drawing/2014/main" val="20004"/>
+                      <a16:colId xmlns:a16="http://schemas.microsoft.com/office/drawing/2014/main" xmlns="" val="20004"/>
                     </a:ext>
                   </a:extLst>
                 </a:gridCol>
                 <a:gridCol w="498551">
                   <a:extLst>
                     <a:ext uri="{9D8B030D-6E8A-4147-A177-3AD203B41FA5}">
-                      <a16:colId xmlns="" xmlns:a16="http://schemas.microsoft.com/office/drawing/2014/main" val="20005"/>
+                      <a16:colId xmlns:a16="http://schemas.microsoft.com/office/drawing/2014/main" xmlns="" val="20005"/>
                     </a:ext>
                   </a:extLst>
                 </a:gridCol>
                 <a:gridCol w="498551">
                   <a:extLst>
                     <a:ext uri="{9D8B030D-6E8A-4147-A177-3AD203B41FA5}">
-                      <a16:colId xmlns="" xmlns:a16="http://schemas.microsoft.com/office/drawing/2014/main" val="20006"/>
+                      <a16:colId xmlns:a16="http://schemas.microsoft.com/office/drawing/2014/main" xmlns="" val="20006"/>
                     </a:ext>
                   </a:extLst>
                 </a:gridCol>
                 <a:gridCol w="498551">
                   <a:extLst>
                     <a:ext uri="{9D8B030D-6E8A-4147-A177-3AD203B41FA5}">
-                      <a16:colId xmlns="" xmlns:a16="http://schemas.microsoft.com/office/drawing/2014/main" val="20007"/>
+                      <a16:colId xmlns:a16="http://schemas.microsoft.com/office/drawing/2014/main" xmlns="" val="20007"/>
                     </a:ext>
                   </a:extLst>
                 </a:gridCol>
                 <a:gridCol w="498551">
                   <a:extLst>
                     <a:ext uri="{9D8B030D-6E8A-4147-A177-3AD203B41FA5}">
-                      <a16:colId xmlns="" xmlns:a16="http://schemas.microsoft.com/office/drawing/2014/main" val="20008"/>
+                      <a16:colId xmlns:a16="http://schemas.microsoft.com/office/drawing/2014/main" xmlns="" val="20008"/>
                     </a:ext>
                   </a:extLst>
                 </a:gridCol>
                 <a:gridCol w="498551">
                   <a:extLst>
                     <a:ext uri="{9D8B030D-6E8A-4147-A177-3AD203B41FA5}">
-                      <a16:colId xmlns="" xmlns:a16="http://schemas.microsoft.com/office/drawing/2014/main" val="20009"/>
+                      <a16:colId xmlns:a16="http://schemas.microsoft.com/office/drawing/2014/main" xmlns="" val="20009"/>
                     </a:ext>
                   </a:extLst>
                 </a:gridCol>
                 <a:gridCol w="498551">
                   <a:extLst>
                     <a:ext uri="{9D8B030D-6E8A-4147-A177-3AD203B41FA5}">
-                      <a16:colId xmlns="" xmlns:a16="http://schemas.microsoft.com/office/drawing/2014/main" val="20010"/>
+                      <a16:colId xmlns:a16="http://schemas.microsoft.com/office/drawing/2014/main" xmlns="" val="20010"/>
                     </a:ext>
                   </a:extLst>
                 </a:gridCol>
                 <a:gridCol w="498551">
                   <a:extLst>
                     <a:ext uri="{9D8B030D-6E8A-4147-A177-3AD203B41FA5}">
-                      <a16:colId xmlns="" xmlns:a16="http://schemas.microsoft.com/office/drawing/2014/main" val="20011"/>
+                      <a16:colId xmlns:a16="http://schemas.microsoft.com/office/drawing/2014/main" xmlns="" val="20011"/>
                     </a:ext>
                   </a:extLst>
                 </a:gridCol>
                 <a:gridCol w="498551">
                   <a:extLst>
                     <a:ext uri="{9D8B030D-6E8A-4147-A177-3AD203B41FA5}">
-                      <a16:colId xmlns="" xmlns:a16="http://schemas.microsoft.com/office/drawing/2014/main" val="20012"/>
+                      <a16:colId xmlns:a16="http://schemas.microsoft.com/office/drawing/2014/main" xmlns="" val="20012"/>
                     </a:ext>
                   </a:extLst>
                 </a:gridCol>
                 <a:gridCol w="498551">
                   <a:extLst>
                     <a:ext uri="{9D8B030D-6E8A-4147-A177-3AD203B41FA5}">
-                      <a16:colId xmlns="" xmlns:a16="http://schemas.microsoft.com/office/drawing/2014/main" val="20013"/>
+                      <a16:colId xmlns:a16="http://schemas.microsoft.com/office/drawing/2014/main" xmlns="" val="20013"/>
                     </a:ext>
                   </a:extLst>
                 </a:gridCol>
                 <a:gridCol w="498551">
                   <a:extLst>
                     <a:ext uri="{9D8B030D-6E8A-4147-A177-3AD203B41FA5}">
-                      <a16:colId xmlns="" xmlns:a16="http://schemas.microsoft.com/office/drawing/2014/main" val="3843917279"/>
+                      <a16:colId xmlns:a16="http://schemas.microsoft.com/office/drawing/2014/main" xmlns="" val="3843917279"/>
                     </a:ext>
                   </a:extLst>
                 </a:gridCol>
@@ -12331,11 +12338,11 @@
                 </a:tc>
                 <a:extLst>
                   <a:ext uri="{0D108BD9-81ED-4DB2-BD59-A6C34878D82A}">
-                    <a16:rowId xmlns="" xmlns:a16="http://schemas.microsoft.com/office/drawing/2014/main" val="10000"/>
+                    <a16:rowId xmlns:a16="http://schemas.microsoft.com/office/drawing/2014/main" xmlns="" val="10000"/>
                   </a:ext>
                 </a:extLst>
               </a:tr>
-              <a:tr h="271167">
+              <a:tr h="0">
                 <a:tc vMerge="1">
                   <a:txBody>
                     <a:bodyPr/>
@@ -13113,7 +13120,7 @@
                 </a:tc>
                 <a:extLst>
                   <a:ext uri="{0D108BD9-81ED-4DB2-BD59-A6C34878D82A}">
-                    <a16:rowId xmlns="" xmlns:a16="http://schemas.microsoft.com/office/drawing/2014/main" val="10001"/>
+                    <a16:rowId xmlns:a16="http://schemas.microsoft.com/office/drawing/2014/main" xmlns="" val="10001"/>
                   </a:ext>
                 </a:extLst>
               </a:tr>
@@ -13714,7 +13721,7 @@
                 </a:tc>
                 <a:extLst>
                   <a:ext uri="{0D108BD9-81ED-4DB2-BD59-A6C34878D82A}">
-                    <a16:rowId xmlns="" xmlns:a16="http://schemas.microsoft.com/office/drawing/2014/main" val="10002"/>
+                    <a16:rowId xmlns:a16="http://schemas.microsoft.com/office/drawing/2014/main" xmlns="" val="10002"/>
                   </a:ext>
                 </a:extLst>
               </a:tr>
@@ -14395,7 +14402,7 @@
                 </a:tc>
                 <a:extLst>
                   <a:ext uri="{0D108BD9-81ED-4DB2-BD59-A6C34878D82A}">
-                    <a16:rowId xmlns="" xmlns:a16="http://schemas.microsoft.com/office/drawing/2014/main" val="10003"/>
+                    <a16:rowId xmlns:a16="http://schemas.microsoft.com/office/drawing/2014/main" xmlns="" val="10003"/>
                   </a:ext>
                 </a:extLst>
               </a:tr>
@@ -15066,7 +15073,7 @@
                 </a:tc>
                 <a:extLst>
                   <a:ext uri="{0D108BD9-81ED-4DB2-BD59-A6C34878D82A}">
-                    <a16:rowId xmlns="" xmlns:a16="http://schemas.microsoft.com/office/drawing/2014/main" val="10004"/>
+                    <a16:rowId xmlns:a16="http://schemas.microsoft.com/office/drawing/2014/main" xmlns="" val="10004"/>
                   </a:ext>
                 </a:extLst>
               </a:tr>
@@ -15747,7 +15754,7 @@
                 </a:tc>
                 <a:extLst>
                   <a:ext uri="{0D108BD9-81ED-4DB2-BD59-A6C34878D82A}">
-                    <a16:rowId xmlns="" xmlns:a16="http://schemas.microsoft.com/office/drawing/2014/main" val="10005"/>
+                    <a16:rowId xmlns:a16="http://schemas.microsoft.com/office/drawing/2014/main" xmlns="" val="10005"/>
                   </a:ext>
                 </a:extLst>
               </a:tr>
@@ -16420,7 +16427,7 @@
                 </a:tc>
                 <a:extLst>
                   <a:ext uri="{0D108BD9-81ED-4DB2-BD59-A6C34878D82A}">
-                    <a16:rowId xmlns="" xmlns:a16="http://schemas.microsoft.com/office/drawing/2014/main" val="10006"/>
+                    <a16:rowId xmlns:a16="http://schemas.microsoft.com/office/drawing/2014/main" xmlns="" val="10006"/>
                   </a:ext>
                 </a:extLst>
               </a:tr>
@@ -17027,7 +17034,7 @@
                 </a:tc>
                 <a:extLst>
                   <a:ext uri="{0D108BD9-81ED-4DB2-BD59-A6C34878D82A}">
-                    <a16:rowId xmlns="" xmlns:a16="http://schemas.microsoft.com/office/drawing/2014/main" val="10007"/>
+                    <a16:rowId xmlns:a16="http://schemas.microsoft.com/office/drawing/2014/main" xmlns="" val="10007"/>
                   </a:ext>
                 </a:extLst>
               </a:tr>
@@ -17638,7 +17645,7 @@
                 </a:tc>
                 <a:extLst>
                   <a:ext uri="{0D108BD9-81ED-4DB2-BD59-A6C34878D82A}">
-                    <a16:rowId xmlns="" xmlns:a16="http://schemas.microsoft.com/office/drawing/2014/main" val="10008"/>
+                    <a16:rowId xmlns:a16="http://schemas.microsoft.com/office/drawing/2014/main" xmlns="" val="10008"/>
                   </a:ext>
                 </a:extLst>
               </a:tr>
@@ -18251,7 +18258,7 @@
                 </a:tc>
                 <a:extLst>
                   <a:ext uri="{0D108BD9-81ED-4DB2-BD59-A6C34878D82A}">
-                    <a16:rowId xmlns="" xmlns:a16="http://schemas.microsoft.com/office/drawing/2014/main" val="10009"/>
+                    <a16:rowId xmlns:a16="http://schemas.microsoft.com/office/drawing/2014/main" xmlns="" val="10009"/>
                   </a:ext>
                 </a:extLst>
               </a:tr>
@@ -18849,7 +18856,7 @@
                 </a:tc>
                 <a:extLst>
                   <a:ext uri="{0D108BD9-81ED-4DB2-BD59-A6C34878D82A}">
-                    <a16:rowId xmlns="" xmlns:a16="http://schemas.microsoft.com/office/drawing/2014/main" val="10010"/>
+                    <a16:rowId xmlns:a16="http://schemas.microsoft.com/office/drawing/2014/main" xmlns="" val="10010"/>
                   </a:ext>
                 </a:extLst>
               </a:tr>
@@ -19462,7 +19469,7 @@
                 </a:tc>
                 <a:extLst>
                   <a:ext uri="{0D108BD9-81ED-4DB2-BD59-A6C34878D82A}">
-                    <a16:rowId xmlns="" xmlns:a16="http://schemas.microsoft.com/office/drawing/2014/main" val="10011"/>
+                    <a16:rowId xmlns:a16="http://schemas.microsoft.com/office/drawing/2014/main" xmlns="" val="10011"/>
                   </a:ext>
                 </a:extLst>
               </a:tr>
@@ -19470,35 +19477,6 @@
           </a:graphicData>
         </a:graphic>
       </p:graphicFrame>
-      <p:pic>
-        <p:nvPicPr>
-          <p:cNvPr id="5" name="그림 4"/>
-          <p:cNvPicPr>
-            <a:picLocks noChangeAspect="1"/>
-          </p:cNvPicPr>
-          <p:nvPr/>
-        </p:nvPicPr>
-        <p:blipFill rotWithShape="1">
-          <a:blip r:embed="rId3">
-            <a:extLst>
-              <a:ext uri="{28A0092B-C50C-407E-A947-70E740481C1C}">
-                <a14:useLocalDpi xmlns:a14="http://schemas.microsoft.com/office/drawing/2010/main" val="0"/>
-              </a:ext>
-            </a:extLst>
-          </a:blip>
-          <a:srcRect t="-1" b="-7692"/>
-          <a:stretch/>
-        </p:blipFill>
-        <p:spPr>
-          <a:xfrm>
-            <a:off x="501957" y="1122923"/>
-            <a:ext cx="8686800" cy="5237418"/>
-          </a:xfrm>
-          <a:prstGeom prst="rect">
-            <a:avLst/>
-          </a:prstGeom>
-        </p:spPr>
-      </p:pic>
       <p:sp>
         <p:nvSpPr>
           <p:cNvPr id="3" name="제목 2"/>
@@ -19538,7 +19516,7 @@
           <p:nvPr/>
         </p:nvPicPr>
         <p:blipFill>
-          <a:blip r:embed="rId4">
+          <a:blip r:embed="rId3">
             <a:extLst>
               <a:ext uri="{28A0092B-C50C-407E-A947-70E740481C1C}">
                 <a14:useLocalDpi xmlns:a14="http://schemas.microsoft.com/office/drawing/2010/main" val="0"/>
@@ -19561,22 +19539,28 @@
       </p:pic>
       <p:pic>
         <p:nvPicPr>
-          <p:cNvPr id="2" name="그림 1"/>
+          <p:cNvPr id="6" name="Picture 5"/>
           <p:cNvPicPr>
             <a:picLocks noChangeAspect="1"/>
           </p:cNvPicPr>
           <p:nvPr/>
         </p:nvPicPr>
         <p:blipFill>
-          <a:blip r:embed="rId5"/>
+          <a:blip r:embed="rId4">
+            <a:extLst>
+              <a:ext uri="{28A0092B-C50C-407E-A947-70E740481C1C}">
+                <a14:useLocalDpi xmlns:a14="http://schemas.microsoft.com/office/drawing/2010/main" val="0"/>
+              </a:ext>
+            </a:extLst>
+          </a:blip>
           <a:stretch>
             <a:fillRect/>
           </a:stretch>
         </p:blipFill>
         <p:spPr>
           <a:xfrm>
-            <a:off x="0" y="381000"/>
-            <a:ext cx="9144000" cy="6096000"/>
+            <a:off x="0" y="1015184"/>
+            <a:ext cx="9144000" cy="5037117"/>
           </a:xfrm>
           <a:prstGeom prst="rect">
             <a:avLst/>
@@ -21733,7 +21717,7 @@
                 <a14:useLocalDpi xmlns:a14="http://schemas.microsoft.com/office/drawing/2010/main" val="0"/>
               </a:ext>
               <a:ext uri="{96DAC541-7B7A-43D3-8B79-37D633B846F1}">
-                <asvg:svgBlip xmlns="" xmlns:asvg="http://schemas.microsoft.com/office/drawing/2016/SVG/main" r:embed="rId4"/>
+                <asvg:svgBlip xmlns:asvg="http://schemas.microsoft.com/office/drawing/2016/SVG/main" xmlns="" r:embed="rId4"/>
               </a:ext>
             </a:extLst>
           </a:blip>

</xml_diff>